<commit_message>
adicionados os cenarios e finalizada a metodologia
</commit_message>
<xml_diff>
--- a/Arquitetura.pptx
+++ b/Arquitetura.pptx
@@ -5,10 +5,10 @@
     <p:sldMasterId id="2147483738" r:id="rId1"/>
   </p:sldMasterIdLst>
   <p:notesMasterIdLst>
-    <p:notesMasterId r:id="rId26"/>
+    <p:notesMasterId r:id="rId27"/>
   </p:notesMasterIdLst>
   <p:handoutMasterIdLst>
-    <p:handoutMasterId r:id="rId27"/>
+    <p:handoutMasterId r:id="rId28"/>
   </p:handoutMasterIdLst>
   <p:sldIdLst>
     <p:sldId id="361" r:id="rId2"/>
@@ -29,19 +29,20 @@
     <p:sldId id="291" r:id="rId17"/>
     <p:sldId id="364" r:id="rId18"/>
     <p:sldId id="366" r:id="rId19"/>
-    <p:sldId id="367" r:id="rId20"/>
-    <p:sldId id="287" r:id="rId21"/>
-    <p:sldId id="365" r:id="rId22"/>
-    <p:sldId id="265" r:id="rId23"/>
-    <p:sldId id="339" r:id="rId24"/>
-    <p:sldId id="346" r:id="rId25"/>
+    <p:sldId id="368" r:id="rId20"/>
+    <p:sldId id="367" r:id="rId21"/>
+    <p:sldId id="287" r:id="rId22"/>
+    <p:sldId id="365" r:id="rId23"/>
+    <p:sldId id="265" r:id="rId24"/>
+    <p:sldId id="339" r:id="rId25"/>
+    <p:sldId id="346" r:id="rId26"/>
   </p:sldIdLst>
   <p:sldSz cx="12195175" cy="6859588"/>
   <p:notesSz cx="6797675" cy="9874250"/>
   <p:embeddedFontLst>
     <p:embeddedFont>
       <p:font typeface="Arial Unicode MS" panose="020B0604020202020204" pitchFamily="34" charset="-128"/>
-      <p:regular r:id="rId28"/>
+      <p:regular r:id="rId29"/>
     </p:embeddedFont>
   </p:embeddedFontLst>
   <p:defaultTextStyle>
@@ -6424,7 +6425,7 @@
             <a:fld id="{7D8C2C35-2B8A-446E-BEC0-FD36716C29AC}" type="slidenum">
               <a:rPr lang="en-US" smtClean="0"/>
               <a:pPr/>
-              <a:t>20</a:t>
+              <a:t>21</a:t>
             </a:fld>
             <a:endParaRPr lang="en-US" dirty="0"/>
           </a:p>
@@ -6509,7 +6510,7 @@
             <a:fld id="{7D8C2C35-2B8A-446E-BEC0-FD36716C29AC}" type="slidenum">
               <a:rPr lang="en-US" smtClean="0"/>
               <a:pPr/>
-              <a:t>21</a:t>
+              <a:t>22</a:t>
             </a:fld>
             <a:endParaRPr lang="en-US" dirty="0"/>
           </a:p>
@@ -6594,7 +6595,7 @@
             <a:fld id="{7D8C2C35-2B8A-446E-BEC0-FD36716C29AC}" type="slidenum">
               <a:rPr lang="en-US" smtClean="0"/>
               <a:pPr/>
-              <a:t>22</a:t>
+              <a:t>23</a:t>
             </a:fld>
             <a:endParaRPr lang="en-US" dirty="0"/>
           </a:p>
@@ -6679,7 +6680,7 @@
             <a:fld id="{7D8C2C35-2B8A-446E-BEC0-FD36716C29AC}" type="slidenum">
               <a:rPr lang="en-US" smtClean="0"/>
               <a:pPr/>
-              <a:t>23</a:t>
+              <a:t>24</a:t>
             </a:fld>
             <a:endParaRPr lang="en-US" dirty="0"/>
           </a:p>
@@ -6849,7 +6850,7 @@
             <a:fld id="{7D8C2C35-2B8A-446E-BEC0-FD36716C29AC}" type="slidenum">
               <a:rPr lang="en-US" smtClean="0"/>
               <a:pPr/>
-              <a:t>24</a:t>
+              <a:t>25</a:t>
             </a:fld>
             <a:endParaRPr lang="en-US" dirty="0"/>
           </a:p>
@@ -21803,53 +21804,82 @@
           <a:chExt cx="0" cy="0"/>
         </a:xfrm>
       </p:grpSpPr>
-      <p:sp>
-        <p:nvSpPr>
-          <p:cNvPr id="2" name="Title 1"/>
-          <p:cNvSpPr>
-            <a:spLocks noGrp="1"/>
-          </p:cNvSpPr>
-          <p:nvPr>
-            <p:ph type="ctrTitle"/>
-          </p:nvPr>
-        </p:nvSpPr>
-        <p:spPr/>
-        <p:txBody>
-          <a:bodyPr/>
-          <a:lstStyle/>
-          <a:p>
-            <a:endParaRPr lang="pt-BR"/>
-          </a:p>
-        </p:txBody>
-      </p:sp>
-      <p:graphicFrame>
-        <p:nvGraphicFramePr>
-          <p:cNvPr id="5" name="Chart 4"/>
-          <p:cNvGraphicFramePr>
-            <a:graphicFrameLocks/>
-          </p:cNvGraphicFramePr>
-          <p:nvPr>
-            <p:extLst>
-              <p:ext uri="{D42A27DB-BD31-4B8C-83A1-F6EECF244321}">
-                <p14:modId xmlns:p14="http://schemas.microsoft.com/office/powerpoint/2010/main" val="2424946109"/>
-              </p:ext>
-            </p:extLst>
-          </p:nvPr>
-        </p:nvGraphicFramePr>
-        <p:xfrm>
-          <a:off x="2697234" y="2981830"/>
-          <a:ext cx="6948488" cy="2743200"/>
-        </p:xfrm>
-        <a:graphic>
-          <a:graphicData uri="http://schemas.openxmlformats.org/drawingml/2006/chart">
-            <c:chart xmlns:c="http://schemas.openxmlformats.org/drawingml/2006/chart" xmlns:r="http://schemas.openxmlformats.org/officeDocument/2006/relationships" r:id="rId2"/>
-          </a:graphicData>
-        </a:graphic>
-      </p:graphicFrame>
+      <p:pic>
+        <p:nvPicPr>
+          <p:cNvPr id="4" name="Picture 3"/>
+          <p:cNvPicPr>
+            <a:picLocks noChangeAspect="1"/>
+          </p:cNvPicPr>
+          <p:nvPr/>
+        </p:nvPicPr>
+        <p:blipFill>
+          <a:blip r:embed="rId2"/>
+          <a:stretch>
+            <a:fillRect/>
+          </a:stretch>
+        </p:blipFill>
+        <p:spPr>
+          <a:xfrm>
+            <a:off x="3598152" y="292715"/>
+            <a:ext cx="4453027" cy="5336176"/>
+          </a:xfrm>
+          <a:prstGeom prst="rect">
+            <a:avLst/>
+          </a:prstGeom>
+        </p:spPr>
+      </p:pic>
+      <p:pic>
+        <p:nvPicPr>
+          <p:cNvPr id="5" name="Picture 4"/>
+          <p:cNvPicPr>
+            <a:picLocks noChangeAspect="1"/>
+          </p:cNvPicPr>
+          <p:nvPr/>
+        </p:nvPicPr>
+        <p:blipFill>
+          <a:blip r:embed="rId3"/>
+          <a:stretch>
+            <a:fillRect/>
+          </a:stretch>
+        </p:blipFill>
+        <p:spPr>
+          <a:xfrm>
+            <a:off x="2961479" y="5750742"/>
+            <a:ext cx="195390" cy="215160"/>
+          </a:xfrm>
+          <a:prstGeom prst="rect">
+            <a:avLst/>
+          </a:prstGeom>
+        </p:spPr>
+      </p:pic>
+      <p:pic>
+        <p:nvPicPr>
+          <p:cNvPr id="6" name="Picture 5"/>
+          <p:cNvPicPr>
+            <a:picLocks noChangeAspect="1"/>
+          </p:cNvPicPr>
+          <p:nvPr/>
+        </p:nvPicPr>
+        <p:blipFill>
+          <a:blip r:embed="rId4"/>
+          <a:stretch>
+            <a:fillRect/>
+          </a:stretch>
+        </p:blipFill>
+        <p:spPr>
+          <a:xfrm>
+            <a:off x="3906577" y="5750741"/>
+            <a:ext cx="198396" cy="215161"/>
+          </a:xfrm>
+          <a:prstGeom prst="rect">
+            <a:avLst/>
+          </a:prstGeom>
+        </p:spPr>
+      </p:pic>
     </p:spTree>
     <p:extLst>
       <p:ext uri="{BB962C8B-B14F-4D97-AF65-F5344CB8AC3E}">
-        <p14:creationId xmlns:p14="http://schemas.microsoft.com/office/powerpoint/2010/main" val="2424893439"/>
+        <p14:creationId xmlns:p14="http://schemas.microsoft.com/office/powerpoint/2010/main" val="1956713743"/>
       </p:ext>
     </p:extLst>
   </p:cSld>
@@ -22307,12 +22337,12 @@
       </p:grpSpPr>
       <p:sp>
         <p:nvSpPr>
-          <p:cNvPr id="24" name="Title 23"/>
+          <p:cNvPr id="2" name="Title 1"/>
           <p:cNvSpPr>
             <a:spLocks noGrp="1"/>
           </p:cNvSpPr>
           <p:nvPr>
-            <p:ph type="title"/>
+            <p:ph type="ctrTitle"/>
           </p:nvPr>
         </p:nvSpPr>
         <p:spPr/>
@@ -22320,286 +22350,44 @@
           <a:bodyPr/>
           <a:lstStyle/>
           <a:p>
-            <a:r>
-              <a:rPr lang="en-US" dirty="0"/>
-              <a:t>Insert page title </a:t>
-            </a:r>
-            <a:endParaRPr lang="en-US" b="0" dirty="0"/>
+            <a:endParaRPr lang="pt-BR"/>
           </a:p>
         </p:txBody>
       </p:sp>
-      <p:sp>
-        <p:nvSpPr>
-          <p:cNvPr id="3" name="Text Placeholder 2"/>
-          <p:cNvSpPr>
-            <a:spLocks noGrp="1"/>
-          </p:cNvSpPr>
+      <p:graphicFrame>
+        <p:nvGraphicFramePr>
+          <p:cNvPr id="5" name="Chart 4"/>
+          <p:cNvGraphicFramePr>
+            <a:graphicFrameLocks/>
+          </p:cNvGraphicFramePr>
           <p:nvPr>
-            <p:ph type="body" sz="quarter" idx="10"/>
+            <p:extLst>
+              <p:ext uri="{D42A27DB-BD31-4B8C-83A1-F6EECF244321}">
+                <p14:modId xmlns:p14="http://schemas.microsoft.com/office/powerpoint/2010/main" val="2424946109"/>
+              </p:ext>
+            </p:extLst>
           </p:nvPr>
-        </p:nvSpPr>
-        <p:spPr/>
-        <p:txBody>
-          <a:bodyPr/>
-          <a:lstStyle/>
-          <a:p>
-            <a:r>
-              <a:rPr lang="en-US" dirty="0"/>
-              <a:t>Headline here</a:t>
-            </a:r>
-          </a:p>
-          <a:p>
-            <a:pPr lvl="1"/>
-            <a:r>
-              <a:rPr lang="en-US" dirty="0" err="1"/>
-              <a:t>Lorem</a:t>
-            </a:r>
-            <a:r>
-              <a:rPr lang="en-US" dirty="0"/>
-              <a:t> </a:t>
-            </a:r>
-            <a:r>
-              <a:rPr lang="en-US" dirty="0" err="1"/>
-              <a:t>ipsum</a:t>
-            </a:r>
-            <a:r>
-              <a:rPr lang="en-US" dirty="0"/>
-              <a:t> dolor sit </a:t>
-            </a:r>
-            <a:r>
-              <a:rPr lang="en-US" dirty="0" err="1"/>
-              <a:t>amet</a:t>
-            </a:r>
-            <a:r>
-              <a:rPr lang="en-US" dirty="0"/>
-              <a:t>, </a:t>
-            </a:r>
-            <a:r>
-              <a:rPr lang="en-US" dirty="0" err="1"/>
-              <a:t>consectetur</a:t>
-            </a:r>
-            <a:r>
-              <a:rPr lang="en-US" dirty="0"/>
-              <a:t> </a:t>
-            </a:r>
-            <a:r>
-              <a:rPr lang="en-US" dirty="0" err="1"/>
-              <a:t>adipiscing</a:t>
-            </a:r>
-            <a:r>
-              <a:rPr lang="en-US" dirty="0"/>
-              <a:t> </a:t>
-            </a:r>
-            <a:r>
-              <a:rPr lang="en-US" dirty="0" err="1"/>
-              <a:t>elit</a:t>
-            </a:r>
-            <a:r>
-              <a:rPr lang="en-US" dirty="0"/>
-              <a:t>. Maecenas </a:t>
-            </a:r>
-            <a:r>
-              <a:rPr lang="en-US" dirty="0" err="1"/>
-              <a:t>pellentesque</a:t>
-            </a:r>
-            <a:r>
-              <a:rPr lang="en-US" dirty="0"/>
-              <a:t> </a:t>
-            </a:r>
-            <a:r>
-              <a:rPr lang="en-US" dirty="0" err="1"/>
-              <a:t>laoreet</a:t>
-            </a:r>
-            <a:r>
-              <a:rPr lang="en-US" dirty="0"/>
-              <a:t> </a:t>
-            </a:r>
-            <a:r>
-              <a:rPr lang="en-US" dirty="0" err="1"/>
-              <a:t>urna</a:t>
-            </a:r>
-            <a:r>
-              <a:rPr lang="en-US" dirty="0"/>
-              <a:t> </a:t>
-            </a:r>
-            <a:r>
-              <a:rPr lang="en-US" dirty="0" err="1"/>
-              <a:t>molestie</a:t>
-            </a:r>
-            <a:r>
-              <a:rPr lang="en-US" dirty="0"/>
-              <a:t> </a:t>
-            </a:r>
-            <a:r>
-              <a:rPr lang="en-US" dirty="0" err="1"/>
-              <a:t>placerat</a:t>
-            </a:r>
-            <a:r>
-              <a:rPr lang="en-US" dirty="0"/>
-              <a:t> </a:t>
-            </a:r>
-            <a:r>
-              <a:rPr lang="en-US" dirty="0" err="1"/>
-              <a:t>ipsum</a:t>
-            </a:r>
-            <a:r>
-              <a:rPr lang="en-US" dirty="0"/>
-              <a:t>.</a:t>
-            </a:r>
-          </a:p>
-        </p:txBody>
-      </p:sp>
-      <p:sp>
-        <p:nvSpPr>
-          <p:cNvPr id="4" name="Text Placeholder 3"/>
-          <p:cNvSpPr>
-            <a:spLocks noGrp="1"/>
-          </p:cNvSpPr>
-          <p:nvPr>
-            <p:ph type="body" sz="quarter" idx="14"/>
-          </p:nvPr>
-        </p:nvSpPr>
-        <p:spPr/>
-        <p:txBody>
-          <a:bodyPr/>
-          <a:lstStyle/>
-          <a:p>
-            <a:r>
-              <a:rPr lang="en-US" dirty="0"/>
-              <a:t>Headline here</a:t>
-            </a:r>
-          </a:p>
-          <a:p>
-            <a:pPr lvl="1"/>
-            <a:r>
-              <a:rPr lang="en-US" dirty="0" err="1"/>
-              <a:t>Lorem</a:t>
-            </a:r>
-            <a:r>
-              <a:rPr lang="en-US" dirty="0"/>
-              <a:t> </a:t>
-            </a:r>
-            <a:r>
-              <a:rPr lang="en-US" dirty="0" err="1"/>
-              <a:t>ipsum</a:t>
-            </a:r>
-            <a:r>
-              <a:rPr lang="en-US" dirty="0"/>
-              <a:t> dolor sit </a:t>
-            </a:r>
-            <a:r>
-              <a:rPr lang="en-US" dirty="0" err="1"/>
-              <a:t>amet</a:t>
-            </a:r>
-            <a:r>
-              <a:rPr lang="en-US" dirty="0"/>
-              <a:t>, </a:t>
-            </a:r>
-            <a:r>
-              <a:rPr lang="en-US" dirty="0" err="1"/>
-              <a:t>consectetur</a:t>
-            </a:r>
-            <a:r>
-              <a:rPr lang="en-US" dirty="0"/>
-              <a:t> </a:t>
-            </a:r>
-            <a:r>
-              <a:rPr lang="en-US" dirty="0" err="1"/>
-              <a:t>adipiscing</a:t>
-            </a:r>
-            <a:r>
-              <a:rPr lang="en-US" dirty="0"/>
-              <a:t> </a:t>
-            </a:r>
-            <a:r>
-              <a:rPr lang="en-US" dirty="0" err="1"/>
-              <a:t>elit</a:t>
-            </a:r>
-            <a:r>
-              <a:rPr lang="en-US" dirty="0"/>
-              <a:t>. Maecenas </a:t>
-            </a:r>
-            <a:r>
-              <a:rPr lang="en-US" dirty="0" err="1"/>
-              <a:t>pellentesque</a:t>
-            </a:r>
-            <a:r>
-              <a:rPr lang="en-US" dirty="0"/>
-              <a:t> </a:t>
-            </a:r>
-            <a:r>
-              <a:rPr lang="en-US" dirty="0" err="1"/>
-              <a:t>laoreet</a:t>
-            </a:r>
-            <a:r>
-              <a:rPr lang="en-US" dirty="0"/>
-              <a:t> </a:t>
-            </a:r>
-            <a:r>
-              <a:rPr lang="en-US" dirty="0" err="1"/>
-              <a:t>urna</a:t>
-            </a:r>
-            <a:r>
-              <a:rPr lang="en-US" dirty="0"/>
-              <a:t> </a:t>
-            </a:r>
-            <a:r>
-              <a:rPr lang="en-US" dirty="0" err="1"/>
-              <a:t>molestie</a:t>
-            </a:r>
-            <a:r>
-              <a:rPr lang="en-US" dirty="0"/>
-              <a:t> </a:t>
-            </a:r>
-            <a:r>
-              <a:rPr lang="en-US" dirty="0" err="1"/>
-              <a:t>placerat</a:t>
-            </a:r>
-            <a:r>
-              <a:rPr lang="en-US" dirty="0"/>
-              <a:t> </a:t>
-            </a:r>
-            <a:r>
-              <a:rPr lang="en-US" dirty="0" err="1"/>
-              <a:t>ipsum</a:t>
-            </a:r>
-            <a:r>
-              <a:rPr lang="en-US" dirty="0"/>
-              <a:t>.</a:t>
-            </a:r>
-          </a:p>
-        </p:txBody>
-      </p:sp>
-      <p:sp>
-        <p:nvSpPr>
-          <p:cNvPr id="7" name="Picture Placeholder 6"/>
-          <p:cNvSpPr>
-            <a:spLocks noGrp="1"/>
-          </p:cNvSpPr>
-          <p:nvPr>
-            <p:ph type="pic" sz="quarter" idx="15"/>
-          </p:nvPr>
-        </p:nvSpPr>
-        <p:spPr/>
-      </p:sp>
-      <p:sp>
-        <p:nvSpPr>
-          <p:cNvPr id="9" name="Picture Placeholder 8"/>
-          <p:cNvSpPr>
-            <a:spLocks noGrp="1"/>
-          </p:cNvSpPr>
-          <p:nvPr>
-            <p:ph type="pic" sz="quarter" idx="16"/>
-          </p:nvPr>
-        </p:nvSpPr>
-        <p:spPr/>
-      </p:sp>
+        </p:nvGraphicFramePr>
+        <p:xfrm>
+          <a:off x="2697234" y="2981830"/>
+          <a:ext cx="6948488" cy="2743200"/>
+        </p:xfrm>
+        <a:graphic>
+          <a:graphicData uri="http://schemas.openxmlformats.org/drawingml/2006/chart">
+            <c:chart xmlns:c="http://schemas.openxmlformats.org/drawingml/2006/chart" xmlns:r="http://schemas.openxmlformats.org/officeDocument/2006/relationships" r:id="rId2"/>
+          </a:graphicData>
+        </a:graphic>
+      </p:graphicFrame>
     </p:spTree>
+    <p:extLst>
+      <p:ext uri="{BB962C8B-B14F-4D97-AF65-F5344CB8AC3E}">
+        <p14:creationId xmlns:p14="http://schemas.microsoft.com/office/powerpoint/2010/main" val="2424893439"/>
+      </p:ext>
+    </p:extLst>
   </p:cSld>
   <p:clrMapOvr>
     <a:masterClrMapping/>
   </p:clrMapOvr>
-  <p:transition spd="med"/>
 </p:sld>
 </file>
 
@@ -22622,6 +22410,321 @@
       </p:grpSpPr>
       <p:sp>
         <p:nvSpPr>
+          <p:cNvPr id="24" name="Title 23"/>
+          <p:cNvSpPr>
+            <a:spLocks noGrp="1"/>
+          </p:cNvSpPr>
+          <p:nvPr>
+            <p:ph type="title"/>
+          </p:nvPr>
+        </p:nvSpPr>
+        <p:spPr/>
+        <p:txBody>
+          <a:bodyPr/>
+          <a:lstStyle/>
+          <a:p>
+            <a:r>
+              <a:rPr lang="en-US" dirty="0"/>
+              <a:t>Insert page title </a:t>
+            </a:r>
+            <a:endParaRPr lang="en-US" b="0" dirty="0"/>
+          </a:p>
+        </p:txBody>
+      </p:sp>
+      <p:sp>
+        <p:nvSpPr>
+          <p:cNvPr id="3" name="Text Placeholder 2"/>
+          <p:cNvSpPr>
+            <a:spLocks noGrp="1"/>
+          </p:cNvSpPr>
+          <p:nvPr>
+            <p:ph type="body" sz="quarter" idx="10"/>
+          </p:nvPr>
+        </p:nvSpPr>
+        <p:spPr/>
+        <p:txBody>
+          <a:bodyPr/>
+          <a:lstStyle/>
+          <a:p>
+            <a:r>
+              <a:rPr lang="en-US" dirty="0"/>
+              <a:t>Headline here</a:t>
+            </a:r>
+          </a:p>
+          <a:p>
+            <a:pPr lvl="1"/>
+            <a:r>
+              <a:rPr lang="en-US" dirty="0" err="1"/>
+              <a:t>Lorem</a:t>
+            </a:r>
+            <a:r>
+              <a:rPr lang="en-US" dirty="0"/>
+              <a:t> </a:t>
+            </a:r>
+            <a:r>
+              <a:rPr lang="en-US" dirty="0" err="1"/>
+              <a:t>ipsum</a:t>
+            </a:r>
+            <a:r>
+              <a:rPr lang="en-US" dirty="0"/>
+              <a:t> dolor sit </a:t>
+            </a:r>
+            <a:r>
+              <a:rPr lang="en-US" dirty="0" err="1"/>
+              <a:t>amet</a:t>
+            </a:r>
+            <a:r>
+              <a:rPr lang="en-US" dirty="0"/>
+              <a:t>, </a:t>
+            </a:r>
+            <a:r>
+              <a:rPr lang="en-US" dirty="0" err="1"/>
+              <a:t>consectetur</a:t>
+            </a:r>
+            <a:r>
+              <a:rPr lang="en-US" dirty="0"/>
+              <a:t> </a:t>
+            </a:r>
+            <a:r>
+              <a:rPr lang="en-US" dirty="0" err="1"/>
+              <a:t>adipiscing</a:t>
+            </a:r>
+            <a:r>
+              <a:rPr lang="en-US" dirty="0"/>
+              <a:t> </a:t>
+            </a:r>
+            <a:r>
+              <a:rPr lang="en-US" dirty="0" err="1"/>
+              <a:t>elit</a:t>
+            </a:r>
+            <a:r>
+              <a:rPr lang="en-US" dirty="0"/>
+              <a:t>. Maecenas </a:t>
+            </a:r>
+            <a:r>
+              <a:rPr lang="en-US" dirty="0" err="1"/>
+              <a:t>pellentesque</a:t>
+            </a:r>
+            <a:r>
+              <a:rPr lang="en-US" dirty="0"/>
+              <a:t> </a:t>
+            </a:r>
+            <a:r>
+              <a:rPr lang="en-US" dirty="0" err="1"/>
+              <a:t>laoreet</a:t>
+            </a:r>
+            <a:r>
+              <a:rPr lang="en-US" dirty="0"/>
+              <a:t> </a:t>
+            </a:r>
+            <a:r>
+              <a:rPr lang="en-US" dirty="0" err="1"/>
+              <a:t>urna</a:t>
+            </a:r>
+            <a:r>
+              <a:rPr lang="en-US" dirty="0"/>
+              <a:t> </a:t>
+            </a:r>
+            <a:r>
+              <a:rPr lang="en-US" dirty="0" err="1"/>
+              <a:t>molestie</a:t>
+            </a:r>
+            <a:r>
+              <a:rPr lang="en-US" dirty="0"/>
+              <a:t> </a:t>
+            </a:r>
+            <a:r>
+              <a:rPr lang="en-US" dirty="0" err="1"/>
+              <a:t>placerat</a:t>
+            </a:r>
+            <a:r>
+              <a:rPr lang="en-US" dirty="0"/>
+              <a:t> </a:t>
+            </a:r>
+            <a:r>
+              <a:rPr lang="en-US" dirty="0" err="1"/>
+              <a:t>ipsum</a:t>
+            </a:r>
+            <a:r>
+              <a:rPr lang="en-US" dirty="0"/>
+              <a:t>.</a:t>
+            </a:r>
+          </a:p>
+        </p:txBody>
+      </p:sp>
+      <p:sp>
+        <p:nvSpPr>
+          <p:cNvPr id="4" name="Text Placeholder 3"/>
+          <p:cNvSpPr>
+            <a:spLocks noGrp="1"/>
+          </p:cNvSpPr>
+          <p:nvPr>
+            <p:ph type="body" sz="quarter" idx="14"/>
+          </p:nvPr>
+        </p:nvSpPr>
+        <p:spPr/>
+        <p:txBody>
+          <a:bodyPr/>
+          <a:lstStyle/>
+          <a:p>
+            <a:r>
+              <a:rPr lang="en-US" dirty="0"/>
+              <a:t>Headline here</a:t>
+            </a:r>
+          </a:p>
+          <a:p>
+            <a:pPr lvl="1"/>
+            <a:r>
+              <a:rPr lang="en-US" dirty="0" err="1"/>
+              <a:t>Lorem</a:t>
+            </a:r>
+            <a:r>
+              <a:rPr lang="en-US" dirty="0"/>
+              <a:t> </a:t>
+            </a:r>
+            <a:r>
+              <a:rPr lang="en-US" dirty="0" err="1"/>
+              <a:t>ipsum</a:t>
+            </a:r>
+            <a:r>
+              <a:rPr lang="en-US" dirty="0"/>
+              <a:t> dolor sit </a:t>
+            </a:r>
+            <a:r>
+              <a:rPr lang="en-US" dirty="0" err="1"/>
+              <a:t>amet</a:t>
+            </a:r>
+            <a:r>
+              <a:rPr lang="en-US" dirty="0"/>
+              <a:t>, </a:t>
+            </a:r>
+            <a:r>
+              <a:rPr lang="en-US" dirty="0" err="1"/>
+              <a:t>consectetur</a:t>
+            </a:r>
+            <a:r>
+              <a:rPr lang="en-US" dirty="0"/>
+              <a:t> </a:t>
+            </a:r>
+            <a:r>
+              <a:rPr lang="en-US" dirty="0" err="1"/>
+              <a:t>adipiscing</a:t>
+            </a:r>
+            <a:r>
+              <a:rPr lang="en-US" dirty="0"/>
+              <a:t> </a:t>
+            </a:r>
+            <a:r>
+              <a:rPr lang="en-US" dirty="0" err="1"/>
+              <a:t>elit</a:t>
+            </a:r>
+            <a:r>
+              <a:rPr lang="en-US" dirty="0"/>
+              <a:t>. Maecenas </a:t>
+            </a:r>
+            <a:r>
+              <a:rPr lang="en-US" dirty="0" err="1"/>
+              <a:t>pellentesque</a:t>
+            </a:r>
+            <a:r>
+              <a:rPr lang="en-US" dirty="0"/>
+              <a:t> </a:t>
+            </a:r>
+            <a:r>
+              <a:rPr lang="en-US" dirty="0" err="1"/>
+              <a:t>laoreet</a:t>
+            </a:r>
+            <a:r>
+              <a:rPr lang="en-US" dirty="0"/>
+              <a:t> </a:t>
+            </a:r>
+            <a:r>
+              <a:rPr lang="en-US" dirty="0" err="1"/>
+              <a:t>urna</a:t>
+            </a:r>
+            <a:r>
+              <a:rPr lang="en-US" dirty="0"/>
+              <a:t> </a:t>
+            </a:r>
+            <a:r>
+              <a:rPr lang="en-US" dirty="0" err="1"/>
+              <a:t>molestie</a:t>
+            </a:r>
+            <a:r>
+              <a:rPr lang="en-US" dirty="0"/>
+              <a:t> </a:t>
+            </a:r>
+            <a:r>
+              <a:rPr lang="en-US" dirty="0" err="1"/>
+              <a:t>placerat</a:t>
+            </a:r>
+            <a:r>
+              <a:rPr lang="en-US" dirty="0"/>
+              <a:t> </a:t>
+            </a:r>
+            <a:r>
+              <a:rPr lang="en-US" dirty="0" err="1"/>
+              <a:t>ipsum</a:t>
+            </a:r>
+            <a:r>
+              <a:rPr lang="en-US" dirty="0"/>
+              <a:t>.</a:t>
+            </a:r>
+          </a:p>
+        </p:txBody>
+      </p:sp>
+      <p:sp>
+        <p:nvSpPr>
+          <p:cNvPr id="7" name="Picture Placeholder 6"/>
+          <p:cNvSpPr>
+            <a:spLocks noGrp="1"/>
+          </p:cNvSpPr>
+          <p:nvPr>
+            <p:ph type="pic" sz="quarter" idx="15"/>
+          </p:nvPr>
+        </p:nvSpPr>
+        <p:spPr/>
+      </p:sp>
+      <p:sp>
+        <p:nvSpPr>
+          <p:cNvPr id="9" name="Picture Placeholder 8"/>
+          <p:cNvSpPr>
+            <a:spLocks noGrp="1"/>
+          </p:cNvSpPr>
+          <p:nvPr>
+            <p:ph type="pic" sz="quarter" idx="16"/>
+          </p:nvPr>
+        </p:nvSpPr>
+        <p:spPr/>
+      </p:sp>
+    </p:spTree>
+  </p:cSld>
+  <p:clrMapOvr>
+    <a:masterClrMapping/>
+  </p:clrMapOvr>
+  <p:transition spd="med"/>
+</p:sld>
+</file>
+
+<file path=ppt/slides/slide22.xml><?xml version="1.0" encoding="utf-8"?>
+<p:sld xmlns:a="http://schemas.openxmlformats.org/drawingml/2006/main" xmlns:r="http://schemas.openxmlformats.org/officeDocument/2006/relationships" xmlns:p="http://schemas.openxmlformats.org/presentationml/2006/main">
+  <p:cSld>
+    <p:spTree>
+      <p:nvGrpSpPr>
+        <p:cNvPr id="1" name=""/>
+        <p:cNvGrpSpPr/>
+        <p:nvPr/>
+      </p:nvGrpSpPr>
+      <p:grpSpPr>
+        <a:xfrm>
+          <a:off x="0" y="0"/>
+          <a:ext cx="0" cy="0"/>
+          <a:chOff x="0" y="0"/>
+          <a:chExt cx="0" cy="0"/>
+        </a:xfrm>
+      </p:grpSpPr>
+      <p:sp>
+        <p:nvSpPr>
           <p:cNvPr id="5" name="Title 4"/>
           <p:cNvSpPr>
             <a:spLocks noGrp="1"/>
@@ -22731,7 +22834,7 @@
 </p:sld>
 </file>
 
-<file path=ppt/slides/slide22.xml><?xml version="1.0" encoding="utf-8"?>
+<file path=ppt/slides/slide23.xml><?xml version="1.0" encoding="utf-8"?>
 <p:sld xmlns:a="http://schemas.openxmlformats.org/drawingml/2006/main" xmlns:r="http://schemas.openxmlformats.org/officeDocument/2006/relationships" xmlns:p="http://schemas.openxmlformats.org/presentationml/2006/main" show="0">
   <p:cSld>
     <p:spTree>
@@ -22757,7 +22860,7 @@
 </p:sld>
 </file>
 
-<file path=ppt/slides/slide23.xml><?xml version="1.0" encoding="utf-8"?>
+<file path=ppt/slides/slide24.xml><?xml version="1.0" encoding="utf-8"?>
 <p:sld xmlns:a="http://schemas.openxmlformats.org/drawingml/2006/main" xmlns:r="http://schemas.openxmlformats.org/officeDocument/2006/relationships" xmlns:p="http://schemas.openxmlformats.org/presentationml/2006/main" show="0">
   <p:cSld>
     <p:spTree>
@@ -22783,7 +22886,7 @@
 </p:sld>
 </file>
 
-<file path=ppt/slides/slide24.xml><?xml version="1.0" encoding="utf-8"?>
+<file path=ppt/slides/slide25.xml><?xml version="1.0" encoding="utf-8"?>
 <p:sld xmlns:a="http://schemas.openxmlformats.org/drawingml/2006/main" xmlns:r="http://schemas.openxmlformats.org/officeDocument/2006/relationships" xmlns:p="http://schemas.openxmlformats.org/presentationml/2006/main" show="0">
   <p:cSld>
     <p:spTree>

</xml_diff>

<commit_message>
revision with results and conclusion
</commit_message>
<xml_diff>
--- a/Arquitetura.pptx
+++ b/Arquitetura.pptx
@@ -5,10 +5,10 @@
     <p:sldMasterId id="2147483738" r:id="rId1"/>
   </p:sldMasterIdLst>
   <p:notesMasterIdLst>
-    <p:notesMasterId r:id="rId27"/>
+    <p:notesMasterId r:id="rId28"/>
   </p:notesMasterIdLst>
   <p:handoutMasterIdLst>
-    <p:handoutMasterId r:id="rId28"/>
+    <p:handoutMasterId r:id="rId29"/>
   </p:handoutMasterIdLst>
   <p:sldIdLst>
     <p:sldId id="361" r:id="rId2"/>
@@ -29,20 +29,21 @@
     <p:sldId id="291" r:id="rId17"/>
     <p:sldId id="364" r:id="rId18"/>
     <p:sldId id="366" r:id="rId19"/>
-    <p:sldId id="368" r:id="rId20"/>
-    <p:sldId id="367" r:id="rId21"/>
-    <p:sldId id="287" r:id="rId22"/>
-    <p:sldId id="365" r:id="rId23"/>
-    <p:sldId id="265" r:id="rId24"/>
-    <p:sldId id="339" r:id="rId25"/>
-    <p:sldId id="346" r:id="rId26"/>
+    <p:sldId id="369" r:id="rId20"/>
+    <p:sldId id="368" r:id="rId21"/>
+    <p:sldId id="367" r:id="rId22"/>
+    <p:sldId id="287" r:id="rId23"/>
+    <p:sldId id="365" r:id="rId24"/>
+    <p:sldId id="265" r:id="rId25"/>
+    <p:sldId id="339" r:id="rId26"/>
+    <p:sldId id="346" r:id="rId27"/>
   </p:sldIdLst>
   <p:sldSz cx="12195175" cy="6859588"/>
   <p:notesSz cx="6797675" cy="9874250"/>
   <p:embeddedFontLst>
     <p:embeddedFont>
       <p:font typeface="Arial Unicode MS" panose="020B0604020202020204" pitchFamily="34" charset="-128"/>
-      <p:regular r:id="rId29"/>
+      <p:regular r:id="rId30"/>
     </p:embeddedFont>
   </p:embeddedFontLst>
   <p:defaultTextStyle>
@@ -6425,7 +6426,7 @@
             <a:fld id="{7D8C2C35-2B8A-446E-BEC0-FD36716C29AC}" type="slidenum">
               <a:rPr lang="en-US" smtClean="0"/>
               <a:pPr/>
-              <a:t>21</a:t>
+              <a:t>22</a:t>
             </a:fld>
             <a:endParaRPr lang="en-US" dirty="0"/>
           </a:p>
@@ -6510,7 +6511,7 @@
             <a:fld id="{7D8C2C35-2B8A-446E-BEC0-FD36716C29AC}" type="slidenum">
               <a:rPr lang="en-US" smtClean="0"/>
               <a:pPr/>
-              <a:t>22</a:t>
+              <a:t>23</a:t>
             </a:fld>
             <a:endParaRPr lang="en-US" dirty="0"/>
           </a:p>
@@ -6595,7 +6596,7 @@
             <a:fld id="{7D8C2C35-2B8A-446E-BEC0-FD36716C29AC}" type="slidenum">
               <a:rPr lang="en-US" smtClean="0"/>
               <a:pPr/>
-              <a:t>23</a:t>
+              <a:t>24</a:t>
             </a:fld>
             <a:endParaRPr lang="en-US" dirty="0"/>
           </a:p>
@@ -6680,7 +6681,7 @@
             <a:fld id="{7D8C2C35-2B8A-446E-BEC0-FD36716C29AC}" type="slidenum">
               <a:rPr lang="en-US" smtClean="0"/>
               <a:pPr/>
-              <a:t>24</a:t>
+              <a:t>25</a:t>
             </a:fld>
             <a:endParaRPr lang="en-US" dirty="0"/>
           </a:p>
@@ -6850,7 +6851,7 @@
             <a:fld id="{7D8C2C35-2B8A-446E-BEC0-FD36716C29AC}" type="slidenum">
               <a:rPr lang="en-US" smtClean="0"/>
               <a:pPr/>
-              <a:t>25</a:t>
+              <a:t>26</a:t>
             </a:fld>
             <a:endParaRPr lang="en-US" dirty="0"/>
           </a:p>
@@ -15104,40 +15105,208 @@
       </p:grpSpPr>
       <p:sp>
         <p:nvSpPr>
-          <p:cNvPr id="71" name="Rectangle 70"/>
+          <p:cNvPr id="5" name="Can 4"/>
           <p:cNvSpPr/>
           <p:nvPr/>
         </p:nvSpPr>
         <p:spPr bwMode="gray">
           <a:xfrm>
-            <a:off x="560070" y="662940"/>
-            <a:ext cx="9761220" cy="4812030"/>
+            <a:off x="3734494" y="2882096"/>
+            <a:ext cx="1191836" cy="1347004"/>
           </a:xfrm>
-          <a:prstGeom prst="rect">
+          <a:prstGeom prst="can">
             <a:avLst/>
           </a:prstGeom>
-          <a:ln>
+          <a:solidFill>
+            <a:schemeClr val="accent1">
+              <a:alpha val="40000"/>
+            </a:schemeClr>
+          </a:solidFill>
+          <a:ln w="6350" algn="ctr">
+            <a:noFill/>
+            <a:miter lim="800000"/>
             <a:headEnd/>
             <a:tailEnd/>
           </a:ln>
         </p:spPr>
-        <p:style>
-          <a:lnRef idx="2">
-            <a:schemeClr val="dk1"/>
-          </a:lnRef>
-          <a:fillRef idx="1">
-            <a:schemeClr val="lt1"/>
-          </a:fillRef>
-          <a:effectRef idx="0">
-            <a:schemeClr val="dk1"/>
-          </a:effectRef>
-          <a:fontRef idx="minor">
-            <a:schemeClr val="dk1"/>
-          </a:fontRef>
-        </p:style>
         <p:txBody>
           <a:bodyPr lIns="90000" tIns="72000" rIns="90000" bIns="72000" rtlCol="0" anchor="ctr"/>
           <a:lstStyle/>
+          <a:p>
+            <a:pPr marR="0" algn="ctr" defTabSz="914400" eaLnBrk="1" fontAlgn="base" latinLnBrk="0" hangingPunct="1">
+              <a:lnSpc>
+                <a:spcPct val="100000"/>
+              </a:lnSpc>
+              <a:spcBef>
+                <a:spcPct val="50000"/>
+              </a:spcBef>
+              <a:spcAft>
+                <a:spcPct val="0"/>
+              </a:spcAft>
+              <a:buClr>
+                <a:srgbClr val="F0AB00"/>
+              </a:buClr>
+              <a:buSzPct val="80000"/>
+              <a:tabLst/>
+            </a:pPr>
+            <a:r>
+              <a:rPr lang="pt-BR" sz="2000" kern="0" noProof="1">
+                <a:ea typeface="Arial Unicode MS" pitchFamily="34" charset="-128"/>
+                <a:cs typeface="Arial Unicode MS" pitchFamily="34" charset="-128"/>
+              </a:rPr>
+              <a:t>Base de dados</a:t>
+            </a:r>
+            <a:endParaRPr kumimoji="0" lang="pt-BR" sz="2000" b="0" i="0" u="none" strike="noStrike" kern="0" cap="none" spc="0" normalizeH="0" baseline="0" noProof="1">
+              <a:ln>
+                <a:noFill/>
+              </a:ln>
+              <a:effectLst/>
+              <a:uLnTx/>
+              <a:uFillTx/>
+              <a:ea typeface="Arial Unicode MS" pitchFamily="34" charset="-128"/>
+              <a:cs typeface="Arial Unicode MS" pitchFamily="34" charset="-128"/>
+            </a:endParaRPr>
+          </a:p>
+        </p:txBody>
+      </p:sp>
+      <p:sp>
+        <p:nvSpPr>
+          <p:cNvPr id="6" name="Rounded Rectangle 5"/>
+          <p:cNvSpPr/>
+          <p:nvPr/>
+        </p:nvSpPr>
+        <p:spPr bwMode="gray">
+          <a:xfrm>
+            <a:off x="1102214" y="1932494"/>
+            <a:ext cx="1913487" cy="553581"/>
+          </a:xfrm>
+          <a:prstGeom prst="roundRect">
+            <a:avLst/>
+          </a:prstGeom>
+          <a:solidFill>
+            <a:schemeClr val="tx2">
+              <a:alpha val="40000"/>
+            </a:schemeClr>
+          </a:solidFill>
+          <a:ln w="6350" algn="ctr">
+            <a:noFill/>
+            <a:miter lim="800000"/>
+            <a:headEnd/>
+            <a:tailEnd/>
+          </a:ln>
+        </p:spPr>
+        <p:txBody>
+          <a:bodyPr lIns="90000" tIns="72000" rIns="90000" bIns="72000" rtlCol="0" anchor="ctr"/>
+          <a:lstStyle/>
+          <a:p>
+            <a:pPr marR="0" algn="ctr" defTabSz="914400" eaLnBrk="1" fontAlgn="base" latinLnBrk="0" hangingPunct="1">
+              <a:lnSpc>
+                <a:spcPct val="100000"/>
+              </a:lnSpc>
+              <a:spcBef>
+                <a:spcPct val="50000"/>
+              </a:spcBef>
+              <a:spcAft>
+                <a:spcPct val="0"/>
+              </a:spcAft>
+              <a:buClr>
+                <a:srgbClr val="F0AB00"/>
+              </a:buClr>
+              <a:buSzPct val="80000"/>
+              <a:tabLst/>
+            </a:pPr>
+            <a:r>
+              <a:rPr kumimoji="0" lang="pt-BR" sz="2000" b="0" i="0" u="none" strike="noStrike" kern="0" cap="none" spc="0" normalizeH="0" baseline="0" noProof="1">
+                <a:ln>
+                  <a:noFill/>
+                </a:ln>
+                <a:effectLst/>
+                <a:uLnTx/>
+                <a:uFillTx/>
+                <a:ea typeface="Arial Unicode MS" pitchFamily="34" charset="-128"/>
+                <a:cs typeface="Arial Unicode MS" pitchFamily="34" charset="-128"/>
+              </a:rPr>
+              <a:t>Gerenciador AutoElastic</a:t>
+            </a:r>
+          </a:p>
+        </p:txBody>
+      </p:sp>
+      <p:sp>
+        <p:nvSpPr>
+          <p:cNvPr id="7" name="Rounded Rectangle 6"/>
+          <p:cNvSpPr/>
+          <p:nvPr/>
+        </p:nvSpPr>
+        <p:spPr bwMode="gray">
+          <a:xfrm>
+            <a:off x="768927" y="2764552"/>
+            <a:ext cx="2580063" cy="1464548"/>
+          </a:xfrm>
+          <a:prstGeom prst="roundRect">
+            <a:avLst/>
+          </a:prstGeom>
+          <a:solidFill>
+            <a:schemeClr val="bg2">
+              <a:alpha val="36000"/>
+            </a:schemeClr>
+          </a:solidFill>
+          <a:ln w="6350" algn="ctr">
+            <a:noFill/>
+            <a:miter lim="800000"/>
+            <a:headEnd/>
+            <a:tailEnd/>
+          </a:ln>
+        </p:spPr>
+        <p:txBody>
+          <a:bodyPr lIns="90000" tIns="72000" rIns="90000" bIns="72000" rtlCol="0" anchor="ctr"/>
+          <a:lstStyle/>
+          <a:p>
+            <a:pPr marR="0" algn="ctr" defTabSz="914400" eaLnBrk="1" fontAlgn="base" latinLnBrk="0" hangingPunct="1">
+              <a:lnSpc>
+                <a:spcPct val="100000"/>
+              </a:lnSpc>
+              <a:spcBef>
+                <a:spcPct val="50000"/>
+              </a:spcBef>
+              <a:spcAft>
+                <a:spcPct val="0"/>
+              </a:spcAft>
+              <a:buClr>
+                <a:srgbClr val="F0AB00"/>
+              </a:buClr>
+              <a:buSzPct val="80000"/>
+              <a:tabLst/>
+            </a:pPr>
+            <a:endParaRPr lang="pt-BR" sz="2000" kern="0" noProof="1">
+              <a:ea typeface="Arial Unicode MS" pitchFamily="34" charset="-128"/>
+              <a:cs typeface="Arial Unicode MS" pitchFamily="34" charset="-128"/>
+            </a:endParaRPr>
+          </a:p>
+          <a:p>
+            <a:pPr marR="0" algn="ctr" defTabSz="914400" eaLnBrk="1" fontAlgn="base" latinLnBrk="0" hangingPunct="1">
+              <a:lnSpc>
+                <a:spcPct val="100000"/>
+              </a:lnSpc>
+              <a:spcBef>
+                <a:spcPct val="50000"/>
+              </a:spcBef>
+              <a:spcAft>
+                <a:spcPct val="0"/>
+              </a:spcAft>
+              <a:buClr>
+                <a:srgbClr val="F0AB00"/>
+              </a:buClr>
+              <a:buSzPct val="80000"/>
+              <a:tabLst/>
+            </a:pPr>
+            <a:r>
+              <a:rPr lang="pt-BR" sz="2000" kern="0" noProof="1">
+                <a:ea typeface="Arial Unicode MS" pitchFamily="34" charset="-128"/>
+                <a:cs typeface="Arial Unicode MS" pitchFamily="34" charset="-128"/>
+              </a:rPr>
+              <a:t>Nó Frontend</a:t>
+            </a:r>
+          </a:p>
           <a:p>
             <a:pPr marR="0" algn="ctr" defTabSz="914400" eaLnBrk="1" fontAlgn="base" latinLnBrk="0" hangingPunct="1">
               <a:lnSpc>
@@ -15168,218 +15337,6 @@
           </a:p>
         </p:txBody>
       </p:sp>
-      <p:sp>
-        <p:nvSpPr>
-          <p:cNvPr id="5" name="Can 4"/>
-          <p:cNvSpPr/>
-          <p:nvPr/>
-        </p:nvSpPr>
-        <p:spPr bwMode="gray">
-          <a:xfrm>
-            <a:off x="3734494" y="2413808"/>
-            <a:ext cx="1191836" cy="1815292"/>
-          </a:xfrm>
-          <a:prstGeom prst="can">
-            <a:avLst/>
-          </a:prstGeom>
-          <a:solidFill>
-            <a:schemeClr val="accent1">
-              <a:alpha val="40000"/>
-            </a:schemeClr>
-          </a:solidFill>
-          <a:ln w="6350" algn="ctr">
-            <a:noFill/>
-            <a:miter lim="800000"/>
-            <a:headEnd/>
-            <a:tailEnd/>
-          </a:ln>
-        </p:spPr>
-        <p:txBody>
-          <a:bodyPr lIns="90000" tIns="72000" rIns="90000" bIns="72000" rtlCol="0" anchor="ctr"/>
-          <a:lstStyle/>
-          <a:p>
-            <a:pPr marR="0" algn="ctr" defTabSz="914400" eaLnBrk="1" fontAlgn="base" latinLnBrk="0" hangingPunct="1">
-              <a:lnSpc>
-                <a:spcPct val="100000"/>
-              </a:lnSpc>
-              <a:spcBef>
-                <a:spcPct val="50000"/>
-              </a:spcBef>
-              <a:spcAft>
-                <a:spcPct val="0"/>
-              </a:spcAft>
-              <a:buClr>
-                <a:srgbClr val="F0AB00"/>
-              </a:buClr>
-              <a:buSzPct val="80000"/>
-              <a:tabLst/>
-            </a:pPr>
-            <a:r>
-              <a:rPr lang="pt-BR" sz="2000" kern="0" noProof="1">
-                <a:ea typeface="Arial Unicode MS" pitchFamily="34" charset="-128"/>
-                <a:cs typeface="Arial Unicode MS" pitchFamily="34" charset="-128"/>
-              </a:rPr>
-              <a:t>Base de dados</a:t>
-            </a:r>
-            <a:endParaRPr kumimoji="0" lang="pt-BR" sz="2000" b="0" i="0" u="none" strike="noStrike" kern="0" cap="none" spc="0" normalizeH="0" baseline="0" noProof="1">
-              <a:ln>
-                <a:noFill/>
-              </a:ln>
-              <a:effectLst/>
-              <a:uLnTx/>
-              <a:uFillTx/>
-              <a:ea typeface="Arial Unicode MS" pitchFamily="34" charset="-128"/>
-              <a:cs typeface="Arial Unicode MS" pitchFamily="34" charset="-128"/>
-            </a:endParaRPr>
-          </a:p>
-        </p:txBody>
-      </p:sp>
-      <p:sp>
-        <p:nvSpPr>
-          <p:cNvPr id="6" name="Rounded Rectangle 5"/>
-          <p:cNvSpPr/>
-          <p:nvPr/>
-        </p:nvSpPr>
-        <p:spPr bwMode="gray">
-          <a:xfrm>
-            <a:off x="1104033" y="869718"/>
-            <a:ext cx="1913487" cy="959081"/>
-          </a:xfrm>
-          <a:prstGeom prst="roundRect">
-            <a:avLst/>
-          </a:prstGeom>
-          <a:solidFill>
-            <a:schemeClr val="tx2">
-              <a:alpha val="40000"/>
-            </a:schemeClr>
-          </a:solidFill>
-          <a:ln w="6350" algn="ctr">
-            <a:noFill/>
-            <a:miter lim="800000"/>
-            <a:headEnd/>
-            <a:tailEnd/>
-          </a:ln>
-        </p:spPr>
-        <p:txBody>
-          <a:bodyPr lIns="90000" tIns="72000" rIns="90000" bIns="72000" rtlCol="0" anchor="ctr"/>
-          <a:lstStyle/>
-          <a:p>
-            <a:pPr marR="0" algn="ctr" defTabSz="914400" eaLnBrk="1" fontAlgn="base" latinLnBrk="0" hangingPunct="1">
-              <a:lnSpc>
-                <a:spcPct val="100000"/>
-              </a:lnSpc>
-              <a:spcBef>
-                <a:spcPct val="50000"/>
-              </a:spcBef>
-              <a:spcAft>
-                <a:spcPct val="0"/>
-              </a:spcAft>
-              <a:buClr>
-                <a:srgbClr val="F0AB00"/>
-              </a:buClr>
-              <a:buSzPct val="80000"/>
-              <a:tabLst/>
-            </a:pPr>
-            <a:r>
-              <a:rPr kumimoji="0" lang="pt-BR" sz="2000" b="0" i="0" u="none" strike="noStrike" kern="0" cap="none" spc="0" normalizeH="0" baseline="0" noProof="1">
-                <a:ln>
-                  <a:noFill/>
-                </a:ln>
-                <a:effectLst/>
-                <a:uLnTx/>
-                <a:uFillTx/>
-                <a:ea typeface="Arial Unicode MS" pitchFamily="34" charset="-128"/>
-                <a:cs typeface="Arial Unicode MS" pitchFamily="34" charset="-128"/>
-              </a:rPr>
-              <a:t>Gerenciador AutoElastic</a:t>
-            </a:r>
-          </a:p>
-        </p:txBody>
-      </p:sp>
-      <p:sp>
-        <p:nvSpPr>
-          <p:cNvPr id="7" name="Rounded Rectangle 6"/>
-          <p:cNvSpPr/>
-          <p:nvPr/>
-        </p:nvSpPr>
-        <p:spPr bwMode="gray">
-          <a:xfrm>
-            <a:off x="768927" y="2413808"/>
-            <a:ext cx="2580063" cy="1815292"/>
-          </a:xfrm>
-          <a:prstGeom prst="roundRect">
-            <a:avLst/>
-          </a:prstGeom>
-          <a:solidFill>
-            <a:schemeClr val="bg2">
-              <a:alpha val="36000"/>
-            </a:schemeClr>
-          </a:solidFill>
-          <a:ln w="6350" algn="ctr">
-            <a:noFill/>
-            <a:miter lim="800000"/>
-            <a:headEnd/>
-            <a:tailEnd/>
-          </a:ln>
-        </p:spPr>
-        <p:txBody>
-          <a:bodyPr lIns="90000" tIns="72000" rIns="90000" bIns="72000" rtlCol="0" anchor="ctr"/>
-          <a:lstStyle/>
-          <a:p>
-            <a:pPr marR="0" algn="ctr" defTabSz="914400" eaLnBrk="1" fontAlgn="base" latinLnBrk="0" hangingPunct="1">
-              <a:lnSpc>
-                <a:spcPct val="100000"/>
-              </a:lnSpc>
-              <a:spcBef>
-                <a:spcPct val="50000"/>
-              </a:spcBef>
-              <a:spcAft>
-                <a:spcPct val="0"/>
-              </a:spcAft>
-              <a:buClr>
-                <a:srgbClr val="F0AB00"/>
-              </a:buClr>
-              <a:buSzPct val="80000"/>
-              <a:tabLst/>
-            </a:pPr>
-            <a:r>
-              <a:rPr lang="pt-BR" sz="2000" kern="0" noProof="1">
-                <a:ea typeface="Arial Unicode MS" pitchFamily="34" charset="-128"/>
-                <a:cs typeface="Arial Unicode MS" pitchFamily="34" charset="-128"/>
-              </a:rPr>
-              <a:t>Nó Frontend</a:t>
-            </a:r>
-          </a:p>
-          <a:p>
-            <a:pPr marR="0" algn="ctr" defTabSz="914400" eaLnBrk="1" fontAlgn="base" latinLnBrk="0" hangingPunct="1">
-              <a:lnSpc>
-                <a:spcPct val="100000"/>
-              </a:lnSpc>
-              <a:spcBef>
-                <a:spcPct val="50000"/>
-              </a:spcBef>
-              <a:spcAft>
-                <a:spcPct val="0"/>
-              </a:spcAft>
-              <a:buClr>
-                <a:srgbClr val="F0AB00"/>
-              </a:buClr>
-              <a:buSzPct val="80000"/>
-              <a:tabLst/>
-            </a:pPr>
-            <a:endParaRPr kumimoji="0" lang="pt-BR" sz="2000" b="0" i="0" u="none" strike="noStrike" kern="0" cap="none" spc="0" normalizeH="0" baseline="0" noProof="1">
-              <a:ln>
-                <a:noFill/>
-              </a:ln>
-              <a:effectLst/>
-              <a:uLnTx/>
-              <a:uFillTx/>
-              <a:ea typeface="Arial Unicode MS" pitchFamily="34" charset="-128"/>
-              <a:cs typeface="Arial Unicode MS" pitchFamily="34" charset="-128"/>
-            </a:endParaRPr>
-          </a:p>
-        </p:txBody>
-      </p:sp>
       <p:cxnSp>
         <p:nvCxnSpPr>
           <p:cNvPr id="9" name="Straight Arrow Connector 8"/>
@@ -15390,9 +15347,9 @@
           <p:nvPr/>
         </p:nvCxnSpPr>
         <p:spPr>
-          <a:xfrm flipH="1">
-            <a:off x="2058959" y="1828799"/>
-            <a:ext cx="1818" cy="585009"/>
+          <a:xfrm>
+            <a:off x="2058958" y="2486075"/>
+            <a:ext cx="1" cy="278477"/>
           </a:xfrm>
           <a:prstGeom prst="straightConnector1">
             <a:avLst/>
@@ -15427,8 +15384,8 @@
         </p:nvSpPr>
         <p:spPr bwMode="gray">
           <a:xfrm>
-            <a:off x="5451243" y="3270019"/>
-            <a:ext cx="1913487" cy="959081"/>
+            <a:off x="5451243" y="3472120"/>
+            <a:ext cx="1913487" cy="756980"/>
           </a:xfrm>
           <a:prstGeom prst="roundRect">
             <a:avLst/>
@@ -15465,6 +15422,28 @@
               <a:buSzPct val="80000"/>
               <a:tabLst/>
             </a:pPr>
+            <a:endParaRPr lang="pt-BR" sz="1000" kern="0" noProof="1">
+              <a:ea typeface="Arial Unicode MS" pitchFamily="34" charset="-128"/>
+              <a:cs typeface="Arial Unicode MS" pitchFamily="34" charset="-128"/>
+            </a:endParaRPr>
+          </a:p>
+          <a:p>
+            <a:pPr marR="0" algn="ctr" defTabSz="914400" eaLnBrk="1" fontAlgn="base" latinLnBrk="0" hangingPunct="1">
+              <a:lnSpc>
+                <a:spcPct val="100000"/>
+              </a:lnSpc>
+              <a:spcBef>
+                <a:spcPct val="50000"/>
+              </a:spcBef>
+              <a:spcAft>
+                <a:spcPct val="0"/>
+              </a:spcAft>
+              <a:buClr>
+                <a:srgbClr val="F0AB00"/>
+              </a:buClr>
+              <a:buSzPct val="80000"/>
+              <a:tabLst/>
+            </a:pPr>
             <a:r>
               <a:rPr kumimoji="0" lang="pt-BR" sz="2000" b="0" i="0" u="none" strike="noStrike" kern="0" cap="none" spc="0" normalizeH="0" baseline="0" noProof="1">
                 <a:ln>
@@ -15489,8 +15468,8 @@
         </p:nvSpPr>
         <p:spPr bwMode="gray">
           <a:xfrm>
-            <a:off x="7889643" y="3270018"/>
-            <a:ext cx="1913487" cy="959081"/>
+            <a:off x="7889643" y="3472120"/>
+            <a:ext cx="1913487" cy="756979"/>
           </a:xfrm>
           <a:prstGeom prst="roundRect">
             <a:avLst/>
@@ -15527,6 +15506,34 @@
               <a:buSzPct val="80000"/>
               <a:tabLst/>
             </a:pPr>
+            <a:endParaRPr kumimoji="0" lang="pt-BR" sz="1000" b="0" i="0" u="none" strike="noStrike" kern="0" cap="none" spc="0" normalizeH="0" baseline="0" noProof="1">
+              <a:ln>
+                <a:noFill/>
+              </a:ln>
+              <a:effectLst/>
+              <a:uLnTx/>
+              <a:uFillTx/>
+              <a:ea typeface="Arial Unicode MS" pitchFamily="34" charset="-128"/>
+              <a:cs typeface="Arial Unicode MS" pitchFamily="34" charset="-128"/>
+            </a:endParaRPr>
+          </a:p>
+          <a:p>
+            <a:pPr marR="0" algn="ctr" defTabSz="914400" eaLnBrk="1" fontAlgn="base" latinLnBrk="0" hangingPunct="1">
+              <a:lnSpc>
+                <a:spcPct val="100000"/>
+              </a:lnSpc>
+              <a:spcBef>
+                <a:spcPct val="50000"/>
+              </a:spcBef>
+              <a:spcAft>
+                <a:spcPct val="0"/>
+              </a:spcAft>
+              <a:buClr>
+                <a:srgbClr val="F0AB00"/>
+              </a:buClr>
+              <a:buSzPct val="80000"/>
+              <a:tabLst/>
+            </a:pPr>
             <a:r>
               <a:rPr kumimoji="0" lang="pt-BR" sz="2000" b="0" i="0" u="none" strike="noStrike" kern="0" cap="none" spc="0" normalizeH="0" baseline="0" noProof="1">
                 <a:ln>
@@ -15551,8 +15558,8 @@
         </p:nvSpPr>
         <p:spPr bwMode="gray">
           <a:xfrm>
-            <a:off x="6115050" y="3321454"/>
-            <a:ext cx="1143000" cy="240030"/>
+            <a:off x="5600096" y="3507098"/>
+            <a:ext cx="1671289" cy="240030"/>
           </a:xfrm>
           <a:prstGeom prst="roundRect">
             <a:avLst/>
@@ -15600,7 +15607,7 @@
                 <a:ea typeface="Arial Unicode MS" pitchFamily="34" charset="-128"/>
                 <a:cs typeface="Arial Unicode MS" pitchFamily="34" charset="-128"/>
               </a:rPr>
-              <a:t>Docker</a:t>
+              <a:t>Docker/Hipervisor</a:t>
             </a:r>
           </a:p>
         </p:txBody>
@@ -15613,8 +15620,8 @@
         </p:nvSpPr>
         <p:spPr bwMode="gray">
           <a:xfrm>
-            <a:off x="8553450" y="3321454"/>
-            <a:ext cx="1143000" cy="240030"/>
+            <a:off x="8034762" y="3507098"/>
+            <a:ext cx="1666224" cy="237781"/>
           </a:xfrm>
           <a:prstGeom prst="roundRect">
             <a:avLst/>
@@ -15662,7 +15669,7 @@
                 <a:ea typeface="Arial Unicode MS" pitchFamily="34" charset="-128"/>
                 <a:cs typeface="Arial Unicode MS" pitchFamily="34" charset="-128"/>
               </a:rPr>
-              <a:t>Docker</a:t>
+              <a:t>Docker/Hipervisor</a:t>
             </a:r>
           </a:p>
         </p:txBody>
@@ -15675,7 +15682,7 @@
         </p:nvSpPr>
         <p:spPr bwMode="gray">
           <a:xfrm>
-            <a:off x="5451243" y="2653838"/>
+            <a:off x="5451243" y="2885333"/>
             <a:ext cx="983847" cy="383943"/>
           </a:xfrm>
           <a:prstGeom prst="rect">
@@ -15731,7 +15738,7 @@
                 <a:ea typeface="Arial Unicode MS" pitchFamily="34" charset="-128"/>
                 <a:cs typeface="Arial Unicode MS" pitchFamily="34" charset="-128"/>
               </a:rPr>
-              <a:t>Container M</a:t>
+              <a:t>UPV M</a:t>
             </a:r>
           </a:p>
         </p:txBody>
@@ -15744,7 +15751,7 @@
         </p:nvSpPr>
         <p:spPr bwMode="gray">
           <a:xfrm>
-            <a:off x="6563763" y="2653837"/>
+            <a:off x="6563763" y="2885332"/>
             <a:ext cx="983847" cy="383943"/>
           </a:xfrm>
           <a:prstGeom prst="rect">
@@ -15800,7 +15807,7 @@
                 <a:ea typeface="Arial Unicode MS" pitchFamily="34" charset="-128"/>
                 <a:cs typeface="Arial Unicode MS" pitchFamily="34" charset="-128"/>
               </a:rPr>
-              <a:t>Container  </a:t>
+              <a:t>UPV  </a:t>
             </a:r>
             <a:r>
               <a:rPr lang="pt-BR" sz="1200" kern="0" noProof="1">
@@ -15830,7 +15837,7 @@
         </p:nvSpPr>
         <p:spPr bwMode="gray">
           <a:xfrm>
-            <a:off x="7709706" y="2648294"/>
+            <a:off x="7709706" y="2879789"/>
             <a:ext cx="983847" cy="383943"/>
           </a:xfrm>
           <a:prstGeom prst="rect">
@@ -15886,7 +15893,7 @@
                 <a:ea typeface="Arial Unicode MS" pitchFamily="34" charset="-128"/>
                 <a:cs typeface="Arial Unicode MS" pitchFamily="34" charset="-128"/>
               </a:rPr>
-              <a:t>Container  1</a:t>
+              <a:t>UPV  1</a:t>
             </a:r>
           </a:p>
         </p:txBody>
@@ -15899,7 +15906,7 @@
         </p:nvSpPr>
         <p:spPr bwMode="gray">
           <a:xfrm>
-            <a:off x="8822226" y="2648293"/>
+            <a:off x="8822226" y="2879788"/>
             <a:ext cx="983847" cy="383943"/>
           </a:xfrm>
           <a:prstGeom prst="rect">
@@ -15955,7 +15962,7 @@
                 <a:ea typeface="Arial Unicode MS" pitchFamily="34" charset="-128"/>
                 <a:cs typeface="Arial Unicode MS" pitchFamily="34" charset="-128"/>
               </a:rPr>
-              <a:t>Container m-1</a:t>
+              <a:t>UPV m-1</a:t>
             </a:r>
           </a:p>
         </p:txBody>
@@ -15968,7 +15975,7 @@
         </p:nvSpPr>
         <p:spPr bwMode="gray">
           <a:xfrm>
-            <a:off x="5732447" y="1828799"/>
+            <a:off x="5732447" y="2199193"/>
             <a:ext cx="411480" cy="390698"/>
           </a:xfrm>
           <a:prstGeom prst="ellipse">
@@ -16037,7 +16044,7 @@
         </p:nvSpPr>
         <p:spPr bwMode="gray">
           <a:xfrm>
-            <a:off x="6849946" y="1828799"/>
+            <a:off x="6849946" y="2199193"/>
             <a:ext cx="411480" cy="390698"/>
           </a:xfrm>
           <a:prstGeom prst="ellipse">
@@ -16106,7 +16113,7 @@
         </p:nvSpPr>
         <p:spPr bwMode="gray">
           <a:xfrm>
-            <a:off x="7995889" y="1828799"/>
+            <a:off x="7995889" y="2199193"/>
             <a:ext cx="411480" cy="390698"/>
           </a:xfrm>
           <a:prstGeom prst="ellipse">
@@ -16175,7 +16182,7 @@
         </p:nvSpPr>
         <p:spPr bwMode="gray">
           <a:xfrm>
-            <a:off x="9099318" y="1828799"/>
+            <a:off x="9099318" y="2199193"/>
             <a:ext cx="411480" cy="390698"/>
           </a:xfrm>
           <a:prstGeom prst="ellipse">
@@ -16247,8 +16254,8 @@
         </p:nvCxnSpPr>
         <p:spPr>
           <a:xfrm>
-            <a:off x="5938187" y="2219497"/>
-            <a:ext cx="4980" cy="434341"/>
+            <a:off x="5938187" y="2589891"/>
+            <a:ext cx="4980" cy="295442"/>
           </a:xfrm>
           <a:prstGeom prst="straightConnector1">
             <a:avLst/>
@@ -16283,8 +16290,8 @@
         </p:nvCxnSpPr>
         <p:spPr>
           <a:xfrm>
-            <a:off x="7055686" y="2219497"/>
-            <a:ext cx="1" cy="434340"/>
+            <a:off x="7055686" y="2589891"/>
+            <a:ext cx="1" cy="295441"/>
           </a:xfrm>
           <a:prstGeom prst="straightConnector1">
             <a:avLst/>
@@ -16322,8 +16329,8 @@
         </p:nvCxnSpPr>
         <p:spPr>
           <a:xfrm>
-            <a:off x="8201629" y="2219497"/>
-            <a:ext cx="1" cy="428797"/>
+            <a:off x="8201629" y="2589891"/>
+            <a:ext cx="1" cy="289898"/>
           </a:xfrm>
           <a:prstGeom prst="straightConnector1">
             <a:avLst/>
@@ -16361,8 +16368,8 @@
         </p:nvCxnSpPr>
         <p:spPr>
           <a:xfrm>
-            <a:off x="9305058" y="2219497"/>
-            <a:ext cx="9092" cy="428796"/>
+            <a:off x="9305058" y="2589891"/>
+            <a:ext cx="9092" cy="289897"/>
           </a:xfrm>
           <a:prstGeom prst="straightConnector1">
             <a:avLst/>
@@ -16581,7 +16588,7 @@
         </p:nvSpPr>
         <p:spPr bwMode="gray">
           <a:xfrm>
-            <a:off x="823544" y="3663920"/>
+            <a:off x="823544" y="3871149"/>
             <a:ext cx="1143000" cy="240030"/>
           </a:xfrm>
           <a:prstGeom prst="roundRect">
@@ -16643,7 +16650,7 @@
         </p:nvSpPr>
         <p:spPr bwMode="gray">
           <a:xfrm>
-            <a:off x="2021161" y="3663315"/>
+            <a:off x="2086267" y="3871149"/>
             <a:ext cx="1143000" cy="240030"/>
           </a:xfrm>
           <a:prstGeom prst="roundRect">
@@ -16705,7 +16712,7 @@
         </p:nvSpPr>
         <p:spPr bwMode="gray">
           <a:xfrm>
-            <a:off x="1189304" y="4814109"/>
+            <a:off x="1189304" y="4686785"/>
             <a:ext cx="411480" cy="390698"/>
           </a:xfrm>
           <a:prstGeom prst="ellipse">
@@ -16774,7 +16781,7 @@
         </p:nvSpPr>
         <p:spPr>
           <a:xfrm>
-            <a:off x="1714500" y="4901736"/>
+            <a:off x="1714500" y="4774412"/>
             <a:ext cx="2398092" cy="215444"/>
           </a:xfrm>
           <a:prstGeom prst="rect">
@@ -16818,7 +16825,7 @@
         </p:nvSpPr>
         <p:spPr bwMode="gray">
           <a:xfrm>
-            <a:off x="4213944" y="4808914"/>
+            <a:off x="4213944" y="4681590"/>
             <a:ext cx="411480" cy="390698"/>
           </a:xfrm>
           <a:prstGeom prst="ellipse">
@@ -16891,7 +16898,7 @@
         </p:nvSpPr>
         <p:spPr>
           <a:xfrm>
-            <a:off x="4739140" y="4896541"/>
+            <a:off x="4739140" y="4769217"/>
             <a:ext cx="2478243" cy="215444"/>
           </a:xfrm>
           <a:prstGeom prst="rect">
@@ -16982,8 +16989,8 @@
         </p:nvCxnSpPr>
         <p:spPr>
           <a:xfrm>
-            <a:off x="5943167" y="3037781"/>
-            <a:ext cx="743383" cy="283673"/>
+            <a:off x="5943167" y="3269276"/>
+            <a:ext cx="492574" cy="237822"/>
           </a:xfrm>
           <a:prstGeom prst="straightConnector1">
             <a:avLst/>
@@ -17021,8 +17028,8 @@
         </p:nvCxnSpPr>
         <p:spPr>
           <a:xfrm flipH="1">
-            <a:off x="6686550" y="3037780"/>
-            <a:ext cx="369137" cy="283674"/>
+            <a:off x="6435741" y="3269275"/>
+            <a:ext cx="619946" cy="237823"/>
           </a:xfrm>
           <a:prstGeom prst="straightConnector1">
             <a:avLst/>
@@ -17054,13 +17061,14 @@
           <p:cNvPr id="66" name="Straight Arrow Connector 65"/>
           <p:cNvCxnSpPr>
             <a:stCxn id="16" idx="2"/>
+            <a:endCxn id="13" idx="0"/>
           </p:cNvCxnSpPr>
           <p:nvPr/>
         </p:nvCxnSpPr>
         <p:spPr>
           <a:xfrm>
-            <a:off x="8201630" y="3032237"/>
-            <a:ext cx="897688" cy="289217"/>
+            <a:off x="8201630" y="3263732"/>
+            <a:ext cx="666244" cy="243366"/>
           </a:xfrm>
           <a:prstGeom prst="straightConnector1">
             <a:avLst/>
@@ -17098,8 +17106,8 @@
         </p:nvCxnSpPr>
         <p:spPr>
           <a:xfrm flipH="1">
-            <a:off x="9124950" y="3032236"/>
-            <a:ext cx="189200" cy="289218"/>
+            <a:off x="8867874" y="3263731"/>
+            <a:ext cx="446276" cy="243367"/>
           </a:xfrm>
           <a:prstGeom prst="straightConnector1">
             <a:avLst/>
@@ -17231,7 +17239,7 @@
         </p:nvSpPr>
         <p:spPr bwMode="gray">
           <a:xfrm>
-            <a:off x="2021161" y="2528278"/>
+            <a:off x="2058958" y="2840264"/>
             <a:ext cx="1143000" cy="240030"/>
           </a:xfrm>
           <a:prstGeom prst="roundRect">
@@ -17281,6 +17289,68 @@
                 <a:cs typeface="Arial Unicode MS" pitchFamily="34" charset="-128"/>
               </a:rPr>
               <a:t>Docker</a:t>
+            </a:r>
+          </a:p>
+        </p:txBody>
+      </p:sp>
+      <p:sp>
+        <p:nvSpPr>
+          <p:cNvPr id="48" name="Rounded Rectangle 42"/>
+          <p:cNvSpPr/>
+          <p:nvPr/>
+        </p:nvSpPr>
+        <p:spPr bwMode="gray">
+          <a:xfrm>
+            <a:off x="842443" y="2846092"/>
+            <a:ext cx="1143000" cy="240030"/>
+          </a:xfrm>
+          <a:prstGeom prst="roundRect">
+            <a:avLst/>
+          </a:prstGeom>
+          <a:solidFill>
+            <a:schemeClr val="accent5">
+              <a:alpha val="80000"/>
+            </a:schemeClr>
+          </a:solidFill>
+          <a:ln w="6350" algn="ctr">
+            <a:noFill/>
+            <a:miter lim="800000"/>
+            <a:headEnd/>
+            <a:tailEnd/>
+          </a:ln>
+        </p:spPr>
+        <p:txBody>
+          <a:bodyPr lIns="90000" tIns="72000" rIns="90000" bIns="72000" rtlCol="0" anchor="ctr"/>
+          <a:lstStyle/>
+          <a:p>
+            <a:pPr marR="0" algn="ctr" defTabSz="914400" eaLnBrk="1" fontAlgn="base" latinLnBrk="0" hangingPunct="1">
+              <a:lnSpc>
+                <a:spcPct val="100000"/>
+              </a:lnSpc>
+              <a:spcBef>
+                <a:spcPct val="50000"/>
+              </a:spcBef>
+              <a:spcAft>
+                <a:spcPct val="0"/>
+              </a:spcAft>
+              <a:buClr>
+                <a:srgbClr val="F0AB00"/>
+              </a:buClr>
+              <a:buSzPct val="80000"/>
+              <a:tabLst/>
+            </a:pPr>
+            <a:r>
+              <a:rPr kumimoji="0" lang="pt-BR" sz="1400" b="0" i="0" u="none" strike="noStrike" kern="0" cap="none" spc="0" normalizeH="0" baseline="0" noProof="1">
+                <a:ln>
+                  <a:noFill/>
+                </a:ln>
+                <a:effectLst/>
+                <a:uLnTx/>
+                <a:uFillTx/>
+                <a:ea typeface="Arial Unicode MS" pitchFamily="34" charset="-128"/>
+                <a:cs typeface="Arial Unicode MS" pitchFamily="34" charset="-128"/>
+              </a:rPr>
+              <a:t>Hipervisor</a:t>
             </a:r>
           </a:p>
         </p:txBody>
@@ -21804,82 +21874,2999 @@
           <a:chExt cx="0" cy="0"/>
         </a:xfrm>
       </p:grpSpPr>
-      <p:pic>
-        <p:nvPicPr>
-          <p:cNvPr id="4" name="Picture 3"/>
-          <p:cNvPicPr>
-            <a:picLocks noChangeAspect="1"/>
-          </p:cNvPicPr>
+      <p:sp>
+        <p:nvSpPr>
+          <p:cNvPr id="50" name="Rectangle 49"/>
+          <p:cNvSpPr/>
           <p:nvPr/>
-        </p:nvPicPr>
-        <p:blipFill>
-          <a:blip r:embed="rId2"/>
-          <a:stretch>
-            <a:fillRect/>
-          </a:stretch>
-        </p:blipFill>
-        <p:spPr>
+        </p:nvSpPr>
+        <p:spPr bwMode="gray">
           <a:xfrm>
-            <a:off x="3598152" y="292715"/>
-            <a:ext cx="4453027" cy="5336176"/>
+            <a:off x="1327642" y="3991796"/>
+            <a:ext cx="177642" cy="240030"/>
           </a:xfrm>
           <a:prstGeom prst="rect">
             <a:avLst/>
           </a:prstGeom>
+          <a:solidFill>
+            <a:schemeClr val="bg1"/>
+          </a:solidFill>
+          <a:ln w="6350" algn="ctr">
+            <a:noFill/>
+            <a:miter lim="800000"/>
+            <a:headEnd/>
+            <a:tailEnd/>
+          </a:ln>
         </p:spPr>
-      </p:pic>
-      <p:pic>
-        <p:nvPicPr>
-          <p:cNvPr id="5" name="Picture 4"/>
-          <p:cNvPicPr>
-            <a:picLocks noChangeAspect="1"/>
-          </p:cNvPicPr>
+        <p:txBody>
+          <a:bodyPr lIns="90000" tIns="72000" rIns="90000" bIns="72000" rtlCol="0" anchor="ctr"/>
+          <a:lstStyle/>
+          <a:p>
+            <a:pPr marR="0" algn="ctr" defTabSz="914400" eaLnBrk="1" fontAlgn="base" latinLnBrk="0" hangingPunct="1">
+              <a:lnSpc>
+                <a:spcPct val="100000"/>
+              </a:lnSpc>
+              <a:spcBef>
+                <a:spcPct val="50000"/>
+              </a:spcBef>
+              <a:spcAft>
+                <a:spcPct val="0"/>
+              </a:spcAft>
+              <a:buClr>
+                <a:srgbClr val="F0AB00"/>
+              </a:buClr>
+              <a:buSzPct val="80000"/>
+              <a:tabLst/>
+            </a:pPr>
+            <a:endParaRPr kumimoji="0" lang="pt-BR" sz="2000" b="0" i="0" u="none" strike="noStrike" kern="0" cap="none" spc="0" normalizeH="0" baseline="0" noProof="1">
+              <a:ln>
+                <a:noFill/>
+              </a:ln>
+              <a:effectLst/>
+              <a:uLnTx/>
+              <a:uFillTx/>
+              <a:ea typeface="Arial Unicode MS" pitchFamily="34" charset="-128"/>
+              <a:cs typeface="Arial Unicode MS" pitchFamily="34" charset="-128"/>
+            </a:endParaRPr>
+          </a:p>
+        </p:txBody>
+      </p:sp>
+      <p:sp>
+        <p:nvSpPr>
+          <p:cNvPr id="57" name="TextBox 56"/>
+          <p:cNvSpPr txBox="1"/>
           <p:nvPr/>
-        </p:nvPicPr>
-        <p:blipFill>
-          <a:blip r:embed="rId3"/>
-          <a:stretch>
-            <a:fillRect/>
-          </a:stretch>
-        </p:blipFill>
+        </p:nvSpPr>
         <p:spPr>
           <a:xfrm>
-            <a:off x="2961479" y="5750742"/>
-            <a:ext cx="195390" cy="215160"/>
+            <a:off x="1160826" y="3624302"/>
+            <a:ext cx="1889941" cy="184666"/>
           </a:xfrm>
           <a:prstGeom prst="rect">
             <a:avLst/>
           </a:prstGeom>
+          <a:noFill/>
         </p:spPr>
-      </p:pic>
-      <p:pic>
-        <p:nvPicPr>
-          <p:cNvPr id="6" name="Picture 5"/>
-          <p:cNvPicPr>
-            <a:picLocks noChangeAspect="1"/>
-          </p:cNvPicPr>
+        <p:txBody>
+          <a:bodyPr wrap="none" lIns="0" tIns="0" rIns="0" bIns="0" rtlCol="0">
+            <a:spAutoFit/>
+          </a:bodyPr>
+          <a:lstStyle/>
+          <a:p>
+            <a:pPr fontAlgn="base">
+              <a:spcBef>
+                <a:spcPts val="600"/>
+              </a:spcBef>
+              <a:spcAft>
+                <a:spcPct val="0"/>
+              </a:spcAft>
+              <a:buClr>
+                <a:srgbClr val="F0AB00"/>
+              </a:buClr>
+              <a:buSzPct val="80000"/>
+            </a:pPr>
+            <a:r>
+              <a:rPr lang="pt-BR" sz="1200" kern="0" noProof="1">
+                <a:ea typeface="Arial Unicode MS" pitchFamily="34" charset="-128"/>
+                <a:cs typeface="Arial Unicode MS" pitchFamily="34" charset="-128"/>
+              </a:rPr>
+              <a:t>Unidade de Máquina Virtual</a:t>
+            </a:r>
+          </a:p>
+        </p:txBody>
+      </p:sp>
+      <p:sp>
+        <p:nvSpPr>
+          <p:cNvPr id="59" name="TextBox 58"/>
+          <p:cNvSpPr txBox="1"/>
           <p:nvPr/>
-        </p:nvPicPr>
-        <p:blipFill>
-          <a:blip r:embed="rId4"/>
-          <a:stretch>
-            <a:fillRect/>
-          </a:stretch>
-        </p:blipFill>
+        </p:nvSpPr>
         <p:spPr>
           <a:xfrm>
-            <a:off x="3906577" y="5750741"/>
-            <a:ext cx="198396" cy="215161"/>
+            <a:off x="3778802" y="3624560"/>
+            <a:ext cx="1974900" cy="184666"/>
           </a:xfrm>
           <a:prstGeom prst="rect">
             <a:avLst/>
           </a:prstGeom>
+          <a:noFill/>
         </p:spPr>
-      </p:pic>
+        <p:txBody>
+          <a:bodyPr wrap="none" lIns="0" tIns="0" rIns="0" bIns="0" rtlCol="0">
+            <a:spAutoFit/>
+          </a:bodyPr>
+          <a:lstStyle/>
+          <a:p>
+            <a:pPr fontAlgn="base">
+              <a:spcBef>
+                <a:spcPts val="600"/>
+              </a:spcBef>
+              <a:spcAft>
+                <a:spcPct val="0"/>
+              </a:spcAft>
+              <a:buClr>
+                <a:srgbClr val="F0AB00"/>
+              </a:buClr>
+              <a:buSzPct val="80000"/>
+            </a:pPr>
+            <a:r>
+              <a:rPr lang="pt-BR" sz="1200" kern="0" noProof="1">
+                <a:ea typeface="Arial Unicode MS" pitchFamily="34" charset="-128"/>
+                <a:cs typeface="Arial Unicode MS" pitchFamily="34" charset="-128"/>
+              </a:rPr>
+              <a:t>Unidade de Container Rígido</a:t>
+            </a:r>
+          </a:p>
+        </p:txBody>
+      </p:sp>
+      <p:sp>
+        <p:nvSpPr>
+          <p:cNvPr id="44" name="Rounded Rectangle 43"/>
+          <p:cNvSpPr/>
+          <p:nvPr/>
+        </p:nvSpPr>
+        <p:spPr bwMode="gray">
+          <a:xfrm>
+            <a:off x="777243" y="1728439"/>
+            <a:ext cx="1187963" cy="1719436"/>
+          </a:xfrm>
+          <a:prstGeom prst="roundRect">
+            <a:avLst/>
+          </a:prstGeom>
+          <a:solidFill>
+            <a:schemeClr val="tx2">
+              <a:alpha val="40000"/>
+            </a:schemeClr>
+          </a:solidFill>
+          <a:ln w="6350" algn="ctr">
+            <a:noFill/>
+            <a:miter lim="800000"/>
+            <a:headEnd/>
+            <a:tailEnd/>
+          </a:ln>
+          <a:effectLst/>
+        </p:spPr>
+        <p:txBody>
+          <a:bodyPr lIns="90000" tIns="72000" rIns="90000" bIns="72000" rtlCol="0" anchor="ctr"/>
+          <a:lstStyle/>
+          <a:p>
+            <a:pPr marR="0" algn="ctr" defTabSz="914400" eaLnBrk="1" fontAlgn="base" latinLnBrk="0" hangingPunct="1">
+              <a:lnSpc>
+                <a:spcPct val="100000"/>
+              </a:lnSpc>
+              <a:spcBef>
+                <a:spcPct val="50000"/>
+              </a:spcBef>
+              <a:spcAft>
+                <a:spcPct val="0"/>
+              </a:spcAft>
+              <a:buClr>
+                <a:srgbClr val="F0AB00"/>
+              </a:buClr>
+              <a:buSzPct val="80000"/>
+              <a:tabLst/>
+            </a:pPr>
+            <a:endParaRPr kumimoji="0" lang="pt-BR" sz="1400" b="0" i="0" u="none" strike="noStrike" kern="0" cap="none" spc="0" normalizeH="0" baseline="0" noProof="1">
+              <a:ln>
+                <a:noFill/>
+              </a:ln>
+              <a:effectLst/>
+              <a:uLnTx/>
+              <a:uFillTx/>
+              <a:ea typeface="Arial Unicode MS" pitchFamily="34" charset="-128"/>
+              <a:cs typeface="Arial Unicode MS" pitchFamily="34" charset="-128"/>
+            </a:endParaRPr>
+          </a:p>
+          <a:p>
+            <a:pPr marR="0" algn="ctr" defTabSz="914400" eaLnBrk="1" fontAlgn="base" latinLnBrk="0" hangingPunct="1">
+              <a:lnSpc>
+                <a:spcPct val="100000"/>
+              </a:lnSpc>
+              <a:spcBef>
+                <a:spcPct val="50000"/>
+              </a:spcBef>
+              <a:spcAft>
+                <a:spcPct val="0"/>
+              </a:spcAft>
+              <a:buClr>
+                <a:srgbClr val="F0AB00"/>
+              </a:buClr>
+              <a:buSzPct val="80000"/>
+              <a:tabLst/>
+            </a:pPr>
+            <a:endParaRPr kumimoji="0" lang="pt-BR" sz="1400" b="0" i="0" u="none" strike="noStrike" kern="0" cap="none" spc="0" normalizeH="0" baseline="0" noProof="1">
+              <a:ln>
+                <a:noFill/>
+              </a:ln>
+              <a:effectLst/>
+              <a:uLnTx/>
+              <a:uFillTx/>
+              <a:ea typeface="Arial Unicode MS" pitchFamily="34" charset="-128"/>
+              <a:cs typeface="Arial Unicode MS" pitchFamily="34" charset="-128"/>
+            </a:endParaRPr>
+          </a:p>
+          <a:p>
+            <a:pPr marR="0" algn="ctr" defTabSz="914400" eaLnBrk="1" fontAlgn="base" latinLnBrk="0" hangingPunct="1">
+              <a:lnSpc>
+                <a:spcPct val="100000"/>
+              </a:lnSpc>
+              <a:spcBef>
+                <a:spcPct val="50000"/>
+              </a:spcBef>
+              <a:spcAft>
+                <a:spcPct val="0"/>
+              </a:spcAft>
+              <a:buClr>
+                <a:srgbClr val="F0AB00"/>
+              </a:buClr>
+              <a:buSzPct val="80000"/>
+              <a:tabLst/>
+            </a:pPr>
+            <a:endParaRPr lang="pt-BR" sz="2000" kern="0" noProof="1">
+              <a:ea typeface="Arial Unicode MS" pitchFamily="34" charset="-128"/>
+              <a:cs typeface="Arial Unicode MS" pitchFamily="34" charset="-128"/>
+            </a:endParaRPr>
+          </a:p>
+          <a:p>
+            <a:pPr marR="0" algn="ctr" defTabSz="914400" eaLnBrk="1" fontAlgn="base" latinLnBrk="0" hangingPunct="1">
+              <a:lnSpc>
+                <a:spcPct val="100000"/>
+              </a:lnSpc>
+              <a:spcBef>
+                <a:spcPct val="50000"/>
+              </a:spcBef>
+              <a:spcAft>
+                <a:spcPct val="0"/>
+              </a:spcAft>
+              <a:buClr>
+                <a:srgbClr val="F0AB00"/>
+              </a:buClr>
+              <a:buSzPct val="80000"/>
+              <a:tabLst/>
+            </a:pPr>
+            <a:r>
+              <a:rPr lang="pt-BR" sz="2000" kern="0" noProof="1">
+                <a:ea typeface="Arial Unicode MS" pitchFamily="34" charset="-128"/>
+                <a:cs typeface="Arial Unicode MS" pitchFamily="34" charset="-128"/>
+              </a:rPr>
+              <a:t>Nó</a:t>
+            </a:r>
+            <a:endParaRPr kumimoji="0" lang="pt-BR" sz="2000" b="0" i="0" u="none" strike="noStrike" kern="0" cap="none" spc="0" normalizeH="0" baseline="0" noProof="1">
+              <a:ln>
+                <a:noFill/>
+              </a:ln>
+              <a:effectLst/>
+              <a:uLnTx/>
+              <a:uFillTx/>
+              <a:ea typeface="Arial Unicode MS" pitchFamily="34" charset="-128"/>
+              <a:cs typeface="Arial Unicode MS" pitchFamily="34" charset="-128"/>
+            </a:endParaRPr>
+          </a:p>
+          <a:p>
+            <a:pPr marR="0" algn="ctr" defTabSz="914400" eaLnBrk="1" fontAlgn="base" latinLnBrk="0" hangingPunct="1">
+              <a:lnSpc>
+                <a:spcPct val="100000"/>
+              </a:lnSpc>
+              <a:spcBef>
+                <a:spcPct val="50000"/>
+              </a:spcBef>
+              <a:spcAft>
+                <a:spcPct val="0"/>
+              </a:spcAft>
+              <a:buClr>
+                <a:srgbClr val="F0AB00"/>
+              </a:buClr>
+              <a:buSzPct val="80000"/>
+              <a:tabLst/>
+            </a:pPr>
+            <a:endParaRPr lang="pt-BR" sz="2000" kern="0" noProof="1">
+              <a:ea typeface="Arial Unicode MS" pitchFamily="34" charset="-128"/>
+              <a:cs typeface="Arial Unicode MS" pitchFamily="34" charset="-128"/>
+            </a:endParaRPr>
+          </a:p>
+          <a:p>
+            <a:pPr marR="0" algn="ctr" defTabSz="914400" eaLnBrk="1" fontAlgn="base" latinLnBrk="0" hangingPunct="1">
+              <a:lnSpc>
+                <a:spcPct val="100000"/>
+              </a:lnSpc>
+              <a:spcBef>
+                <a:spcPct val="50000"/>
+              </a:spcBef>
+              <a:spcAft>
+                <a:spcPct val="0"/>
+              </a:spcAft>
+              <a:buClr>
+                <a:srgbClr val="F0AB00"/>
+              </a:buClr>
+              <a:buSzPct val="80000"/>
+              <a:tabLst/>
+            </a:pPr>
+            <a:endParaRPr kumimoji="0" lang="pt-BR" sz="2000" b="0" i="0" u="none" strike="noStrike" kern="0" cap="none" spc="0" normalizeH="0" baseline="0" noProof="1">
+              <a:ln>
+                <a:noFill/>
+              </a:ln>
+              <a:effectLst/>
+              <a:uLnTx/>
+              <a:uFillTx/>
+              <a:ea typeface="Arial Unicode MS" pitchFamily="34" charset="-128"/>
+              <a:cs typeface="Arial Unicode MS" pitchFamily="34" charset="-128"/>
+            </a:endParaRPr>
+          </a:p>
+          <a:p>
+            <a:pPr marR="0" algn="ctr" defTabSz="914400" eaLnBrk="1" fontAlgn="base" latinLnBrk="0" hangingPunct="1">
+              <a:lnSpc>
+                <a:spcPct val="100000"/>
+              </a:lnSpc>
+              <a:spcBef>
+                <a:spcPct val="50000"/>
+              </a:spcBef>
+              <a:spcAft>
+                <a:spcPct val="0"/>
+              </a:spcAft>
+              <a:buClr>
+                <a:srgbClr val="F0AB00"/>
+              </a:buClr>
+              <a:buSzPct val="80000"/>
+              <a:tabLst/>
+            </a:pPr>
+            <a:endParaRPr lang="pt-BR" sz="2000" kern="0" noProof="1">
+              <a:ea typeface="Arial Unicode MS" pitchFamily="34" charset="-128"/>
+              <a:cs typeface="Arial Unicode MS" pitchFamily="34" charset="-128"/>
+            </a:endParaRPr>
+          </a:p>
+          <a:p>
+            <a:pPr marR="0" algn="ctr" defTabSz="914400" eaLnBrk="1" fontAlgn="base" latinLnBrk="0" hangingPunct="1">
+              <a:lnSpc>
+                <a:spcPct val="100000"/>
+              </a:lnSpc>
+              <a:spcBef>
+                <a:spcPct val="50000"/>
+              </a:spcBef>
+              <a:spcAft>
+                <a:spcPct val="0"/>
+              </a:spcAft>
+              <a:buClr>
+                <a:srgbClr val="F0AB00"/>
+              </a:buClr>
+              <a:buSzPct val="80000"/>
+              <a:tabLst/>
+            </a:pPr>
+            <a:endParaRPr kumimoji="0" lang="pt-BR" sz="2000" b="0" i="0" u="none" strike="noStrike" kern="0" cap="none" spc="0" normalizeH="0" baseline="0" noProof="1">
+              <a:ln>
+                <a:noFill/>
+              </a:ln>
+              <a:effectLst/>
+              <a:uLnTx/>
+              <a:uFillTx/>
+              <a:ea typeface="Arial Unicode MS" pitchFamily="34" charset="-128"/>
+              <a:cs typeface="Arial Unicode MS" pitchFamily="34" charset="-128"/>
+            </a:endParaRPr>
+          </a:p>
+          <a:p>
+            <a:pPr marR="0" algn="ctr" defTabSz="914400" eaLnBrk="1" fontAlgn="base" latinLnBrk="0" hangingPunct="1">
+              <a:lnSpc>
+                <a:spcPct val="100000"/>
+              </a:lnSpc>
+              <a:spcBef>
+                <a:spcPct val="50000"/>
+              </a:spcBef>
+              <a:spcAft>
+                <a:spcPct val="0"/>
+              </a:spcAft>
+              <a:buClr>
+                <a:srgbClr val="F0AB00"/>
+              </a:buClr>
+              <a:buSzPct val="80000"/>
+              <a:tabLst/>
+            </a:pPr>
+            <a:endParaRPr kumimoji="0" lang="pt-BR" sz="2000" b="0" i="0" u="none" strike="noStrike" kern="0" cap="none" spc="0" normalizeH="0" baseline="0" noProof="1">
+              <a:ln>
+                <a:noFill/>
+              </a:ln>
+              <a:effectLst/>
+              <a:uLnTx/>
+              <a:uFillTx/>
+              <a:ea typeface="Arial Unicode MS" pitchFamily="34" charset="-128"/>
+              <a:cs typeface="Arial Unicode MS" pitchFamily="34" charset="-128"/>
+            </a:endParaRPr>
+          </a:p>
+        </p:txBody>
+      </p:sp>
+      <p:sp>
+        <p:nvSpPr>
+          <p:cNvPr id="3" name="Rectangle 2"/>
+          <p:cNvSpPr/>
+          <p:nvPr/>
+        </p:nvSpPr>
+        <p:spPr bwMode="gray">
+          <a:xfrm>
+            <a:off x="1183300" y="2642073"/>
+            <a:ext cx="396000" cy="396000"/>
+          </a:xfrm>
+          <a:prstGeom prst="rect">
+            <a:avLst/>
+          </a:prstGeom>
+          <a:ln>
+            <a:headEnd/>
+            <a:tailEnd/>
+          </a:ln>
+        </p:spPr>
+        <p:style>
+          <a:lnRef idx="2">
+            <a:schemeClr val="dk1"/>
+          </a:lnRef>
+          <a:fillRef idx="1">
+            <a:schemeClr val="lt1"/>
+          </a:fillRef>
+          <a:effectRef idx="0">
+            <a:schemeClr val="dk1"/>
+          </a:effectRef>
+          <a:fontRef idx="minor">
+            <a:schemeClr val="dk1"/>
+          </a:fontRef>
+        </p:style>
+        <p:txBody>
+          <a:bodyPr lIns="90000" tIns="72000" rIns="90000" bIns="72000" rtlCol="0" anchor="ctr"/>
+          <a:lstStyle/>
+          <a:p>
+            <a:pPr marR="0" algn="ctr" defTabSz="914400" eaLnBrk="1" fontAlgn="base" latinLnBrk="0" hangingPunct="1">
+              <a:lnSpc>
+                <a:spcPct val="100000"/>
+              </a:lnSpc>
+              <a:spcBef>
+                <a:spcPct val="50000"/>
+              </a:spcBef>
+              <a:spcAft>
+                <a:spcPct val="0"/>
+              </a:spcAft>
+              <a:buClr>
+                <a:srgbClr val="F0AB00"/>
+              </a:buClr>
+              <a:buSzPct val="80000"/>
+              <a:tabLst/>
+            </a:pPr>
+            <a:r>
+              <a:rPr kumimoji="0" lang="pt-BR" sz="2000" b="0" i="0" u="none" strike="noStrike" kern="0" cap="none" spc="0" normalizeH="0" baseline="0" noProof="0" dirty="0">
+                <a:ln>
+                  <a:noFill/>
+                </a:ln>
+                <a:effectLst/>
+                <a:uLnTx/>
+                <a:uFillTx/>
+                <a:ea typeface="Arial Unicode MS" pitchFamily="34" charset="-128"/>
+                <a:cs typeface="Arial Unicode MS" pitchFamily="34" charset="-128"/>
+              </a:rPr>
+              <a:t>V</a:t>
+            </a:r>
+          </a:p>
+        </p:txBody>
+      </p:sp>
+      <p:sp>
+        <p:nvSpPr>
+          <p:cNvPr id="47" name="Rectangle 46"/>
+          <p:cNvSpPr/>
+          <p:nvPr/>
+        </p:nvSpPr>
+        <p:spPr bwMode="gray">
+          <a:xfrm>
+            <a:off x="685559" y="3531480"/>
+            <a:ext cx="396000" cy="396000"/>
+          </a:xfrm>
+          <a:prstGeom prst="rect">
+            <a:avLst/>
+          </a:prstGeom>
+          <a:ln>
+            <a:headEnd/>
+            <a:tailEnd/>
+          </a:ln>
+        </p:spPr>
+        <p:style>
+          <a:lnRef idx="2">
+            <a:schemeClr val="dk1"/>
+          </a:lnRef>
+          <a:fillRef idx="1">
+            <a:schemeClr val="lt1"/>
+          </a:fillRef>
+          <a:effectRef idx="0">
+            <a:schemeClr val="dk1"/>
+          </a:effectRef>
+          <a:fontRef idx="minor">
+            <a:schemeClr val="dk1"/>
+          </a:fontRef>
+        </p:style>
+        <p:txBody>
+          <a:bodyPr lIns="90000" tIns="72000" rIns="90000" bIns="72000" rtlCol="0" anchor="ctr"/>
+          <a:lstStyle/>
+          <a:p>
+            <a:pPr marR="0" algn="ctr" defTabSz="914400" eaLnBrk="1" fontAlgn="base" latinLnBrk="0" hangingPunct="1">
+              <a:lnSpc>
+                <a:spcPct val="100000"/>
+              </a:lnSpc>
+              <a:spcBef>
+                <a:spcPct val="50000"/>
+              </a:spcBef>
+              <a:spcAft>
+                <a:spcPct val="0"/>
+              </a:spcAft>
+              <a:buClr>
+                <a:srgbClr val="F0AB00"/>
+              </a:buClr>
+              <a:buSzPct val="80000"/>
+              <a:tabLst/>
+            </a:pPr>
+            <a:r>
+              <a:rPr kumimoji="0" lang="pt-BR" sz="2000" b="0" i="0" u="none" strike="noStrike" kern="0" cap="none" spc="0" normalizeH="0" baseline="0" noProof="0" dirty="0">
+                <a:ln>
+                  <a:noFill/>
+                </a:ln>
+                <a:effectLst/>
+                <a:uLnTx/>
+                <a:uFillTx/>
+                <a:ea typeface="Arial Unicode MS" pitchFamily="34" charset="-128"/>
+                <a:cs typeface="Arial Unicode MS" pitchFamily="34" charset="-128"/>
+              </a:rPr>
+              <a:t>V</a:t>
+            </a:r>
+          </a:p>
+        </p:txBody>
+      </p:sp>
+      <p:cxnSp>
+        <p:nvCxnSpPr>
+          <p:cNvPr id="8" name="Straight Connector 7"/>
+          <p:cNvCxnSpPr/>
+          <p:nvPr/>
+        </p:nvCxnSpPr>
+        <p:spPr>
+          <a:xfrm flipH="1">
+            <a:off x="2122415" y="1613239"/>
+            <a:ext cx="16778" cy="1918526"/>
+          </a:xfrm>
+          <a:prstGeom prst="line">
+            <a:avLst/>
+          </a:prstGeom>
+          <a:ln w="6350">
+            <a:solidFill>
+              <a:schemeClr val="tx1"/>
+            </a:solidFill>
+            <a:prstDash val="dash"/>
+          </a:ln>
+        </p:spPr>
+        <p:style>
+          <a:lnRef idx="1">
+            <a:schemeClr val="accent1"/>
+          </a:lnRef>
+          <a:fillRef idx="0">
+            <a:schemeClr val="accent1"/>
+          </a:fillRef>
+          <a:effectRef idx="0">
+            <a:schemeClr val="accent1"/>
+          </a:effectRef>
+          <a:fontRef idx="minor">
+            <a:schemeClr val="tx1"/>
+          </a:fontRef>
+        </p:style>
+      </p:cxnSp>
+      <p:cxnSp>
+        <p:nvCxnSpPr>
+          <p:cNvPr id="133" name="Straight Connector 132"/>
+          <p:cNvCxnSpPr/>
+          <p:nvPr/>
+        </p:nvCxnSpPr>
+        <p:spPr>
+          <a:xfrm>
+            <a:off x="3573305" y="1600030"/>
+            <a:ext cx="17808" cy="1847845"/>
+          </a:xfrm>
+          <a:prstGeom prst="line">
+            <a:avLst/>
+          </a:prstGeom>
+          <a:ln w="6350">
+            <a:solidFill>
+              <a:schemeClr val="tx1"/>
+            </a:solidFill>
+            <a:prstDash val="dash"/>
+          </a:ln>
+        </p:spPr>
+        <p:style>
+          <a:lnRef idx="1">
+            <a:schemeClr val="accent1"/>
+          </a:lnRef>
+          <a:fillRef idx="0">
+            <a:schemeClr val="accent1"/>
+          </a:fillRef>
+          <a:effectRef idx="0">
+            <a:schemeClr val="accent1"/>
+          </a:effectRef>
+          <a:fontRef idx="minor">
+            <a:schemeClr val="tx1"/>
+          </a:fontRef>
+        </p:style>
+      </p:cxnSp>
+      <p:sp>
+        <p:nvSpPr>
+          <p:cNvPr id="19" name="TextBox 18"/>
+          <p:cNvSpPr txBox="1"/>
+          <p:nvPr/>
+        </p:nvSpPr>
+        <p:spPr>
+          <a:xfrm>
+            <a:off x="777902" y="1042448"/>
+            <a:ext cx="1320874" cy="630942"/>
+          </a:xfrm>
+          <a:prstGeom prst="rect">
+            <a:avLst/>
+          </a:prstGeom>
+          <a:noFill/>
+        </p:spPr>
+        <p:txBody>
+          <a:bodyPr wrap="none" lIns="0" tIns="0" rIns="0" bIns="0" rtlCol="0">
+            <a:spAutoFit/>
+          </a:bodyPr>
+          <a:lstStyle/>
+          <a:p>
+            <a:pPr fontAlgn="base">
+              <a:spcBef>
+                <a:spcPts val="600"/>
+              </a:spcBef>
+              <a:spcAft>
+                <a:spcPct val="0"/>
+              </a:spcAft>
+              <a:buClr>
+                <a:srgbClr val="F0AB00"/>
+              </a:buClr>
+              <a:buSzPct val="80000"/>
+            </a:pPr>
+            <a:r>
+              <a:rPr lang="pt-BR" sz="1800" kern="0" dirty="0">
+                <a:ea typeface="Arial Unicode MS" pitchFamily="34" charset="-128"/>
+                <a:cs typeface="Arial Unicode MS" pitchFamily="34" charset="-128"/>
+              </a:rPr>
+              <a:t>Base de </a:t>
+            </a:r>
+          </a:p>
+          <a:p>
+            <a:pPr fontAlgn="base">
+              <a:spcBef>
+                <a:spcPts val="600"/>
+              </a:spcBef>
+              <a:spcAft>
+                <a:spcPct val="0"/>
+              </a:spcAft>
+              <a:buClr>
+                <a:srgbClr val="F0AB00"/>
+              </a:buClr>
+              <a:buSzPct val="80000"/>
+            </a:pPr>
+            <a:r>
+              <a:rPr lang="pt-BR" sz="1800" kern="0" dirty="0">
+                <a:ea typeface="Arial Unicode MS" pitchFamily="34" charset="-128"/>
+                <a:cs typeface="Arial Unicode MS" pitchFamily="34" charset="-128"/>
+              </a:rPr>
+              <a:t>Comparação</a:t>
+            </a:r>
+          </a:p>
+        </p:txBody>
+      </p:sp>
+      <p:sp>
+        <p:nvSpPr>
+          <p:cNvPr id="137" name="TextBox 136"/>
+          <p:cNvSpPr txBox="1"/>
+          <p:nvPr/>
+        </p:nvSpPr>
+        <p:spPr>
+          <a:xfrm>
+            <a:off x="2319874" y="1336240"/>
+            <a:ext cx="1000274" cy="276999"/>
+          </a:xfrm>
+          <a:prstGeom prst="rect">
+            <a:avLst/>
+          </a:prstGeom>
+          <a:noFill/>
+        </p:spPr>
+        <p:txBody>
+          <a:bodyPr wrap="none" lIns="0" tIns="0" rIns="0" bIns="0" rtlCol="0">
+            <a:spAutoFit/>
+          </a:bodyPr>
+          <a:lstStyle/>
+          <a:p>
+            <a:pPr fontAlgn="base">
+              <a:spcBef>
+                <a:spcPts val="600"/>
+              </a:spcBef>
+              <a:spcAft>
+                <a:spcPct val="0"/>
+              </a:spcAft>
+              <a:buClr>
+                <a:srgbClr val="F0AB00"/>
+              </a:buClr>
+              <a:buSzPct val="80000"/>
+            </a:pPr>
+            <a:r>
+              <a:rPr lang="pt-BR" sz="1800" kern="0" dirty="0">
+                <a:ea typeface="Arial Unicode MS" pitchFamily="34" charset="-128"/>
+                <a:cs typeface="Arial Unicode MS" pitchFamily="34" charset="-128"/>
+              </a:rPr>
+              <a:t>Cenário 1</a:t>
+            </a:r>
+          </a:p>
+        </p:txBody>
+      </p:sp>
+      <p:sp>
+        <p:nvSpPr>
+          <p:cNvPr id="138" name="TextBox 137"/>
+          <p:cNvSpPr txBox="1"/>
+          <p:nvPr/>
+        </p:nvSpPr>
+        <p:spPr>
+          <a:xfrm>
+            <a:off x="6048827" y="2970540"/>
+            <a:ext cx="192360" cy="276999"/>
+          </a:xfrm>
+          <a:prstGeom prst="rect">
+            <a:avLst/>
+          </a:prstGeom>
+          <a:noFill/>
+        </p:spPr>
+        <p:txBody>
+          <a:bodyPr wrap="none" lIns="0" tIns="0" rIns="0" bIns="0" rtlCol="0">
+            <a:spAutoFit/>
+          </a:bodyPr>
+          <a:lstStyle/>
+          <a:p>
+            <a:pPr fontAlgn="base">
+              <a:spcBef>
+                <a:spcPts val="600"/>
+              </a:spcBef>
+              <a:spcAft>
+                <a:spcPct val="0"/>
+              </a:spcAft>
+              <a:buClr>
+                <a:srgbClr val="F0AB00"/>
+              </a:buClr>
+              <a:buSzPct val="80000"/>
+            </a:pPr>
+            <a:r>
+              <a:rPr lang="pt-BR" sz="1800" kern="0" dirty="0">
+                <a:ea typeface="Arial Unicode MS" pitchFamily="34" charset="-128"/>
+                <a:cs typeface="Arial Unicode MS" pitchFamily="34" charset="-128"/>
+              </a:rPr>
+              <a:t>...</a:t>
+            </a:r>
+          </a:p>
+        </p:txBody>
+      </p:sp>
+      <p:sp>
+        <p:nvSpPr>
+          <p:cNvPr id="43" name="Rounded Rectangle 43"/>
+          <p:cNvSpPr/>
+          <p:nvPr/>
+        </p:nvSpPr>
+        <p:spPr bwMode="gray">
+          <a:xfrm>
+            <a:off x="2248604" y="1739751"/>
+            <a:ext cx="1187963" cy="1708124"/>
+          </a:xfrm>
+          <a:prstGeom prst="roundRect">
+            <a:avLst/>
+          </a:prstGeom>
+          <a:solidFill>
+            <a:schemeClr val="tx2">
+              <a:alpha val="40000"/>
+            </a:schemeClr>
+          </a:solidFill>
+          <a:ln w="6350" algn="ctr">
+            <a:noFill/>
+            <a:miter lim="800000"/>
+            <a:headEnd/>
+            <a:tailEnd/>
+          </a:ln>
+          <a:effectLst/>
+        </p:spPr>
+        <p:txBody>
+          <a:bodyPr lIns="90000" tIns="72000" rIns="90000" bIns="72000" rtlCol="0" anchor="ctr"/>
+          <a:lstStyle/>
+          <a:p>
+            <a:pPr marR="0" algn="ctr" defTabSz="914400" eaLnBrk="1" fontAlgn="base" latinLnBrk="0" hangingPunct="1">
+              <a:lnSpc>
+                <a:spcPct val="100000"/>
+              </a:lnSpc>
+              <a:spcBef>
+                <a:spcPct val="50000"/>
+              </a:spcBef>
+              <a:spcAft>
+                <a:spcPct val="0"/>
+              </a:spcAft>
+              <a:buClr>
+                <a:srgbClr val="F0AB00"/>
+              </a:buClr>
+              <a:buSzPct val="80000"/>
+              <a:tabLst/>
+            </a:pPr>
+            <a:endParaRPr kumimoji="0" lang="pt-BR" sz="1400" b="0" i="0" u="none" strike="noStrike" kern="0" cap="none" spc="0" normalizeH="0" baseline="0" noProof="1">
+              <a:ln>
+                <a:noFill/>
+              </a:ln>
+              <a:effectLst/>
+              <a:uLnTx/>
+              <a:uFillTx/>
+              <a:ea typeface="Arial Unicode MS" pitchFamily="34" charset="-128"/>
+              <a:cs typeface="Arial Unicode MS" pitchFamily="34" charset="-128"/>
+            </a:endParaRPr>
+          </a:p>
+          <a:p>
+            <a:pPr marR="0" algn="ctr" defTabSz="914400" eaLnBrk="1" fontAlgn="base" latinLnBrk="0" hangingPunct="1">
+              <a:lnSpc>
+                <a:spcPct val="100000"/>
+              </a:lnSpc>
+              <a:spcBef>
+                <a:spcPct val="50000"/>
+              </a:spcBef>
+              <a:spcAft>
+                <a:spcPct val="0"/>
+              </a:spcAft>
+              <a:buClr>
+                <a:srgbClr val="F0AB00"/>
+              </a:buClr>
+              <a:buSzPct val="80000"/>
+              <a:tabLst/>
+            </a:pPr>
+            <a:endParaRPr kumimoji="0" lang="pt-BR" sz="1400" b="0" i="0" u="none" strike="noStrike" kern="0" cap="none" spc="0" normalizeH="0" baseline="0" noProof="1">
+              <a:ln>
+                <a:noFill/>
+              </a:ln>
+              <a:effectLst/>
+              <a:uLnTx/>
+              <a:uFillTx/>
+              <a:ea typeface="Arial Unicode MS" pitchFamily="34" charset="-128"/>
+              <a:cs typeface="Arial Unicode MS" pitchFamily="34" charset="-128"/>
+            </a:endParaRPr>
+          </a:p>
+          <a:p>
+            <a:pPr marR="0" algn="ctr" defTabSz="914400" eaLnBrk="1" fontAlgn="base" latinLnBrk="0" hangingPunct="1">
+              <a:lnSpc>
+                <a:spcPct val="100000"/>
+              </a:lnSpc>
+              <a:spcBef>
+                <a:spcPct val="50000"/>
+              </a:spcBef>
+              <a:spcAft>
+                <a:spcPct val="0"/>
+              </a:spcAft>
+              <a:buClr>
+                <a:srgbClr val="F0AB00"/>
+              </a:buClr>
+              <a:buSzPct val="80000"/>
+              <a:tabLst/>
+            </a:pPr>
+            <a:endParaRPr lang="pt-BR" sz="2000" kern="0" noProof="1">
+              <a:ea typeface="Arial Unicode MS" pitchFamily="34" charset="-128"/>
+              <a:cs typeface="Arial Unicode MS" pitchFamily="34" charset="-128"/>
+            </a:endParaRPr>
+          </a:p>
+          <a:p>
+            <a:pPr marR="0" algn="ctr" defTabSz="914400" eaLnBrk="1" fontAlgn="base" latinLnBrk="0" hangingPunct="1">
+              <a:lnSpc>
+                <a:spcPct val="100000"/>
+              </a:lnSpc>
+              <a:spcBef>
+                <a:spcPct val="50000"/>
+              </a:spcBef>
+              <a:spcAft>
+                <a:spcPct val="0"/>
+              </a:spcAft>
+              <a:buClr>
+                <a:srgbClr val="F0AB00"/>
+              </a:buClr>
+              <a:buSzPct val="80000"/>
+              <a:tabLst/>
+            </a:pPr>
+            <a:r>
+              <a:rPr lang="pt-BR" sz="2000" kern="0" noProof="1">
+                <a:ea typeface="Arial Unicode MS" pitchFamily="34" charset="-128"/>
+                <a:cs typeface="Arial Unicode MS" pitchFamily="34" charset="-128"/>
+              </a:rPr>
+              <a:t>Nó</a:t>
+            </a:r>
+            <a:endParaRPr kumimoji="0" lang="pt-BR" sz="2000" b="0" i="0" u="none" strike="noStrike" kern="0" cap="none" spc="0" normalizeH="0" baseline="0" noProof="1">
+              <a:ln>
+                <a:noFill/>
+              </a:ln>
+              <a:effectLst/>
+              <a:uLnTx/>
+              <a:uFillTx/>
+              <a:ea typeface="Arial Unicode MS" pitchFamily="34" charset="-128"/>
+              <a:cs typeface="Arial Unicode MS" pitchFamily="34" charset="-128"/>
+            </a:endParaRPr>
+          </a:p>
+          <a:p>
+            <a:pPr marR="0" algn="ctr" defTabSz="914400" eaLnBrk="1" fontAlgn="base" latinLnBrk="0" hangingPunct="1">
+              <a:lnSpc>
+                <a:spcPct val="100000"/>
+              </a:lnSpc>
+              <a:spcBef>
+                <a:spcPct val="50000"/>
+              </a:spcBef>
+              <a:spcAft>
+                <a:spcPct val="0"/>
+              </a:spcAft>
+              <a:buClr>
+                <a:srgbClr val="F0AB00"/>
+              </a:buClr>
+              <a:buSzPct val="80000"/>
+              <a:tabLst/>
+            </a:pPr>
+            <a:endParaRPr lang="pt-BR" sz="2000" kern="0" noProof="1">
+              <a:ea typeface="Arial Unicode MS" pitchFamily="34" charset="-128"/>
+              <a:cs typeface="Arial Unicode MS" pitchFamily="34" charset="-128"/>
+            </a:endParaRPr>
+          </a:p>
+          <a:p>
+            <a:pPr marR="0" algn="ctr" defTabSz="914400" eaLnBrk="1" fontAlgn="base" latinLnBrk="0" hangingPunct="1">
+              <a:lnSpc>
+                <a:spcPct val="100000"/>
+              </a:lnSpc>
+              <a:spcBef>
+                <a:spcPct val="50000"/>
+              </a:spcBef>
+              <a:spcAft>
+                <a:spcPct val="0"/>
+              </a:spcAft>
+              <a:buClr>
+                <a:srgbClr val="F0AB00"/>
+              </a:buClr>
+              <a:buSzPct val="80000"/>
+              <a:tabLst/>
+            </a:pPr>
+            <a:endParaRPr kumimoji="0" lang="pt-BR" sz="2000" b="0" i="0" u="none" strike="noStrike" kern="0" cap="none" spc="0" normalizeH="0" baseline="0" noProof="1">
+              <a:ln>
+                <a:noFill/>
+              </a:ln>
+              <a:effectLst/>
+              <a:uLnTx/>
+              <a:uFillTx/>
+              <a:ea typeface="Arial Unicode MS" pitchFamily="34" charset="-128"/>
+              <a:cs typeface="Arial Unicode MS" pitchFamily="34" charset="-128"/>
+            </a:endParaRPr>
+          </a:p>
+          <a:p>
+            <a:pPr marR="0" algn="ctr" defTabSz="914400" eaLnBrk="1" fontAlgn="base" latinLnBrk="0" hangingPunct="1">
+              <a:lnSpc>
+                <a:spcPct val="100000"/>
+              </a:lnSpc>
+              <a:spcBef>
+                <a:spcPct val="50000"/>
+              </a:spcBef>
+              <a:spcAft>
+                <a:spcPct val="0"/>
+              </a:spcAft>
+              <a:buClr>
+                <a:srgbClr val="F0AB00"/>
+              </a:buClr>
+              <a:buSzPct val="80000"/>
+              <a:tabLst/>
+            </a:pPr>
+            <a:endParaRPr lang="pt-BR" sz="2000" kern="0" noProof="1">
+              <a:ea typeface="Arial Unicode MS" pitchFamily="34" charset="-128"/>
+              <a:cs typeface="Arial Unicode MS" pitchFamily="34" charset="-128"/>
+            </a:endParaRPr>
+          </a:p>
+          <a:p>
+            <a:pPr marR="0" algn="ctr" defTabSz="914400" eaLnBrk="1" fontAlgn="base" latinLnBrk="0" hangingPunct="1">
+              <a:lnSpc>
+                <a:spcPct val="100000"/>
+              </a:lnSpc>
+              <a:spcBef>
+                <a:spcPct val="50000"/>
+              </a:spcBef>
+              <a:spcAft>
+                <a:spcPct val="0"/>
+              </a:spcAft>
+              <a:buClr>
+                <a:srgbClr val="F0AB00"/>
+              </a:buClr>
+              <a:buSzPct val="80000"/>
+              <a:tabLst/>
+            </a:pPr>
+            <a:endParaRPr kumimoji="0" lang="pt-BR" sz="2000" b="0" i="0" u="none" strike="noStrike" kern="0" cap="none" spc="0" normalizeH="0" baseline="0" noProof="1">
+              <a:ln>
+                <a:noFill/>
+              </a:ln>
+              <a:effectLst/>
+              <a:uLnTx/>
+              <a:uFillTx/>
+              <a:ea typeface="Arial Unicode MS" pitchFamily="34" charset="-128"/>
+              <a:cs typeface="Arial Unicode MS" pitchFamily="34" charset="-128"/>
+            </a:endParaRPr>
+          </a:p>
+          <a:p>
+            <a:pPr marR="0" algn="ctr" defTabSz="914400" eaLnBrk="1" fontAlgn="base" latinLnBrk="0" hangingPunct="1">
+              <a:lnSpc>
+                <a:spcPct val="100000"/>
+              </a:lnSpc>
+              <a:spcBef>
+                <a:spcPct val="50000"/>
+              </a:spcBef>
+              <a:spcAft>
+                <a:spcPct val="0"/>
+              </a:spcAft>
+              <a:buClr>
+                <a:srgbClr val="F0AB00"/>
+              </a:buClr>
+              <a:buSzPct val="80000"/>
+              <a:tabLst/>
+            </a:pPr>
+            <a:endParaRPr kumimoji="0" lang="pt-BR" sz="2000" b="0" i="0" u="none" strike="noStrike" kern="0" cap="none" spc="0" normalizeH="0" baseline="0" noProof="1">
+              <a:ln>
+                <a:noFill/>
+              </a:ln>
+              <a:effectLst/>
+              <a:uLnTx/>
+              <a:uFillTx/>
+              <a:ea typeface="Arial Unicode MS" pitchFamily="34" charset="-128"/>
+              <a:cs typeface="Arial Unicode MS" pitchFamily="34" charset="-128"/>
+            </a:endParaRPr>
+          </a:p>
+        </p:txBody>
+      </p:sp>
+      <p:sp>
+        <p:nvSpPr>
+          <p:cNvPr id="119" name="Oval 118"/>
+          <p:cNvSpPr/>
+          <p:nvPr/>
+        </p:nvSpPr>
+        <p:spPr bwMode="gray">
+          <a:xfrm>
+            <a:off x="2589676" y="2640242"/>
+            <a:ext cx="536388" cy="461854"/>
+          </a:xfrm>
+          <a:prstGeom prst="ellipse">
+            <a:avLst/>
+          </a:prstGeom>
+          <a:ln>
+            <a:headEnd/>
+            <a:tailEnd/>
+          </a:ln>
+        </p:spPr>
+        <p:style>
+          <a:lnRef idx="2">
+            <a:schemeClr val="dk1"/>
+          </a:lnRef>
+          <a:fillRef idx="1">
+            <a:schemeClr val="lt1"/>
+          </a:fillRef>
+          <a:effectRef idx="0">
+            <a:schemeClr val="dk1"/>
+          </a:effectRef>
+          <a:fontRef idx="minor">
+            <a:schemeClr val="dk1"/>
+          </a:fontRef>
+        </p:style>
+        <p:txBody>
+          <a:bodyPr lIns="90000" tIns="72000" rIns="90000" bIns="72000" rtlCol="0" anchor="ctr"/>
+          <a:lstStyle/>
+          <a:p>
+            <a:pPr marR="0" algn="ctr" defTabSz="914400" eaLnBrk="1" fontAlgn="base" latinLnBrk="0" hangingPunct="1">
+              <a:lnSpc>
+                <a:spcPct val="100000"/>
+              </a:lnSpc>
+              <a:spcBef>
+                <a:spcPct val="50000"/>
+              </a:spcBef>
+              <a:spcAft>
+                <a:spcPct val="0"/>
+              </a:spcAft>
+              <a:buClr>
+                <a:srgbClr val="F0AB00"/>
+              </a:buClr>
+              <a:buSzPct val="80000"/>
+              <a:tabLst/>
+            </a:pPr>
+            <a:r>
+              <a:rPr lang="pt-BR" sz="1000" kern="0" noProof="1">
+                <a:ea typeface="Arial Unicode MS" pitchFamily="34" charset="-128"/>
+                <a:cs typeface="Arial Unicode MS" pitchFamily="34" charset="-128"/>
+              </a:rPr>
+              <a:t>CR</a:t>
+            </a:r>
+            <a:endParaRPr kumimoji="0" lang="pt-BR" sz="1000" b="0" i="0" u="none" strike="noStrike" kern="0" cap="none" spc="0" normalizeH="0" baseline="0" noProof="1">
+              <a:ln>
+                <a:noFill/>
+              </a:ln>
+              <a:effectLst/>
+              <a:uLnTx/>
+              <a:uFillTx/>
+              <a:ea typeface="Arial Unicode MS" pitchFamily="34" charset="-128"/>
+              <a:cs typeface="Arial Unicode MS" pitchFamily="34" charset="-128"/>
+            </a:endParaRPr>
+          </a:p>
+        </p:txBody>
+      </p:sp>
+      <p:cxnSp>
+        <p:nvCxnSpPr>
+          <p:cNvPr id="53" name="Straight Connector 52"/>
+          <p:cNvCxnSpPr/>
+          <p:nvPr/>
+        </p:nvCxnSpPr>
+        <p:spPr>
+          <a:xfrm>
+            <a:off x="5032233" y="1602155"/>
+            <a:ext cx="17939" cy="1845720"/>
+          </a:xfrm>
+          <a:prstGeom prst="line">
+            <a:avLst/>
+          </a:prstGeom>
+          <a:ln w="6350">
+            <a:solidFill>
+              <a:schemeClr val="tx1"/>
+            </a:solidFill>
+            <a:prstDash val="dash"/>
+          </a:ln>
+        </p:spPr>
+        <p:style>
+          <a:lnRef idx="1">
+            <a:schemeClr val="accent1"/>
+          </a:lnRef>
+          <a:fillRef idx="0">
+            <a:schemeClr val="accent1"/>
+          </a:fillRef>
+          <a:effectRef idx="0">
+            <a:schemeClr val="accent1"/>
+          </a:effectRef>
+          <a:fontRef idx="minor">
+            <a:schemeClr val="tx1"/>
+          </a:fontRef>
+        </p:style>
+      </p:cxnSp>
+      <p:sp>
+        <p:nvSpPr>
+          <p:cNvPr id="54" name="TextBox 53"/>
+          <p:cNvSpPr txBox="1"/>
+          <p:nvPr/>
+        </p:nvSpPr>
+        <p:spPr>
+          <a:xfrm>
+            <a:off x="3778802" y="1338365"/>
+            <a:ext cx="1000274" cy="276999"/>
+          </a:xfrm>
+          <a:prstGeom prst="rect">
+            <a:avLst/>
+          </a:prstGeom>
+          <a:noFill/>
+        </p:spPr>
+        <p:txBody>
+          <a:bodyPr wrap="none" lIns="0" tIns="0" rIns="0" bIns="0" rtlCol="0">
+            <a:spAutoFit/>
+          </a:bodyPr>
+          <a:lstStyle/>
+          <a:p>
+            <a:pPr fontAlgn="base">
+              <a:spcBef>
+                <a:spcPts val="600"/>
+              </a:spcBef>
+              <a:spcAft>
+                <a:spcPct val="0"/>
+              </a:spcAft>
+              <a:buClr>
+                <a:srgbClr val="F0AB00"/>
+              </a:buClr>
+              <a:buSzPct val="80000"/>
+            </a:pPr>
+            <a:r>
+              <a:rPr lang="pt-BR" sz="1800" kern="0" dirty="0">
+                <a:ea typeface="Arial Unicode MS" pitchFamily="34" charset="-128"/>
+                <a:cs typeface="Arial Unicode MS" pitchFamily="34" charset="-128"/>
+              </a:rPr>
+              <a:t>Cenário 2</a:t>
+            </a:r>
+          </a:p>
+        </p:txBody>
+      </p:sp>
+      <p:sp>
+        <p:nvSpPr>
+          <p:cNvPr id="55" name="Rounded Rectangle 43"/>
+          <p:cNvSpPr/>
+          <p:nvPr/>
+        </p:nvSpPr>
+        <p:spPr bwMode="gray">
+          <a:xfrm>
+            <a:off x="3707532" y="1741876"/>
+            <a:ext cx="1187963" cy="1705999"/>
+          </a:xfrm>
+          <a:prstGeom prst="roundRect">
+            <a:avLst/>
+          </a:prstGeom>
+          <a:solidFill>
+            <a:schemeClr val="tx2">
+              <a:alpha val="40000"/>
+            </a:schemeClr>
+          </a:solidFill>
+          <a:ln w="6350" algn="ctr">
+            <a:noFill/>
+            <a:miter lim="800000"/>
+            <a:headEnd/>
+            <a:tailEnd/>
+          </a:ln>
+          <a:effectLst/>
+        </p:spPr>
+        <p:txBody>
+          <a:bodyPr lIns="90000" tIns="72000" rIns="90000" bIns="72000" rtlCol="0" anchor="ctr"/>
+          <a:lstStyle/>
+          <a:p>
+            <a:pPr marR="0" algn="ctr" defTabSz="914400" eaLnBrk="1" fontAlgn="base" latinLnBrk="0" hangingPunct="1">
+              <a:lnSpc>
+                <a:spcPct val="100000"/>
+              </a:lnSpc>
+              <a:spcBef>
+                <a:spcPct val="50000"/>
+              </a:spcBef>
+              <a:spcAft>
+                <a:spcPct val="0"/>
+              </a:spcAft>
+              <a:buClr>
+                <a:srgbClr val="F0AB00"/>
+              </a:buClr>
+              <a:buSzPct val="80000"/>
+              <a:tabLst/>
+            </a:pPr>
+            <a:endParaRPr kumimoji="0" lang="pt-BR" sz="1400" b="0" i="0" u="none" strike="noStrike" kern="0" cap="none" spc="0" normalizeH="0" baseline="0" noProof="1">
+              <a:ln>
+                <a:noFill/>
+              </a:ln>
+              <a:effectLst/>
+              <a:uLnTx/>
+              <a:uFillTx/>
+              <a:ea typeface="Arial Unicode MS" pitchFamily="34" charset="-128"/>
+              <a:cs typeface="Arial Unicode MS" pitchFamily="34" charset="-128"/>
+            </a:endParaRPr>
+          </a:p>
+          <a:p>
+            <a:pPr marR="0" algn="ctr" defTabSz="914400" eaLnBrk="1" fontAlgn="base" latinLnBrk="0" hangingPunct="1">
+              <a:lnSpc>
+                <a:spcPct val="100000"/>
+              </a:lnSpc>
+              <a:spcBef>
+                <a:spcPct val="50000"/>
+              </a:spcBef>
+              <a:spcAft>
+                <a:spcPct val="0"/>
+              </a:spcAft>
+              <a:buClr>
+                <a:srgbClr val="F0AB00"/>
+              </a:buClr>
+              <a:buSzPct val="80000"/>
+              <a:tabLst/>
+            </a:pPr>
+            <a:endParaRPr kumimoji="0" lang="pt-BR" sz="1400" b="0" i="0" u="none" strike="noStrike" kern="0" cap="none" spc="0" normalizeH="0" baseline="0" noProof="1">
+              <a:ln>
+                <a:noFill/>
+              </a:ln>
+              <a:effectLst/>
+              <a:uLnTx/>
+              <a:uFillTx/>
+              <a:ea typeface="Arial Unicode MS" pitchFamily="34" charset="-128"/>
+              <a:cs typeface="Arial Unicode MS" pitchFamily="34" charset="-128"/>
+            </a:endParaRPr>
+          </a:p>
+          <a:p>
+            <a:pPr marR="0" algn="ctr" defTabSz="914400" eaLnBrk="1" fontAlgn="base" latinLnBrk="0" hangingPunct="1">
+              <a:lnSpc>
+                <a:spcPct val="100000"/>
+              </a:lnSpc>
+              <a:spcBef>
+                <a:spcPct val="50000"/>
+              </a:spcBef>
+              <a:spcAft>
+                <a:spcPct val="0"/>
+              </a:spcAft>
+              <a:buClr>
+                <a:srgbClr val="F0AB00"/>
+              </a:buClr>
+              <a:buSzPct val="80000"/>
+              <a:tabLst/>
+            </a:pPr>
+            <a:endParaRPr lang="pt-BR" sz="2000" kern="0" noProof="1">
+              <a:ea typeface="Arial Unicode MS" pitchFamily="34" charset="-128"/>
+              <a:cs typeface="Arial Unicode MS" pitchFamily="34" charset="-128"/>
+            </a:endParaRPr>
+          </a:p>
+          <a:p>
+            <a:pPr marR="0" algn="ctr" defTabSz="914400" eaLnBrk="1" fontAlgn="base" latinLnBrk="0" hangingPunct="1">
+              <a:lnSpc>
+                <a:spcPct val="100000"/>
+              </a:lnSpc>
+              <a:spcBef>
+                <a:spcPct val="50000"/>
+              </a:spcBef>
+              <a:spcAft>
+                <a:spcPct val="0"/>
+              </a:spcAft>
+              <a:buClr>
+                <a:srgbClr val="F0AB00"/>
+              </a:buClr>
+              <a:buSzPct val="80000"/>
+              <a:tabLst/>
+            </a:pPr>
+            <a:r>
+              <a:rPr lang="pt-BR" sz="2000" kern="0" noProof="1">
+                <a:ea typeface="Arial Unicode MS" pitchFamily="34" charset="-128"/>
+                <a:cs typeface="Arial Unicode MS" pitchFamily="34" charset="-128"/>
+              </a:rPr>
+              <a:t>Nó</a:t>
+            </a:r>
+            <a:endParaRPr kumimoji="0" lang="pt-BR" sz="2000" b="0" i="0" u="none" strike="noStrike" kern="0" cap="none" spc="0" normalizeH="0" baseline="0" noProof="1">
+              <a:ln>
+                <a:noFill/>
+              </a:ln>
+              <a:effectLst/>
+              <a:uLnTx/>
+              <a:uFillTx/>
+              <a:ea typeface="Arial Unicode MS" pitchFamily="34" charset="-128"/>
+              <a:cs typeface="Arial Unicode MS" pitchFamily="34" charset="-128"/>
+            </a:endParaRPr>
+          </a:p>
+          <a:p>
+            <a:pPr marR="0" algn="ctr" defTabSz="914400" eaLnBrk="1" fontAlgn="base" latinLnBrk="0" hangingPunct="1">
+              <a:lnSpc>
+                <a:spcPct val="100000"/>
+              </a:lnSpc>
+              <a:spcBef>
+                <a:spcPct val="50000"/>
+              </a:spcBef>
+              <a:spcAft>
+                <a:spcPct val="0"/>
+              </a:spcAft>
+              <a:buClr>
+                <a:srgbClr val="F0AB00"/>
+              </a:buClr>
+              <a:buSzPct val="80000"/>
+              <a:tabLst/>
+            </a:pPr>
+            <a:endParaRPr lang="pt-BR" sz="2000" kern="0" noProof="1">
+              <a:ea typeface="Arial Unicode MS" pitchFamily="34" charset="-128"/>
+              <a:cs typeface="Arial Unicode MS" pitchFamily="34" charset="-128"/>
+            </a:endParaRPr>
+          </a:p>
+          <a:p>
+            <a:pPr marR="0" algn="ctr" defTabSz="914400" eaLnBrk="1" fontAlgn="base" latinLnBrk="0" hangingPunct="1">
+              <a:lnSpc>
+                <a:spcPct val="100000"/>
+              </a:lnSpc>
+              <a:spcBef>
+                <a:spcPct val="50000"/>
+              </a:spcBef>
+              <a:spcAft>
+                <a:spcPct val="0"/>
+              </a:spcAft>
+              <a:buClr>
+                <a:srgbClr val="F0AB00"/>
+              </a:buClr>
+              <a:buSzPct val="80000"/>
+              <a:tabLst/>
+            </a:pPr>
+            <a:endParaRPr kumimoji="0" lang="pt-BR" sz="2000" b="0" i="0" u="none" strike="noStrike" kern="0" cap="none" spc="0" normalizeH="0" baseline="0" noProof="1">
+              <a:ln>
+                <a:noFill/>
+              </a:ln>
+              <a:effectLst/>
+              <a:uLnTx/>
+              <a:uFillTx/>
+              <a:ea typeface="Arial Unicode MS" pitchFamily="34" charset="-128"/>
+              <a:cs typeface="Arial Unicode MS" pitchFamily="34" charset="-128"/>
+            </a:endParaRPr>
+          </a:p>
+          <a:p>
+            <a:pPr marR="0" algn="ctr" defTabSz="914400" eaLnBrk="1" fontAlgn="base" latinLnBrk="0" hangingPunct="1">
+              <a:lnSpc>
+                <a:spcPct val="100000"/>
+              </a:lnSpc>
+              <a:spcBef>
+                <a:spcPct val="50000"/>
+              </a:spcBef>
+              <a:spcAft>
+                <a:spcPct val="0"/>
+              </a:spcAft>
+              <a:buClr>
+                <a:srgbClr val="F0AB00"/>
+              </a:buClr>
+              <a:buSzPct val="80000"/>
+              <a:tabLst/>
+            </a:pPr>
+            <a:endParaRPr lang="pt-BR" sz="2000" kern="0" noProof="1">
+              <a:ea typeface="Arial Unicode MS" pitchFamily="34" charset="-128"/>
+              <a:cs typeface="Arial Unicode MS" pitchFamily="34" charset="-128"/>
+            </a:endParaRPr>
+          </a:p>
+          <a:p>
+            <a:pPr marR="0" algn="ctr" defTabSz="914400" eaLnBrk="1" fontAlgn="base" latinLnBrk="0" hangingPunct="1">
+              <a:lnSpc>
+                <a:spcPct val="100000"/>
+              </a:lnSpc>
+              <a:spcBef>
+                <a:spcPct val="50000"/>
+              </a:spcBef>
+              <a:spcAft>
+                <a:spcPct val="0"/>
+              </a:spcAft>
+              <a:buClr>
+                <a:srgbClr val="F0AB00"/>
+              </a:buClr>
+              <a:buSzPct val="80000"/>
+              <a:tabLst/>
+            </a:pPr>
+            <a:endParaRPr kumimoji="0" lang="pt-BR" sz="2000" b="0" i="0" u="none" strike="noStrike" kern="0" cap="none" spc="0" normalizeH="0" baseline="0" noProof="1">
+              <a:ln>
+                <a:noFill/>
+              </a:ln>
+              <a:effectLst/>
+              <a:uLnTx/>
+              <a:uFillTx/>
+              <a:ea typeface="Arial Unicode MS" pitchFamily="34" charset="-128"/>
+              <a:cs typeface="Arial Unicode MS" pitchFamily="34" charset="-128"/>
+            </a:endParaRPr>
+          </a:p>
+          <a:p>
+            <a:pPr marR="0" algn="ctr" defTabSz="914400" eaLnBrk="1" fontAlgn="base" latinLnBrk="0" hangingPunct="1">
+              <a:lnSpc>
+                <a:spcPct val="100000"/>
+              </a:lnSpc>
+              <a:spcBef>
+                <a:spcPct val="50000"/>
+              </a:spcBef>
+              <a:spcAft>
+                <a:spcPct val="0"/>
+              </a:spcAft>
+              <a:buClr>
+                <a:srgbClr val="F0AB00"/>
+              </a:buClr>
+              <a:buSzPct val="80000"/>
+              <a:tabLst/>
+            </a:pPr>
+            <a:endParaRPr kumimoji="0" lang="pt-BR" sz="2000" b="0" i="0" u="none" strike="noStrike" kern="0" cap="none" spc="0" normalizeH="0" baseline="0" noProof="1">
+              <a:ln>
+                <a:noFill/>
+              </a:ln>
+              <a:effectLst/>
+              <a:uLnTx/>
+              <a:uFillTx/>
+              <a:ea typeface="Arial Unicode MS" pitchFamily="34" charset="-128"/>
+              <a:cs typeface="Arial Unicode MS" pitchFamily="34" charset="-128"/>
+            </a:endParaRPr>
+          </a:p>
+        </p:txBody>
+      </p:sp>
+      <p:sp>
+        <p:nvSpPr>
+          <p:cNvPr id="61" name="TextBox 60"/>
+          <p:cNvSpPr txBox="1"/>
+          <p:nvPr/>
+        </p:nvSpPr>
+        <p:spPr>
+          <a:xfrm>
+            <a:off x="5855488" y="1336240"/>
+            <a:ext cx="1205458" cy="276999"/>
+          </a:xfrm>
+          <a:prstGeom prst="rect">
+            <a:avLst/>
+          </a:prstGeom>
+          <a:noFill/>
+        </p:spPr>
+        <p:txBody>
+          <a:bodyPr wrap="none" lIns="0" tIns="0" rIns="0" bIns="0" rtlCol="0">
+            <a:spAutoFit/>
+          </a:bodyPr>
+          <a:lstStyle/>
+          <a:p>
+            <a:pPr fontAlgn="base">
+              <a:spcBef>
+                <a:spcPts val="600"/>
+              </a:spcBef>
+              <a:spcAft>
+                <a:spcPct val="0"/>
+              </a:spcAft>
+              <a:buClr>
+                <a:srgbClr val="F0AB00"/>
+              </a:buClr>
+              <a:buSzPct val="80000"/>
+            </a:pPr>
+            <a:r>
+              <a:rPr lang="pt-BR" sz="1800" kern="0" dirty="0">
+                <a:ea typeface="Arial Unicode MS" pitchFamily="34" charset="-128"/>
+                <a:cs typeface="Arial Unicode MS" pitchFamily="34" charset="-128"/>
+              </a:rPr>
+              <a:t>Cenário </a:t>
+            </a:r>
+            <a:r>
+              <a:rPr lang="pt-BR" sz="1800" i="1" kern="0" dirty="0">
+                <a:ea typeface="Arial Unicode MS" pitchFamily="34" charset="-128"/>
+                <a:cs typeface="Arial Unicode MS" pitchFamily="34" charset="-128"/>
+              </a:rPr>
+              <a:t>n-1</a:t>
+            </a:r>
+          </a:p>
+        </p:txBody>
+      </p:sp>
+      <p:sp>
+        <p:nvSpPr>
+          <p:cNvPr id="62" name="Rounded Rectangle 43"/>
+          <p:cNvSpPr/>
+          <p:nvPr/>
+        </p:nvSpPr>
+        <p:spPr bwMode="gray">
+          <a:xfrm>
+            <a:off x="5784218" y="1739751"/>
+            <a:ext cx="1187963" cy="1708124"/>
+          </a:xfrm>
+          <a:prstGeom prst="roundRect">
+            <a:avLst/>
+          </a:prstGeom>
+          <a:solidFill>
+            <a:schemeClr val="tx2">
+              <a:alpha val="40000"/>
+            </a:schemeClr>
+          </a:solidFill>
+          <a:ln w="6350" algn="ctr">
+            <a:noFill/>
+            <a:miter lim="800000"/>
+            <a:headEnd/>
+            <a:tailEnd/>
+          </a:ln>
+          <a:effectLst/>
+        </p:spPr>
+        <p:txBody>
+          <a:bodyPr lIns="90000" tIns="72000" rIns="90000" bIns="72000" rtlCol="0" anchor="ctr"/>
+          <a:lstStyle/>
+          <a:p>
+            <a:pPr marR="0" algn="ctr" defTabSz="914400" eaLnBrk="1" fontAlgn="base" latinLnBrk="0" hangingPunct="1">
+              <a:lnSpc>
+                <a:spcPct val="100000"/>
+              </a:lnSpc>
+              <a:spcBef>
+                <a:spcPct val="50000"/>
+              </a:spcBef>
+              <a:spcAft>
+                <a:spcPct val="0"/>
+              </a:spcAft>
+              <a:buClr>
+                <a:srgbClr val="F0AB00"/>
+              </a:buClr>
+              <a:buSzPct val="80000"/>
+              <a:tabLst/>
+            </a:pPr>
+            <a:endParaRPr kumimoji="0" lang="pt-BR" sz="1400" b="0" i="0" u="none" strike="noStrike" kern="0" cap="none" spc="0" normalizeH="0" baseline="0" noProof="1">
+              <a:ln>
+                <a:noFill/>
+              </a:ln>
+              <a:effectLst/>
+              <a:uLnTx/>
+              <a:uFillTx/>
+              <a:ea typeface="Arial Unicode MS" pitchFamily="34" charset="-128"/>
+              <a:cs typeface="Arial Unicode MS" pitchFamily="34" charset="-128"/>
+            </a:endParaRPr>
+          </a:p>
+          <a:p>
+            <a:pPr marR="0" algn="ctr" defTabSz="914400" eaLnBrk="1" fontAlgn="base" latinLnBrk="0" hangingPunct="1">
+              <a:lnSpc>
+                <a:spcPct val="100000"/>
+              </a:lnSpc>
+              <a:spcBef>
+                <a:spcPct val="50000"/>
+              </a:spcBef>
+              <a:spcAft>
+                <a:spcPct val="0"/>
+              </a:spcAft>
+              <a:buClr>
+                <a:srgbClr val="F0AB00"/>
+              </a:buClr>
+              <a:buSzPct val="80000"/>
+              <a:tabLst/>
+            </a:pPr>
+            <a:endParaRPr kumimoji="0" lang="pt-BR" sz="1400" b="0" i="0" u="none" strike="noStrike" kern="0" cap="none" spc="0" normalizeH="0" baseline="0" noProof="1">
+              <a:ln>
+                <a:noFill/>
+              </a:ln>
+              <a:effectLst/>
+              <a:uLnTx/>
+              <a:uFillTx/>
+              <a:ea typeface="Arial Unicode MS" pitchFamily="34" charset="-128"/>
+              <a:cs typeface="Arial Unicode MS" pitchFamily="34" charset="-128"/>
+            </a:endParaRPr>
+          </a:p>
+          <a:p>
+            <a:pPr marR="0" algn="ctr" defTabSz="914400" eaLnBrk="1" fontAlgn="base" latinLnBrk="0" hangingPunct="1">
+              <a:lnSpc>
+                <a:spcPct val="100000"/>
+              </a:lnSpc>
+              <a:spcBef>
+                <a:spcPct val="50000"/>
+              </a:spcBef>
+              <a:spcAft>
+                <a:spcPct val="0"/>
+              </a:spcAft>
+              <a:buClr>
+                <a:srgbClr val="F0AB00"/>
+              </a:buClr>
+              <a:buSzPct val="80000"/>
+              <a:tabLst/>
+            </a:pPr>
+            <a:endParaRPr lang="pt-BR" sz="2000" kern="0" noProof="1">
+              <a:ea typeface="Arial Unicode MS" pitchFamily="34" charset="-128"/>
+              <a:cs typeface="Arial Unicode MS" pitchFamily="34" charset="-128"/>
+            </a:endParaRPr>
+          </a:p>
+          <a:p>
+            <a:pPr marR="0" algn="ctr" defTabSz="914400" eaLnBrk="1" fontAlgn="base" latinLnBrk="0" hangingPunct="1">
+              <a:lnSpc>
+                <a:spcPct val="100000"/>
+              </a:lnSpc>
+              <a:spcBef>
+                <a:spcPct val="50000"/>
+              </a:spcBef>
+              <a:spcAft>
+                <a:spcPct val="0"/>
+              </a:spcAft>
+              <a:buClr>
+                <a:srgbClr val="F0AB00"/>
+              </a:buClr>
+              <a:buSzPct val="80000"/>
+              <a:tabLst/>
+            </a:pPr>
+            <a:r>
+              <a:rPr lang="pt-BR" sz="2000" kern="0" noProof="1">
+                <a:ea typeface="Arial Unicode MS" pitchFamily="34" charset="-128"/>
+                <a:cs typeface="Arial Unicode MS" pitchFamily="34" charset="-128"/>
+              </a:rPr>
+              <a:t>Nó</a:t>
+            </a:r>
+            <a:endParaRPr kumimoji="0" lang="pt-BR" sz="2000" b="0" i="0" u="none" strike="noStrike" kern="0" cap="none" spc="0" normalizeH="0" baseline="0" noProof="1">
+              <a:ln>
+                <a:noFill/>
+              </a:ln>
+              <a:effectLst/>
+              <a:uLnTx/>
+              <a:uFillTx/>
+              <a:ea typeface="Arial Unicode MS" pitchFamily="34" charset="-128"/>
+              <a:cs typeface="Arial Unicode MS" pitchFamily="34" charset="-128"/>
+            </a:endParaRPr>
+          </a:p>
+          <a:p>
+            <a:pPr marR="0" algn="ctr" defTabSz="914400" eaLnBrk="1" fontAlgn="base" latinLnBrk="0" hangingPunct="1">
+              <a:lnSpc>
+                <a:spcPct val="100000"/>
+              </a:lnSpc>
+              <a:spcBef>
+                <a:spcPct val="50000"/>
+              </a:spcBef>
+              <a:spcAft>
+                <a:spcPct val="0"/>
+              </a:spcAft>
+              <a:buClr>
+                <a:srgbClr val="F0AB00"/>
+              </a:buClr>
+              <a:buSzPct val="80000"/>
+              <a:tabLst/>
+            </a:pPr>
+            <a:endParaRPr lang="pt-BR" sz="2000" kern="0" noProof="1">
+              <a:ea typeface="Arial Unicode MS" pitchFamily="34" charset="-128"/>
+              <a:cs typeface="Arial Unicode MS" pitchFamily="34" charset="-128"/>
+            </a:endParaRPr>
+          </a:p>
+          <a:p>
+            <a:pPr marR="0" algn="ctr" defTabSz="914400" eaLnBrk="1" fontAlgn="base" latinLnBrk="0" hangingPunct="1">
+              <a:lnSpc>
+                <a:spcPct val="100000"/>
+              </a:lnSpc>
+              <a:spcBef>
+                <a:spcPct val="50000"/>
+              </a:spcBef>
+              <a:spcAft>
+                <a:spcPct val="0"/>
+              </a:spcAft>
+              <a:buClr>
+                <a:srgbClr val="F0AB00"/>
+              </a:buClr>
+              <a:buSzPct val="80000"/>
+              <a:tabLst/>
+            </a:pPr>
+            <a:endParaRPr kumimoji="0" lang="pt-BR" sz="2000" b="0" i="0" u="none" strike="noStrike" kern="0" cap="none" spc="0" normalizeH="0" baseline="0" noProof="1">
+              <a:ln>
+                <a:noFill/>
+              </a:ln>
+              <a:effectLst/>
+              <a:uLnTx/>
+              <a:uFillTx/>
+              <a:ea typeface="Arial Unicode MS" pitchFamily="34" charset="-128"/>
+              <a:cs typeface="Arial Unicode MS" pitchFamily="34" charset="-128"/>
+            </a:endParaRPr>
+          </a:p>
+          <a:p>
+            <a:pPr marR="0" algn="ctr" defTabSz="914400" eaLnBrk="1" fontAlgn="base" latinLnBrk="0" hangingPunct="1">
+              <a:lnSpc>
+                <a:spcPct val="100000"/>
+              </a:lnSpc>
+              <a:spcBef>
+                <a:spcPct val="50000"/>
+              </a:spcBef>
+              <a:spcAft>
+                <a:spcPct val="0"/>
+              </a:spcAft>
+              <a:buClr>
+                <a:srgbClr val="F0AB00"/>
+              </a:buClr>
+              <a:buSzPct val="80000"/>
+              <a:tabLst/>
+            </a:pPr>
+            <a:endParaRPr lang="pt-BR" sz="2000" kern="0" noProof="1">
+              <a:ea typeface="Arial Unicode MS" pitchFamily="34" charset="-128"/>
+              <a:cs typeface="Arial Unicode MS" pitchFamily="34" charset="-128"/>
+            </a:endParaRPr>
+          </a:p>
+          <a:p>
+            <a:pPr marR="0" algn="ctr" defTabSz="914400" eaLnBrk="1" fontAlgn="base" latinLnBrk="0" hangingPunct="1">
+              <a:lnSpc>
+                <a:spcPct val="100000"/>
+              </a:lnSpc>
+              <a:spcBef>
+                <a:spcPct val="50000"/>
+              </a:spcBef>
+              <a:spcAft>
+                <a:spcPct val="0"/>
+              </a:spcAft>
+              <a:buClr>
+                <a:srgbClr val="F0AB00"/>
+              </a:buClr>
+              <a:buSzPct val="80000"/>
+              <a:tabLst/>
+            </a:pPr>
+            <a:endParaRPr kumimoji="0" lang="pt-BR" sz="2000" b="0" i="0" u="none" strike="noStrike" kern="0" cap="none" spc="0" normalizeH="0" baseline="0" noProof="1">
+              <a:ln>
+                <a:noFill/>
+              </a:ln>
+              <a:effectLst/>
+              <a:uLnTx/>
+              <a:uFillTx/>
+              <a:ea typeface="Arial Unicode MS" pitchFamily="34" charset="-128"/>
+              <a:cs typeface="Arial Unicode MS" pitchFamily="34" charset="-128"/>
+            </a:endParaRPr>
+          </a:p>
+          <a:p>
+            <a:pPr marR="0" algn="ctr" defTabSz="914400" eaLnBrk="1" fontAlgn="base" latinLnBrk="0" hangingPunct="1">
+              <a:lnSpc>
+                <a:spcPct val="100000"/>
+              </a:lnSpc>
+              <a:spcBef>
+                <a:spcPct val="50000"/>
+              </a:spcBef>
+              <a:spcAft>
+                <a:spcPct val="0"/>
+              </a:spcAft>
+              <a:buClr>
+                <a:srgbClr val="F0AB00"/>
+              </a:buClr>
+              <a:buSzPct val="80000"/>
+              <a:tabLst/>
+            </a:pPr>
+            <a:endParaRPr kumimoji="0" lang="pt-BR" sz="2000" b="0" i="0" u="none" strike="noStrike" kern="0" cap="none" spc="0" normalizeH="0" baseline="0" noProof="1">
+              <a:ln>
+                <a:noFill/>
+              </a:ln>
+              <a:effectLst/>
+              <a:uLnTx/>
+              <a:uFillTx/>
+              <a:ea typeface="Arial Unicode MS" pitchFamily="34" charset="-128"/>
+              <a:cs typeface="Arial Unicode MS" pitchFamily="34" charset="-128"/>
+            </a:endParaRPr>
+          </a:p>
+        </p:txBody>
+      </p:sp>
+      <p:cxnSp>
+        <p:nvCxnSpPr>
+          <p:cNvPr id="67" name="Straight Connector 66"/>
+          <p:cNvCxnSpPr/>
+          <p:nvPr/>
+        </p:nvCxnSpPr>
+        <p:spPr>
+          <a:xfrm>
+            <a:off x="5667734" y="1613239"/>
+            <a:ext cx="11613" cy="1834636"/>
+          </a:xfrm>
+          <a:prstGeom prst="line">
+            <a:avLst/>
+          </a:prstGeom>
+          <a:ln w="6350">
+            <a:solidFill>
+              <a:schemeClr val="tx1"/>
+            </a:solidFill>
+            <a:prstDash val="dash"/>
+          </a:ln>
+        </p:spPr>
+        <p:style>
+          <a:lnRef idx="1">
+            <a:schemeClr val="accent1"/>
+          </a:lnRef>
+          <a:fillRef idx="0">
+            <a:schemeClr val="accent1"/>
+          </a:fillRef>
+          <a:effectRef idx="0">
+            <a:schemeClr val="accent1"/>
+          </a:effectRef>
+          <a:fontRef idx="minor">
+            <a:schemeClr val="tx1"/>
+          </a:fontRef>
+        </p:style>
+      </p:cxnSp>
+      <p:sp>
+        <p:nvSpPr>
+          <p:cNvPr id="68" name="TextBox 67"/>
+          <p:cNvSpPr txBox="1"/>
+          <p:nvPr/>
+        </p:nvSpPr>
+        <p:spPr>
+          <a:xfrm>
+            <a:off x="5254487" y="1323031"/>
+            <a:ext cx="192360" cy="276999"/>
+          </a:xfrm>
+          <a:prstGeom prst="rect">
+            <a:avLst/>
+          </a:prstGeom>
+          <a:noFill/>
+        </p:spPr>
+        <p:txBody>
+          <a:bodyPr wrap="none" lIns="0" tIns="0" rIns="0" bIns="0" rtlCol="0">
+            <a:spAutoFit/>
+          </a:bodyPr>
+          <a:lstStyle/>
+          <a:p>
+            <a:pPr fontAlgn="base">
+              <a:spcBef>
+                <a:spcPts val="600"/>
+              </a:spcBef>
+              <a:spcAft>
+                <a:spcPct val="0"/>
+              </a:spcAft>
+              <a:buClr>
+                <a:srgbClr val="F0AB00"/>
+              </a:buClr>
+              <a:buSzPct val="80000"/>
+            </a:pPr>
+            <a:r>
+              <a:rPr lang="pt-BR" sz="1800" kern="0" dirty="0">
+                <a:ea typeface="Arial Unicode MS" pitchFamily="34" charset="-128"/>
+                <a:cs typeface="Arial Unicode MS" pitchFamily="34" charset="-128"/>
+              </a:rPr>
+              <a:t>...</a:t>
+            </a:r>
+          </a:p>
+        </p:txBody>
+      </p:sp>
+      <p:sp>
+        <p:nvSpPr>
+          <p:cNvPr id="29" name="TextBox 28"/>
+          <p:cNvSpPr txBox="1"/>
+          <p:nvPr/>
+        </p:nvSpPr>
+        <p:spPr>
+          <a:xfrm>
+            <a:off x="7534686" y="1329249"/>
+            <a:ext cx="1000274" cy="276999"/>
+          </a:xfrm>
+          <a:prstGeom prst="rect">
+            <a:avLst/>
+          </a:prstGeom>
+          <a:noFill/>
+        </p:spPr>
+        <p:txBody>
+          <a:bodyPr wrap="none" lIns="0" tIns="0" rIns="0" bIns="0" rtlCol="0">
+            <a:spAutoFit/>
+          </a:bodyPr>
+          <a:lstStyle/>
+          <a:p>
+            <a:pPr fontAlgn="base">
+              <a:spcBef>
+                <a:spcPts val="600"/>
+              </a:spcBef>
+              <a:spcAft>
+                <a:spcPct val="0"/>
+              </a:spcAft>
+              <a:buClr>
+                <a:srgbClr val="F0AB00"/>
+              </a:buClr>
+              <a:buSzPct val="80000"/>
+            </a:pPr>
+            <a:r>
+              <a:rPr lang="pt-BR" sz="1800" kern="0" dirty="0">
+                <a:ea typeface="Arial Unicode MS" pitchFamily="34" charset="-128"/>
+                <a:cs typeface="Arial Unicode MS" pitchFamily="34" charset="-128"/>
+              </a:rPr>
+              <a:t>Cenário </a:t>
+            </a:r>
+            <a:r>
+              <a:rPr lang="pt-BR" sz="1800" i="1" kern="0" dirty="0">
+                <a:ea typeface="Arial Unicode MS" pitchFamily="34" charset="-128"/>
+                <a:cs typeface="Arial Unicode MS" pitchFamily="34" charset="-128"/>
+              </a:rPr>
+              <a:t>n</a:t>
+            </a:r>
+          </a:p>
+        </p:txBody>
+      </p:sp>
+      <p:cxnSp>
+        <p:nvCxnSpPr>
+          <p:cNvPr id="34" name="Straight Connector 33"/>
+          <p:cNvCxnSpPr/>
+          <p:nvPr/>
+        </p:nvCxnSpPr>
+        <p:spPr>
+          <a:xfrm>
+            <a:off x="7145596" y="1606248"/>
+            <a:ext cx="18602" cy="1841627"/>
+          </a:xfrm>
+          <a:prstGeom prst="line">
+            <a:avLst/>
+          </a:prstGeom>
+          <a:ln w="6350">
+            <a:solidFill>
+              <a:schemeClr val="tx1"/>
+            </a:solidFill>
+            <a:prstDash val="dash"/>
+          </a:ln>
+        </p:spPr>
+        <p:style>
+          <a:lnRef idx="1">
+            <a:schemeClr val="accent1"/>
+          </a:lnRef>
+          <a:fillRef idx="0">
+            <a:schemeClr val="accent1"/>
+          </a:fillRef>
+          <a:effectRef idx="0">
+            <a:schemeClr val="accent1"/>
+          </a:effectRef>
+          <a:fontRef idx="minor">
+            <a:schemeClr val="tx1"/>
+          </a:fontRef>
+        </p:style>
+      </p:cxnSp>
+      <p:sp>
+        <p:nvSpPr>
+          <p:cNvPr id="35" name="Oval 34"/>
+          <p:cNvSpPr/>
+          <p:nvPr/>
+        </p:nvSpPr>
+        <p:spPr bwMode="gray">
+          <a:xfrm>
+            <a:off x="4007288" y="2609146"/>
+            <a:ext cx="536388" cy="461854"/>
+          </a:xfrm>
+          <a:prstGeom prst="ellipse">
+            <a:avLst/>
+          </a:prstGeom>
+          <a:ln>
+            <a:headEnd/>
+            <a:tailEnd/>
+          </a:ln>
+        </p:spPr>
+        <p:style>
+          <a:lnRef idx="2">
+            <a:schemeClr val="dk1"/>
+          </a:lnRef>
+          <a:fillRef idx="1">
+            <a:schemeClr val="lt1"/>
+          </a:fillRef>
+          <a:effectRef idx="0">
+            <a:schemeClr val="dk1"/>
+          </a:effectRef>
+          <a:fontRef idx="minor">
+            <a:schemeClr val="dk1"/>
+          </a:fontRef>
+        </p:style>
+        <p:txBody>
+          <a:bodyPr lIns="90000" tIns="72000" rIns="90000" bIns="72000" rtlCol="0" anchor="ctr"/>
+          <a:lstStyle/>
+          <a:p>
+            <a:pPr marR="0" algn="ctr" defTabSz="914400" eaLnBrk="1" fontAlgn="base" latinLnBrk="0" hangingPunct="1">
+              <a:lnSpc>
+                <a:spcPct val="100000"/>
+              </a:lnSpc>
+              <a:spcBef>
+                <a:spcPct val="50000"/>
+              </a:spcBef>
+              <a:spcAft>
+                <a:spcPct val="0"/>
+              </a:spcAft>
+              <a:buClr>
+                <a:srgbClr val="F0AB00"/>
+              </a:buClr>
+              <a:buSzPct val="80000"/>
+              <a:tabLst/>
+            </a:pPr>
+            <a:r>
+              <a:rPr lang="pt-BR" sz="1000" kern="0" noProof="1">
+                <a:ea typeface="Arial Unicode MS" pitchFamily="34" charset="-128"/>
+                <a:cs typeface="Arial Unicode MS" pitchFamily="34" charset="-128"/>
+              </a:rPr>
+              <a:t>CF</a:t>
+            </a:r>
+            <a:endParaRPr kumimoji="0" lang="pt-BR" sz="1000" b="0" i="0" u="none" strike="noStrike" kern="0" cap="none" spc="0" normalizeH="0" baseline="0" noProof="1">
+              <a:ln>
+                <a:noFill/>
+              </a:ln>
+              <a:effectLst/>
+              <a:uLnTx/>
+              <a:uFillTx/>
+              <a:ea typeface="Arial Unicode MS" pitchFamily="34" charset="-128"/>
+              <a:cs typeface="Arial Unicode MS" pitchFamily="34" charset="-128"/>
+            </a:endParaRPr>
+          </a:p>
+        </p:txBody>
+      </p:sp>
+      <p:sp>
+        <p:nvSpPr>
+          <p:cNvPr id="36" name="Oval 35"/>
+          <p:cNvSpPr/>
+          <p:nvPr/>
+        </p:nvSpPr>
+        <p:spPr bwMode="gray">
+          <a:xfrm>
+            <a:off x="5847579" y="2255519"/>
+            <a:ext cx="536388" cy="461854"/>
+          </a:xfrm>
+          <a:prstGeom prst="ellipse">
+            <a:avLst/>
+          </a:prstGeom>
+          <a:ln>
+            <a:headEnd/>
+            <a:tailEnd/>
+          </a:ln>
+        </p:spPr>
+        <p:style>
+          <a:lnRef idx="2">
+            <a:schemeClr val="dk1"/>
+          </a:lnRef>
+          <a:fillRef idx="1">
+            <a:schemeClr val="lt1"/>
+          </a:fillRef>
+          <a:effectRef idx="0">
+            <a:schemeClr val="dk1"/>
+          </a:effectRef>
+          <a:fontRef idx="minor">
+            <a:schemeClr val="dk1"/>
+          </a:fontRef>
+        </p:style>
+        <p:txBody>
+          <a:bodyPr lIns="90000" tIns="72000" rIns="90000" bIns="72000" rtlCol="0" anchor="ctr"/>
+          <a:lstStyle/>
+          <a:p>
+            <a:pPr marR="0" algn="ctr" defTabSz="914400" eaLnBrk="1" fontAlgn="base" latinLnBrk="0" hangingPunct="1">
+              <a:lnSpc>
+                <a:spcPct val="100000"/>
+              </a:lnSpc>
+              <a:spcBef>
+                <a:spcPct val="50000"/>
+              </a:spcBef>
+              <a:spcAft>
+                <a:spcPct val="0"/>
+              </a:spcAft>
+              <a:buClr>
+                <a:srgbClr val="F0AB00"/>
+              </a:buClr>
+              <a:buSzPct val="80000"/>
+              <a:tabLst/>
+            </a:pPr>
+            <a:r>
+              <a:rPr lang="pt-BR" sz="1000" kern="0" noProof="1">
+                <a:ea typeface="Arial Unicode MS" pitchFamily="34" charset="-128"/>
+                <a:cs typeface="Arial Unicode MS" pitchFamily="34" charset="-128"/>
+              </a:rPr>
+              <a:t>CR</a:t>
+            </a:r>
+            <a:endParaRPr kumimoji="0" lang="pt-BR" sz="1000" b="0" i="0" u="none" strike="noStrike" kern="0" cap="none" spc="0" normalizeH="0" baseline="0" noProof="1">
+              <a:ln>
+                <a:noFill/>
+              </a:ln>
+              <a:effectLst/>
+              <a:uLnTx/>
+              <a:uFillTx/>
+              <a:ea typeface="Arial Unicode MS" pitchFamily="34" charset="-128"/>
+              <a:cs typeface="Arial Unicode MS" pitchFamily="34" charset="-128"/>
+            </a:endParaRPr>
+          </a:p>
+        </p:txBody>
+      </p:sp>
+      <p:sp>
+        <p:nvSpPr>
+          <p:cNvPr id="38" name="Oval 37"/>
+          <p:cNvSpPr/>
+          <p:nvPr/>
+        </p:nvSpPr>
+        <p:spPr bwMode="gray">
+          <a:xfrm>
+            <a:off x="6398461" y="2249499"/>
+            <a:ext cx="536388" cy="461854"/>
+          </a:xfrm>
+          <a:prstGeom prst="ellipse">
+            <a:avLst/>
+          </a:prstGeom>
+          <a:ln>
+            <a:headEnd/>
+            <a:tailEnd/>
+          </a:ln>
+        </p:spPr>
+        <p:style>
+          <a:lnRef idx="2">
+            <a:schemeClr val="dk1"/>
+          </a:lnRef>
+          <a:fillRef idx="1">
+            <a:schemeClr val="lt1"/>
+          </a:fillRef>
+          <a:effectRef idx="0">
+            <a:schemeClr val="dk1"/>
+          </a:effectRef>
+          <a:fontRef idx="minor">
+            <a:schemeClr val="dk1"/>
+          </a:fontRef>
+        </p:style>
+        <p:txBody>
+          <a:bodyPr lIns="90000" tIns="72000" rIns="90000" bIns="72000" rtlCol="0" anchor="ctr"/>
+          <a:lstStyle/>
+          <a:p>
+            <a:pPr marR="0" algn="ctr" defTabSz="914400" eaLnBrk="1" fontAlgn="base" latinLnBrk="0" hangingPunct="1">
+              <a:lnSpc>
+                <a:spcPct val="100000"/>
+              </a:lnSpc>
+              <a:spcBef>
+                <a:spcPct val="50000"/>
+              </a:spcBef>
+              <a:spcAft>
+                <a:spcPct val="0"/>
+              </a:spcAft>
+              <a:buClr>
+                <a:srgbClr val="F0AB00"/>
+              </a:buClr>
+              <a:buSzPct val="80000"/>
+              <a:tabLst/>
+            </a:pPr>
+            <a:r>
+              <a:rPr lang="pt-BR" sz="1000" kern="0" noProof="1">
+                <a:ea typeface="Arial Unicode MS" pitchFamily="34" charset="-128"/>
+                <a:cs typeface="Arial Unicode MS" pitchFamily="34" charset="-128"/>
+              </a:rPr>
+              <a:t>CR</a:t>
+            </a:r>
+            <a:endParaRPr kumimoji="0" lang="pt-BR" sz="1000" b="0" i="0" u="none" strike="noStrike" kern="0" cap="none" spc="0" normalizeH="0" baseline="0" noProof="1">
+              <a:ln>
+                <a:noFill/>
+              </a:ln>
+              <a:effectLst/>
+              <a:uLnTx/>
+              <a:uFillTx/>
+              <a:ea typeface="Arial Unicode MS" pitchFamily="34" charset="-128"/>
+              <a:cs typeface="Arial Unicode MS" pitchFamily="34" charset="-128"/>
+            </a:endParaRPr>
+          </a:p>
+        </p:txBody>
+      </p:sp>
+      <p:sp>
+        <p:nvSpPr>
+          <p:cNvPr id="39" name="Oval 38"/>
+          <p:cNvSpPr/>
+          <p:nvPr/>
+        </p:nvSpPr>
+        <p:spPr bwMode="gray">
+          <a:xfrm>
+            <a:off x="6398461" y="2840323"/>
+            <a:ext cx="536388" cy="461854"/>
+          </a:xfrm>
+          <a:prstGeom prst="ellipse">
+            <a:avLst/>
+          </a:prstGeom>
+          <a:ln>
+            <a:headEnd/>
+            <a:tailEnd/>
+          </a:ln>
+        </p:spPr>
+        <p:style>
+          <a:lnRef idx="2">
+            <a:schemeClr val="dk1"/>
+          </a:lnRef>
+          <a:fillRef idx="1">
+            <a:schemeClr val="lt1"/>
+          </a:fillRef>
+          <a:effectRef idx="0">
+            <a:schemeClr val="dk1"/>
+          </a:effectRef>
+          <a:fontRef idx="minor">
+            <a:schemeClr val="dk1"/>
+          </a:fontRef>
+        </p:style>
+        <p:txBody>
+          <a:bodyPr lIns="90000" tIns="72000" rIns="90000" bIns="72000" rtlCol="0" anchor="ctr"/>
+          <a:lstStyle/>
+          <a:p>
+            <a:pPr marR="0" algn="ctr" defTabSz="914400" eaLnBrk="1" fontAlgn="base" latinLnBrk="0" hangingPunct="1">
+              <a:lnSpc>
+                <a:spcPct val="100000"/>
+              </a:lnSpc>
+              <a:spcBef>
+                <a:spcPct val="50000"/>
+              </a:spcBef>
+              <a:spcAft>
+                <a:spcPct val="0"/>
+              </a:spcAft>
+              <a:buClr>
+                <a:srgbClr val="F0AB00"/>
+              </a:buClr>
+              <a:buSzPct val="80000"/>
+              <a:tabLst/>
+            </a:pPr>
+            <a:r>
+              <a:rPr lang="pt-BR" sz="1000" kern="0" noProof="1">
+                <a:ea typeface="Arial Unicode MS" pitchFamily="34" charset="-128"/>
+                <a:cs typeface="Arial Unicode MS" pitchFamily="34" charset="-128"/>
+              </a:rPr>
+              <a:t>CR</a:t>
+            </a:r>
+            <a:endParaRPr kumimoji="0" lang="pt-BR" sz="1000" b="0" i="0" u="none" strike="noStrike" kern="0" cap="none" spc="0" normalizeH="0" baseline="0" noProof="1">
+              <a:ln>
+                <a:noFill/>
+              </a:ln>
+              <a:effectLst/>
+              <a:uLnTx/>
+              <a:uFillTx/>
+              <a:ea typeface="Arial Unicode MS" pitchFamily="34" charset="-128"/>
+              <a:cs typeface="Arial Unicode MS" pitchFamily="34" charset="-128"/>
+            </a:endParaRPr>
+          </a:p>
+        </p:txBody>
+      </p:sp>
+      <p:sp>
+        <p:nvSpPr>
+          <p:cNvPr id="40" name="TextBox 39"/>
+          <p:cNvSpPr txBox="1"/>
+          <p:nvPr/>
+        </p:nvSpPr>
+        <p:spPr>
+          <a:xfrm>
+            <a:off x="7611606" y="2959228"/>
+            <a:ext cx="192360" cy="276999"/>
+          </a:xfrm>
+          <a:prstGeom prst="rect">
+            <a:avLst/>
+          </a:prstGeom>
+          <a:noFill/>
+        </p:spPr>
+        <p:txBody>
+          <a:bodyPr wrap="none" lIns="0" tIns="0" rIns="0" bIns="0" rtlCol="0">
+            <a:spAutoFit/>
+          </a:bodyPr>
+          <a:lstStyle/>
+          <a:p>
+            <a:pPr fontAlgn="base">
+              <a:spcBef>
+                <a:spcPts val="600"/>
+              </a:spcBef>
+              <a:spcAft>
+                <a:spcPct val="0"/>
+              </a:spcAft>
+              <a:buClr>
+                <a:srgbClr val="F0AB00"/>
+              </a:buClr>
+              <a:buSzPct val="80000"/>
+            </a:pPr>
+            <a:r>
+              <a:rPr lang="pt-BR" sz="1800" kern="0" dirty="0">
+                <a:ea typeface="Arial Unicode MS" pitchFamily="34" charset="-128"/>
+                <a:cs typeface="Arial Unicode MS" pitchFamily="34" charset="-128"/>
+              </a:rPr>
+              <a:t>...</a:t>
+            </a:r>
+          </a:p>
+        </p:txBody>
+      </p:sp>
+      <p:sp>
+        <p:nvSpPr>
+          <p:cNvPr id="41" name="Rounded Rectangle 43"/>
+          <p:cNvSpPr/>
+          <p:nvPr/>
+        </p:nvSpPr>
+        <p:spPr bwMode="gray">
+          <a:xfrm>
+            <a:off x="7346997" y="1728439"/>
+            <a:ext cx="1187963" cy="1719436"/>
+          </a:xfrm>
+          <a:prstGeom prst="roundRect">
+            <a:avLst/>
+          </a:prstGeom>
+          <a:solidFill>
+            <a:schemeClr val="tx2">
+              <a:alpha val="40000"/>
+            </a:schemeClr>
+          </a:solidFill>
+          <a:ln w="6350" algn="ctr">
+            <a:noFill/>
+            <a:miter lim="800000"/>
+            <a:headEnd/>
+            <a:tailEnd/>
+          </a:ln>
+          <a:effectLst/>
+        </p:spPr>
+        <p:txBody>
+          <a:bodyPr lIns="90000" tIns="72000" rIns="90000" bIns="72000" rtlCol="0" anchor="ctr"/>
+          <a:lstStyle/>
+          <a:p>
+            <a:pPr marR="0" algn="ctr" defTabSz="914400" eaLnBrk="1" fontAlgn="base" latinLnBrk="0" hangingPunct="1">
+              <a:lnSpc>
+                <a:spcPct val="100000"/>
+              </a:lnSpc>
+              <a:spcBef>
+                <a:spcPct val="50000"/>
+              </a:spcBef>
+              <a:spcAft>
+                <a:spcPct val="0"/>
+              </a:spcAft>
+              <a:buClr>
+                <a:srgbClr val="F0AB00"/>
+              </a:buClr>
+              <a:buSzPct val="80000"/>
+              <a:tabLst/>
+            </a:pPr>
+            <a:endParaRPr kumimoji="0" lang="pt-BR" sz="1400" b="0" i="0" u="none" strike="noStrike" kern="0" cap="none" spc="0" normalizeH="0" baseline="0" noProof="1">
+              <a:ln>
+                <a:noFill/>
+              </a:ln>
+              <a:effectLst/>
+              <a:uLnTx/>
+              <a:uFillTx/>
+              <a:ea typeface="Arial Unicode MS" pitchFamily="34" charset="-128"/>
+              <a:cs typeface="Arial Unicode MS" pitchFamily="34" charset="-128"/>
+            </a:endParaRPr>
+          </a:p>
+          <a:p>
+            <a:pPr marR="0" algn="ctr" defTabSz="914400" eaLnBrk="1" fontAlgn="base" latinLnBrk="0" hangingPunct="1">
+              <a:lnSpc>
+                <a:spcPct val="100000"/>
+              </a:lnSpc>
+              <a:spcBef>
+                <a:spcPct val="50000"/>
+              </a:spcBef>
+              <a:spcAft>
+                <a:spcPct val="0"/>
+              </a:spcAft>
+              <a:buClr>
+                <a:srgbClr val="F0AB00"/>
+              </a:buClr>
+              <a:buSzPct val="80000"/>
+              <a:tabLst/>
+            </a:pPr>
+            <a:endParaRPr kumimoji="0" lang="pt-BR" sz="1400" b="0" i="0" u="none" strike="noStrike" kern="0" cap="none" spc="0" normalizeH="0" baseline="0" noProof="1">
+              <a:ln>
+                <a:noFill/>
+              </a:ln>
+              <a:effectLst/>
+              <a:uLnTx/>
+              <a:uFillTx/>
+              <a:ea typeface="Arial Unicode MS" pitchFamily="34" charset="-128"/>
+              <a:cs typeface="Arial Unicode MS" pitchFamily="34" charset="-128"/>
+            </a:endParaRPr>
+          </a:p>
+          <a:p>
+            <a:pPr marR="0" algn="ctr" defTabSz="914400" eaLnBrk="1" fontAlgn="base" latinLnBrk="0" hangingPunct="1">
+              <a:lnSpc>
+                <a:spcPct val="100000"/>
+              </a:lnSpc>
+              <a:spcBef>
+                <a:spcPct val="50000"/>
+              </a:spcBef>
+              <a:spcAft>
+                <a:spcPct val="0"/>
+              </a:spcAft>
+              <a:buClr>
+                <a:srgbClr val="F0AB00"/>
+              </a:buClr>
+              <a:buSzPct val="80000"/>
+              <a:tabLst/>
+            </a:pPr>
+            <a:endParaRPr lang="pt-BR" sz="2000" kern="0" noProof="1">
+              <a:ea typeface="Arial Unicode MS" pitchFamily="34" charset="-128"/>
+              <a:cs typeface="Arial Unicode MS" pitchFamily="34" charset="-128"/>
+            </a:endParaRPr>
+          </a:p>
+          <a:p>
+            <a:pPr marR="0" algn="ctr" defTabSz="914400" eaLnBrk="1" fontAlgn="base" latinLnBrk="0" hangingPunct="1">
+              <a:lnSpc>
+                <a:spcPct val="100000"/>
+              </a:lnSpc>
+              <a:spcBef>
+                <a:spcPct val="50000"/>
+              </a:spcBef>
+              <a:spcAft>
+                <a:spcPct val="0"/>
+              </a:spcAft>
+              <a:buClr>
+                <a:srgbClr val="F0AB00"/>
+              </a:buClr>
+              <a:buSzPct val="80000"/>
+              <a:tabLst/>
+            </a:pPr>
+            <a:r>
+              <a:rPr lang="pt-BR" sz="2000" kern="0" noProof="1">
+                <a:ea typeface="Arial Unicode MS" pitchFamily="34" charset="-128"/>
+                <a:cs typeface="Arial Unicode MS" pitchFamily="34" charset="-128"/>
+              </a:rPr>
+              <a:t>Nó</a:t>
+            </a:r>
+            <a:endParaRPr kumimoji="0" lang="pt-BR" sz="2000" b="0" i="0" u="none" strike="noStrike" kern="0" cap="none" spc="0" normalizeH="0" baseline="0" noProof="1">
+              <a:ln>
+                <a:noFill/>
+              </a:ln>
+              <a:effectLst/>
+              <a:uLnTx/>
+              <a:uFillTx/>
+              <a:ea typeface="Arial Unicode MS" pitchFamily="34" charset="-128"/>
+              <a:cs typeface="Arial Unicode MS" pitchFamily="34" charset="-128"/>
+            </a:endParaRPr>
+          </a:p>
+          <a:p>
+            <a:pPr marR="0" algn="ctr" defTabSz="914400" eaLnBrk="1" fontAlgn="base" latinLnBrk="0" hangingPunct="1">
+              <a:lnSpc>
+                <a:spcPct val="100000"/>
+              </a:lnSpc>
+              <a:spcBef>
+                <a:spcPct val="50000"/>
+              </a:spcBef>
+              <a:spcAft>
+                <a:spcPct val="0"/>
+              </a:spcAft>
+              <a:buClr>
+                <a:srgbClr val="F0AB00"/>
+              </a:buClr>
+              <a:buSzPct val="80000"/>
+              <a:tabLst/>
+            </a:pPr>
+            <a:endParaRPr lang="pt-BR" sz="2000" kern="0" noProof="1">
+              <a:ea typeface="Arial Unicode MS" pitchFamily="34" charset="-128"/>
+              <a:cs typeface="Arial Unicode MS" pitchFamily="34" charset="-128"/>
+            </a:endParaRPr>
+          </a:p>
+          <a:p>
+            <a:pPr marR="0" algn="ctr" defTabSz="914400" eaLnBrk="1" fontAlgn="base" latinLnBrk="0" hangingPunct="1">
+              <a:lnSpc>
+                <a:spcPct val="100000"/>
+              </a:lnSpc>
+              <a:spcBef>
+                <a:spcPct val="50000"/>
+              </a:spcBef>
+              <a:spcAft>
+                <a:spcPct val="0"/>
+              </a:spcAft>
+              <a:buClr>
+                <a:srgbClr val="F0AB00"/>
+              </a:buClr>
+              <a:buSzPct val="80000"/>
+              <a:tabLst/>
+            </a:pPr>
+            <a:endParaRPr kumimoji="0" lang="pt-BR" sz="2000" b="0" i="0" u="none" strike="noStrike" kern="0" cap="none" spc="0" normalizeH="0" baseline="0" noProof="1">
+              <a:ln>
+                <a:noFill/>
+              </a:ln>
+              <a:effectLst/>
+              <a:uLnTx/>
+              <a:uFillTx/>
+              <a:ea typeface="Arial Unicode MS" pitchFamily="34" charset="-128"/>
+              <a:cs typeface="Arial Unicode MS" pitchFamily="34" charset="-128"/>
+            </a:endParaRPr>
+          </a:p>
+          <a:p>
+            <a:pPr marR="0" algn="ctr" defTabSz="914400" eaLnBrk="1" fontAlgn="base" latinLnBrk="0" hangingPunct="1">
+              <a:lnSpc>
+                <a:spcPct val="100000"/>
+              </a:lnSpc>
+              <a:spcBef>
+                <a:spcPct val="50000"/>
+              </a:spcBef>
+              <a:spcAft>
+                <a:spcPct val="0"/>
+              </a:spcAft>
+              <a:buClr>
+                <a:srgbClr val="F0AB00"/>
+              </a:buClr>
+              <a:buSzPct val="80000"/>
+              <a:tabLst/>
+            </a:pPr>
+            <a:endParaRPr lang="pt-BR" sz="2000" kern="0" noProof="1">
+              <a:ea typeface="Arial Unicode MS" pitchFamily="34" charset="-128"/>
+              <a:cs typeface="Arial Unicode MS" pitchFamily="34" charset="-128"/>
+            </a:endParaRPr>
+          </a:p>
+          <a:p>
+            <a:pPr marR="0" algn="ctr" defTabSz="914400" eaLnBrk="1" fontAlgn="base" latinLnBrk="0" hangingPunct="1">
+              <a:lnSpc>
+                <a:spcPct val="100000"/>
+              </a:lnSpc>
+              <a:spcBef>
+                <a:spcPct val="50000"/>
+              </a:spcBef>
+              <a:spcAft>
+                <a:spcPct val="0"/>
+              </a:spcAft>
+              <a:buClr>
+                <a:srgbClr val="F0AB00"/>
+              </a:buClr>
+              <a:buSzPct val="80000"/>
+              <a:tabLst/>
+            </a:pPr>
+            <a:endParaRPr kumimoji="0" lang="pt-BR" sz="2000" b="0" i="0" u="none" strike="noStrike" kern="0" cap="none" spc="0" normalizeH="0" baseline="0" noProof="1">
+              <a:ln>
+                <a:noFill/>
+              </a:ln>
+              <a:effectLst/>
+              <a:uLnTx/>
+              <a:uFillTx/>
+              <a:ea typeface="Arial Unicode MS" pitchFamily="34" charset="-128"/>
+              <a:cs typeface="Arial Unicode MS" pitchFamily="34" charset="-128"/>
+            </a:endParaRPr>
+          </a:p>
+          <a:p>
+            <a:pPr marR="0" algn="ctr" defTabSz="914400" eaLnBrk="1" fontAlgn="base" latinLnBrk="0" hangingPunct="1">
+              <a:lnSpc>
+                <a:spcPct val="100000"/>
+              </a:lnSpc>
+              <a:spcBef>
+                <a:spcPct val="50000"/>
+              </a:spcBef>
+              <a:spcAft>
+                <a:spcPct val="0"/>
+              </a:spcAft>
+              <a:buClr>
+                <a:srgbClr val="F0AB00"/>
+              </a:buClr>
+              <a:buSzPct val="80000"/>
+              <a:tabLst/>
+            </a:pPr>
+            <a:endParaRPr kumimoji="0" lang="pt-BR" sz="2000" b="0" i="0" u="none" strike="noStrike" kern="0" cap="none" spc="0" normalizeH="0" baseline="0" noProof="1">
+              <a:ln>
+                <a:noFill/>
+              </a:ln>
+              <a:effectLst/>
+              <a:uLnTx/>
+              <a:uFillTx/>
+              <a:ea typeface="Arial Unicode MS" pitchFamily="34" charset="-128"/>
+              <a:cs typeface="Arial Unicode MS" pitchFamily="34" charset="-128"/>
+            </a:endParaRPr>
+          </a:p>
+        </p:txBody>
+      </p:sp>
+      <p:sp>
+        <p:nvSpPr>
+          <p:cNvPr id="42" name="Oval 41"/>
+          <p:cNvSpPr/>
+          <p:nvPr/>
+        </p:nvSpPr>
+        <p:spPr bwMode="gray">
+          <a:xfrm>
+            <a:off x="7410358" y="2244207"/>
+            <a:ext cx="536388" cy="461854"/>
+          </a:xfrm>
+          <a:prstGeom prst="ellipse">
+            <a:avLst/>
+          </a:prstGeom>
+          <a:ln>
+            <a:headEnd/>
+            <a:tailEnd/>
+          </a:ln>
+        </p:spPr>
+        <p:style>
+          <a:lnRef idx="2">
+            <a:schemeClr val="dk1"/>
+          </a:lnRef>
+          <a:fillRef idx="1">
+            <a:schemeClr val="lt1"/>
+          </a:fillRef>
+          <a:effectRef idx="0">
+            <a:schemeClr val="dk1"/>
+          </a:effectRef>
+          <a:fontRef idx="minor">
+            <a:schemeClr val="dk1"/>
+          </a:fontRef>
+        </p:style>
+        <p:txBody>
+          <a:bodyPr lIns="90000" tIns="72000" rIns="90000" bIns="72000" rtlCol="0" anchor="ctr"/>
+          <a:lstStyle/>
+          <a:p>
+            <a:pPr marR="0" algn="ctr" defTabSz="914400" eaLnBrk="1" fontAlgn="base" latinLnBrk="0" hangingPunct="1">
+              <a:lnSpc>
+                <a:spcPct val="100000"/>
+              </a:lnSpc>
+              <a:spcBef>
+                <a:spcPct val="50000"/>
+              </a:spcBef>
+              <a:spcAft>
+                <a:spcPct val="0"/>
+              </a:spcAft>
+              <a:buClr>
+                <a:srgbClr val="F0AB00"/>
+              </a:buClr>
+              <a:buSzPct val="80000"/>
+              <a:tabLst/>
+            </a:pPr>
+            <a:r>
+              <a:rPr lang="pt-BR" sz="1000" kern="0" noProof="1">
+                <a:ea typeface="Arial Unicode MS" pitchFamily="34" charset="-128"/>
+                <a:cs typeface="Arial Unicode MS" pitchFamily="34" charset="-128"/>
+              </a:rPr>
+              <a:t>CF</a:t>
+            </a:r>
+            <a:endParaRPr kumimoji="0" lang="pt-BR" sz="1000" b="0" i="0" u="none" strike="noStrike" kern="0" cap="none" spc="0" normalizeH="0" baseline="0" noProof="1">
+              <a:ln>
+                <a:noFill/>
+              </a:ln>
+              <a:effectLst/>
+              <a:uLnTx/>
+              <a:uFillTx/>
+              <a:ea typeface="Arial Unicode MS" pitchFamily="34" charset="-128"/>
+              <a:cs typeface="Arial Unicode MS" pitchFamily="34" charset="-128"/>
+            </a:endParaRPr>
+          </a:p>
+        </p:txBody>
+      </p:sp>
+      <p:sp>
+        <p:nvSpPr>
+          <p:cNvPr id="45" name="Oval 44"/>
+          <p:cNvSpPr/>
+          <p:nvPr/>
+        </p:nvSpPr>
+        <p:spPr bwMode="gray">
+          <a:xfrm>
+            <a:off x="7961240" y="2238187"/>
+            <a:ext cx="536388" cy="461854"/>
+          </a:xfrm>
+          <a:prstGeom prst="ellipse">
+            <a:avLst/>
+          </a:prstGeom>
+          <a:ln>
+            <a:headEnd/>
+            <a:tailEnd/>
+          </a:ln>
+        </p:spPr>
+        <p:style>
+          <a:lnRef idx="2">
+            <a:schemeClr val="dk1"/>
+          </a:lnRef>
+          <a:fillRef idx="1">
+            <a:schemeClr val="lt1"/>
+          </a:fillRef>
+          <a:effectRef idx="0">
+            <a:schemeClr val="dk1"/>
+          </a:effectRef>
+          <a:fontRef idx="minor">
+            <a:schemeClr val="dk1"/>
+          </a:fontRef>
+        </p:style>
+        <p:txBody>
+          <a:bodyPr lIns="90000" tIns="72000" rIns="90000" bIns="72000" rtlCol="0" anchor="ctr"/>
+          <a:lstStyle/>
+          <a:p>
+            <a:pPr marR="0" algn="ctr" defTabSz="914400" eaLnBrk="1" fontAlgn="base" latinLnBrk="0" hangingPunct="1">
+              <a:lnSpc>
+                <a:spcPct val="100000"/>
+              </a:lnSpc>
+              <a:spcBef>
+                <a:spcPct val="50000"/>
+              </a:spcBef>
+              <a:spcAft>
+                <a:spcPct val="0"/>
+              </a:spcAft>
+              <a:buClr>
+                <a:srgbClr val="F0AB00"/>
+              </a:buClr>
+              <a:buSzPct val="80000"/>
+              <a:tabLst/>
+            </a:pPr>
+            <a:r>
+              <a:rPr lang="pt-BR" sz="1000" kern="0" noProof="1">
+                <a:ea typeface="Arial Unicode MS" pitchFamily="34" charset="-128"/>
+                <a:cs typeface="Arial Unicode MS" pitchFamily="34" charset="-128"/>
+              </a:rPr>
+              <a:t>CF</a:t>
+            </a:r>
+            <a:endParaRPr kumimoji="0" lang="pt-BR" sz="1000" b="0" i="0" u="none" strike="noStrike" kern="0" cap="none" spc="0" normalizeH="0" baseline="0" noProof="1">
+              <a:ln>
+                <a:noFill/>
+              </a:ln>
+              <a:effectLst/>
+              <a:uLnTx/>
+              <a:uFillTx/>
+              <a:ea typeface="Arial Unicode MS" pitchFamily="34" charset="-128"/>
+              <a:cs typeface="Arial Unicode MS" pitchFamily="34" charset="-128"/>
+            </a:endParaRPr>
+          </a:p>
+        </p:txBody>
+      </p:sp>
+      <p:sp>
+        <p:nvSpPr>
+          <p:cNvPr id="46" name="Oval 45"/>
+          <p:cNvSpPr/>
+          <p:nvPr/>
+        </p:nvSpPr>
+        <p:spPr bwMode="gray">
+          <a:xfrm>
+            <a:off x="7961240" y="2829011"/>
+            <a:ext cx="536388" cy="461854"/>
+          </a:xfrm>
+          <a:prstGeom prst="ellipse">
+            <a:avLst/>
+          </a:prstGeom>
+          <a:ln>
+            <a:headEnd/>
+            <a:tailEnd/>
+          </a:ln>
+        </p:spPr>
+        <p:style>
+          <a:lnRef idx="2">
+            <a:schemeClr val="dk1"/>
+          </a:lnRef>
+          <a:fillRef idx="1">
+            <a:schemeClr val="lt1"/>
+          </a:fillRef>
+          <a:effectRef idx="0">
+            <a:schemeClr val="dk1"/>
+          </a:effectRef>
+          <a:fontRef idx="minor">
+            <a:schemeClr val="dk1"/>
+          </a:fontRef>
+        </p:style>
+        <p:txBody>
+          <a:bodyPr lIns="90000" tIns="72000" rIns="90000" bIns="72000" rtlCol="0" anchor="ctr"/>
+          <a:lstStyle/>
+          <a:p>
+            <a:pPr marR="0" algn="ctr" defTabSz="914400" eaLnBrk="1" fontAlgn="base" latinLnBrk="0" hangingPunct="1">
+              <a:lnSpc>
+                <a:spcPct val="100000"/>
+              </a:lnSpc>
+              <a:spcBef>
+                <a:spcPct val="50000"/>
+              </a:spcBef>
+              <a:spcAft>
+                <a:spcPct val="0"/>
+              </a:spcAft>
+              <a:buClr>
+                <a:srgbClr val="F0AB00"/>
+              </a:buClr>
+              <a:buSzPct val="80000"/>
+              <a:tabLst/>
+            </a:pPr>
+            <a:r>
+              <a:rPr lang="pt-BR" sz="1000" kern="0" noProof="1">
+                <a:ea typeface="Arial Unicode MS" pitchFamily="34" charset="-128"/>
+                <a:cs typeface="Arial Unicode MS" pitchFamily="34" charset="-128"/>
+              </a:rPr>
+              <a:t>CF</a:t>
+            </a:r>
+            <a:endParaRPr kumimoji="0" lang="pt-BR" sz="1000" b="0" i="0" u="none" strike="noStrike" kern="0" cap="none" spc="0" normalizeH="0" baseline="0" noProof="1">
+              <a:ln>
+                <a:noFill/>
+              </a:ln>
+              <a:effectLst/>
+              <a:uLnTx/>
+              <a:uFillTx/>
+              <a:ea typeface="Arial Unicode MS" pitchFamily="34" charset="-128"/>
+              <a:cs typeface="Arial Unicode MS" pitchFamily="34" charset="-128"/>
+            </a:endParaRPr>
+          </a:p>
+        </p:txBody>
+      </p:sp>
+      <p:sp>
+        <p:nvSpPr>
+          <p:cNvPr id="60" name="Oval 59"/>
+          <p:cNvSpPr/>
+          <p:nvPr/>
+        </p:nvSpPr>
+        <p:spPr bwMode="gray">
+          <a:xfrm>
+            <a:off x="3185281" y="3529942"/>
+            <a:ext cx="536388" cy="461854"/>
+          </a:xfrm>
+          <a:prstGeom prst="ellipse">
+            <a:avLst/>
+          </a:prstGeom>
+          <a:ln>
+            <a:headEnd/>
+            <a:tailEnd/>
+          </a:ln>
+        </p:spPr>
+        <p:style>
+          <a:lnRef idx="2">
+            <a:schemeClr val="dk1"/>
+          </a:lnRef>
+          <a:fillRef idx="1">
+            <a:schemeClr val="lt1"/>
+          </a:fillRef>
+          <a:effectRef idx="0">
+            <a:schemeClr val="dk1"/>
+          </a:effectRef>
+          <a:fontRef idx="minor">
+            <a:schemeClr val="dk1"/>
+          </a:fontRef>
+        </p:style>
+        <p:txBody>
+          <a:bodyPr lIns="90000" tIns="72000" rIns="90000" bIns="72000" rtlCol="0" anchor="ctr"/>
+          <a:lstStyle/>
+          <a:p>
+            <a:pPr marR="0" algn="ctr" defTabSz="914400" eaLnBrk="1" fontAlgn="base" latinLnBrk="0" hangingPunct="1">
+              <a:lnSpc>
+                <a:spcPct val="100000"/>
+              </a:lnSpc>
+              <a:spcBef>
+                <a:spcPct val="50000"/>
+              </a:spcBef>
+              <a:spcAft>
+                <a:spcPct val="0"/>
+              </a:spcAft>
+              <a:buClr>
+                <a:srgbClr val="F0AB00"/>
+              </a:buClr>
+              <a:buSzPct val="80000"/>
+              <a:tabLst/>
+            </a:pPr>
+            <a:r>
+              <a:rPr lang="pt-BR" sz="1000" kern="0" noProof="1">
+                <a:ea typeface="Arial Unicode MS" pitchFamily="34" charset="-128"/>
+                <a:cs typeface="Arial Unicode MS" pitchFamily="34" charset="-128"/>
+              </a:rPr>
+              <a:t>CR</a:t>
+            </a:r>
+            <a:endParaRPr kumimoji="0" lang="pt-BR" sz="1000" b="0" i="0" u="none" strike="noStrike" kern="0" cap="none" spc="0" normalizeH="0" baseline="0" noProof="1">
+              <a:ln>
+                <a:noFill/>
+              </a:ln>
+              <a:effectLst/>
+              <a:uLnTx/>
+              <a:uFillTx/>
+              <a:ea typeface="Arial Unicode MS" pitchFamily="34" charset="-128"/>
+              <a:cs typeface="Arial Unicode MS" pitchFamily="34" charset="-128"/>
+            </a:endParaRPr>
+          </a:p>
+        </p:txBody>
+      </p:sp>
+      <p:sp>
+        <p:nvSpPr>
+          <p:cNvPr id="69" name="TextBox 68"/>
+          <p:cNvSpPr txBox="1"/>
+          <p:nvPr/>
+        </p:nvSpPr>
+        <p:spPr>
+          <a:xfrm>
+            <a:off x="6605590" y="3624302"/>
+            <a:ext cx="1848263" cy="184666"/>
+          </a:xfrm>
+          <a:prstGeom prst="rect">
+            <a:avLst/>
+          </a:prstGeom>
+          <a:noFill/>
+        </p:spPr>
+        <p:txBody>
+          <a:bodyPr wrap="none" lIns="0" tIns="0" rIns="0" bIns="0" rtlCol="0">
+            <a:spAutoFit/>
+          </a:bodyPr>
+          <a:lstStyle/>
+          <a:p>
+            <a:pPr fontAlgn="base">
+              <a:spcBef>
+                <a:spcPts val="600"/>
+              </a:spcBef>
+              <a:spcAft>
+                <a:spcPct val="0"/>
+              </a:spcAft>
+              <a:buClr>
+                <a:srgbClr val="F0AB00"/>
+              </a:buClr>
+              <a:buSzPct val="80000"/>
+            </a:pPr>
+            <a:r>
+              <a:rPr lang="pt-BR" sz="1200" kern="0" noProof="1">
+                <a:ea typeface="Arial Unicode MS" pitchFamily="34" charset="-128"/>
+                <a:cs typeface="Arial Unicode MS" pitchFamily="34" charset="-128"/>
+              </a:rPr>
+              <a:t>Unidade Container Flexível</a:t>
+            </a:r>
+          </a:p>
+        </p:txBody>
+      </p:sp>
+      <p:sp>
+        <p:nvSpPr>
+          <p:cNvPr id="70" name="Oval 69"/>
+          <p:cNvSpPr/>
+          <p:nvPr/>
+        </p:nvSpPr>
+        <p:spPr bwMode="gray">
+          <a:xfrm>
+            <a:off x="5972993" y="3520189"/>
+            <a:ext cx="536388" cy="461854"/>
+          </a:xfrm>
+          <a:prstGeom prst="ellipse">
+            <a:avLst/>
+          </a:prstGeom>
+          <a:ln>
+            <a:headEnd/>
+            <a:tailEnd/>
+          </a:ln>
+        </p:spPr>
+        <p:style>
+          <a:lnRef idx="2">
+            <a:schemeClr val="dk1"/>
+          </a:lnRef>
+          <a:fillRef idx="1">
+            <a:schemeClr val="lt1"/>
+          </a:fillRef>
+          <a:effectRef idx="0">
+            <a:schemeClr val="dk1"/>
+          </a:effectRef>
+          <a:fontRef idx="minor">
+            <a:schemeClr val="dk1"/>
+          </a:fontRef>
+        </p:style>
+        <p:txBody>
+          <a:bodyPr lIns="90000" tIns="72000" rIns="90000" bIns="72000" rtlCol="0" anchor="ctr"/>
+          <a:lstStyle/>
+          <a:p>
+            <a:pPr marR="0" algn="ctr" defTabSz="914400" eaLnBrk="1" fontAlgn="base" latinLnBrk="0" hangingPunct="1">
+              <a:lnSpc>
+                <a:spcPct val="100000"/>
+              </a:lnSpc>
+              <a:spcBef>
+                <a:spcPct val="50000"/>
+              </a:spcBef>
+              <a:spcAft>
+                <a:spcPct val="0"/>
+              </a:spcAft>
+              <a:buClr>
+                <a:srgbClr val="F0AB00"/>
+              </a:buClr>
+              <a:buSzPct val="80000"/>
+              <a:tabLst/>
+            </a:pPr>
+            <a:r>
+              <a:rPr lang="pt-BR" sz="1000" kern="0" noProof="1">
+                <a:ea typeface="Arial Unicode MS" pitchFamily="34" charset="-128"/>
+                <a:cs typeface="Arial Unicode MS" pitchFamily="34" charset="-128"/>
+              </a:rPr>
+              <a:t>CF</a:t>
+            </a:r>
+            <a:endParaRPr kumimoji="0" lang="pt-BR" sz="1000" b="0" i="0" u="none" strike="noStrike" kern="0" cap="none" spc="0" normalizeH="0" baseline="0" noProof="1">
+              <a:ln>
+                <a:noFill/>
+              </a:ln>
+              <a:effectLst/>
+              <a:uLnTx/>
+              <a:uFillTx/>
+              <a:ea typeface="Arial Unicode MS" pitchFamily="34" charset="-128"/>
+              <a:cs typeface="Arial Unicode MS" pitchFamily="34" charset="-128"/>
+            </a:endParaRPr>
+          </a:p>
+        </p:txBody>
+      </p:sp>
     </p:spTree>
     <p:extLst>
       <p:ext uri="{BB962C8B-B14F-4D97-AF65-F5344CB8AC3E}">
-        <p14:creationId xmlns:p14="http://schemas.microsoft.com/office/powerpoint/2010/main" val="1956713743"/>
+        <p14:creationId xmlns:p14="http://schemas.microsoft.com/office/powerpoint/2010/main" val="2872235096"/>
       </p:ext>
     </p:extLst>
   </p:cSld>
@@ -22335,6 +25322,108 @@
           <a:chExt cx="0" cy="0"/>
         </a:xfrm>
       </p:grpSpPr>
+      <p:pic>
+        <p:nvPicPr>
+          <p:cNvPr id="4" name="Picture 3"/>
+          <p:cNvPicPr>
+            <a:picLocks noChangeAspect="1"/>
+          </p:cNvPicPr>
+          <p:nvPr/>
+        </p:nvPicPr>
+        <p:blipFill>
+          <a:blip r:embed="rId2"/>
+          <a:stretch>
+            <a:fillRect/>
+          </a:stretch>
+        </p:blipFill>
+        <p:spPr>
+          <a:xfrm>
+            <a:off x="3598152" y="292715"/>
+            <a:ext cx="4453027" cy="5336176"/>
+          </a:xfrm>
+          <a:prstGeom prst="rect">
+            <a:avLst/>
+          </a:prstGeom>
+        </p:spPr>
+      </p:pic>
+      <p:pic>
+        <p:nvPicPr>
+          <p:cNvPr id="5" name="Picture 4"/>
+          <p:cNvPicPr>
+            <a:picLocks noChangeAspect="1"/>
+          </p:cNvPicPr>
+          <p:nvPr/>
+        </p:nvPicPr>
+        <p:blipFill>
+          <a:blip r:embed="rId3"/>
+          <a:stretch>
+            <a:fillRect/>
+          </a:stretch>
+        </p:blipFill>
+        <p:spPr>
+          <a:xfrm>
+            <a:off x="2961479" y="5750742"/>
+            <a:ext cx="195390" cy="215160"/>
+          </a:xfrm>
+          <a:prstGeom prst="rect">
+            <a:avLst/>
+          </a:prstGeom>
+        </p:spPr>
+      </p:pic>
+      <p:pic>
+        <p:nvPicPr>
+          <p:cNvPr id="6" name="Picture 5"/>
+          <p:cNvPicPr>
+            <a:picLocks noChangeAspect="1"/>
+          </p:cNvPicPr>
+          <p:nvPr/>
+        </p:nvPicPr>
+        <p:blipFill>
+          <a:blip r:embed="rId4"/>
+          <a:stretch>
+            <a:fillRect/>
+          </a:stretch>
+        </p:blipFill>
+        <p:spPr>
+          <a:xfrm>
+            <a:off x="3906577" y="5750741"/>
+            <a:ext cx="198396" cy="215161"/>
+          </a:xfrm>
+          <a:prstGeom prst="rect">
+            <a:avLst/>
+          </a:prstGeom>
+        </p:spPr>
+      </p:pic>
+    </p:spTree>
+    <p:extLst>
+      <p:ext uri="{BB962C8B-B14F-4D97-AF65-F5344CB8AC3E}">
+        <p14:creationId xmlns:p14="http://schemas.microsoft.com/office/powerpoint/2010/main" val="1956713743"/>
+      </p:ext>
+    </p:extLst>
+  </p:cSld>
+  <p:clrMapOvr>
+    <a:masterClrMapping/>
+  </p:clrMapOvr>
+</p:sld>
+</file>
+
+<file path=ppt/slides/slide21.xml><?xml version="1.0" encoding="utf-8"?>
+<p:sld xmlns:a="http://schemas.openxmlformats.org/drawingml/2006/main" xmlns:r="http://schemas.openxmlformats.org/officeDocument/2006/relationships" xmlns:p="http://schemas.openxmlformats.org/presentationml/2006/main">
+  <p:cSld>
+    <p:spTree>
+      <p:nvGrpSpPr>
+        <p:cNvPr id="1" name=""/>
+        <p:cNvGrpSpPr/>
+        <p:nvPr/>
+      </p:nvGrpSpPr>
+      <p:grpSpPr>
+        <a:xfrm>
+          <a:off x="0" y="0"/>
+          <a:ext cx="0" cy="0"/>
+          <a:chOff x="0" y="0"/>
+          <a:chExt cx="0" cy="0"/>
+        </a:xfrm>
+      </p:grpSpPr>
       <p:sp>
         <p:nvSpPr>
           <p:cNvPr id="2" name="Title 1"/>
@@ -22391,7 +25480,7 @@
 </p:sld>
 </file>
 
-<file path=ppt/slides/slide21.xml><?xml version="1.0" encoding="utf-8"?>
+<file path=ppt/slides/slide22.xml><?xml version="1.0" encoding="utf-8"?>
 <p:sld xmlns:a="http://schemas.openxmlformats.org/drawingml/2006/main" xmlns:r="http://schemas.openxmlformats.org/officeDocument/2006/relationships" xmlns:p="http://schemas.openxmlformats.org/presentationml/2006/main">
   <p:cSld>
     <p:spTree>
@@ -22706,7 +25795,7 @@
 </p:sld>
 </file>
 
-<file path=ppt/slides/slide22.xml><?xml version="1.0" encoding="utf-8"?>
+<file path=ppt/slides/slide23.xml><?xml version="1.0" encoding="utf-8"?>
 <p:sld xmlns:a="http://schemas.openxmlformats.org/drawingml/2006/main" xmlns:r="http://schemas.openxmlformats.org/officeDocument/2006/relationships" xmlns:p="http://schemas.openxmlformats.org/presentationml/2006/main">
   <p:cSld>
     <p:spTree>
@@ -22834,7 +25923,7 @@
 </p:sld>
 </file>
 
-<file path=ppt/slides/slide23.xml><?xml version="1.0" encoding="utf-8"?>
+<file path=ppt/slides/slide24.xml><?xml version="1.0" encoding="utf-8"?>
 <p:sld xmlns:a="http://schemas.openxmlformats.org/drawingml/2006/main" xmlns:r="http://schemas.openxmlformats.org/officeDocument/2006/relationships" xmlns:p="http://schemas.openxmlformats.org/presentationml/2006/main" show="0">
   <p:cSld>
     <p:spTree>
@@ -22860,7 +25949,7 @@
 </p:sld>
 </file>
 
-<file path=ppt/slides/slide24.xml><?xml version="1.0" encoding="utf-8"?>
+<file path=ppt/slides/slide25.xml><?xml version="1.0" encoding="utf-8"?>
 <p:sld xmlns:a="http://schemas.openxmlformats.org/drawingml/2006/main" xmlns:r="http://schemas.openxmlformats.org/officeDocument/2006/relationships" xmlns:p="http://schemas.openxmlformats.org/presentationml/2006/main" show="0">
   <p:cSld>
     <p:spTree>
@@ -22886,7 +25975,7 @@
 </p:sld>
 </file>
 
-<file path=ppt/slides/slide25.xml><?xml version="1.0" encoding="utf-8"?>
+<file path=ppt/slides/slide26.xml><?xml version="1.0" encoding="utf-8"?>
 <p:sld xmlns:a="http://schemas.openxmlformats.org/drawingml/2006/main" xmlns:r="http://schemas.openxmlformats.org/officeDocument/2006/relationships" xmlns:p="http://schemas.openxmlformats.org/presentationml/2006/main" show="0">
   <p:cSld>
     <p:spTree>

</xml_diff>